<commit_message>
Add notebook with (pairwise) statistics on CICMoD indices
</commit_message>
<xml_diff>
--- a/figures/combined_figures.pptx
+++ b/figures/combined_figures.pptx
@@ -5,12 +5,13 @@
     <p:sldMasterId id="2147483648" r:id="rId1"/>
   </p:sldMasterIdLst>
   <p:notesMasterIdLst>
-    <p:notesMasterId r:id="rId5"/>
+    <p:notesMasterId r:id="rId6"/>
   </p:notesMasterIdLst>
   <p:sldIdLst>
     <p:sldId id="256" r:id="rId2"/>
-    <p:sldId id="257" r:id="rId3"/>
-    <p:sldId id="258" r:id="rId4"/>
+    <p:sldId id="259" r:id="rId3"/>
+    <p:sldId id="257" r:id="rId4"/>
+    <p:sldId id="258" r:id="rId5"/>
   </p:sldIdLst>
   <p:sldSz cx="12192000" cy="6858000"/>
   <p:notesSz cx="6858000" cy="9144000"/>
@@ -198,7 +199,7 @@
           </a:lstStyle>
           <a:p>
             <a:fld id="{77F0B5B9-2F05-8040-835B-A9EE0944125F}" type="datetimeFigureOut">
-              <a:t>05.12.22</a:t>
+              <a:t>07.12.22</a:t>
             </a:fld>
             <a:endParaRPr lang="de-DE"/>
           </a:p>
@@ -622,7 +623,7 @@
     </p:spTree>
     <p:extLst>
       <p:ext uri="{BB962C8B-B14F-4D97-AF65-F5344CB8AC3E}">
-        <p14:creationId xmlns:p14="http://schemas.microsoft.com/office/powerpoint/2010/main" val="3852857426"/>
+        <p14:creationId xmlns:p14="http://schemas.microsoft.com/office/powerpoint/2010/main" val="63657794"/>
       </p:ext>
     </p:extLst>
   </p:cSld>
@@ -698,6 +699,90 @@
             <a:fld id="{238902E6-424B-1C48-8D10-94E97A9F44CE}" type="slidenum">
               <a:rPr lang="de-DE"/>
               <a:t>3</a:t>
+            </a:fld>
+            <a:endParaRPr lang="de-DE"/>
+          </a:p>
+        </p:txBody>
+      </p:sp>
+    </p:spTree>
+    <p:extLst>
+      <p:ext uri="{BB962C8B-B14F-4D97-AF65-F5344CB8AC3E}">
+        <p14:creationId xmlns:p14="http://schemas.microsoft.com/office/powerpoint/2010/main" val="3852857426"/>
+      </p:ext>
+    </p:extLst>
+  </p:cSld>
+  <p:clrMapOvr>
+    <a:masterClrMapping/>
+  </p:clrMapOvr>
+</p:notes>
+</file>
+
+<file path=ppt/notesSlides/notesSlide4.xml><?xml version="1.0" encoding="utf-8"?>
+<p:notes xmlns:a="http://schemas.openxmlformats.org/drawingml/2006/main" xmlns:r="http://schemas.openxmlformats.org/officeDocument/2006/relationships" xmlns:p="http://schemas.openxmlformats.org/presentationml/2006/main">
+  <p:cSld>
+    <p:spTree>
+      <p:nvGrpSpPr>
+        <p:cNvPr id="1" name=""/>
+        <p:cNvGrpSpPr/>
+        <p:nvPr/>
+      </p:nvGrpSpPr>
+      <p:grpSpPr>
+        <a:xfrm>
+          <a:off x="0" y="0"/>
+          <a:ext cx="0" cy="0"/>
+          <a:chOff x="0" y="0"/>
+          <a:chExt cx="0" cy="0"/>
+        </a:xfrm>
+      </p:grpSpPr>
+      <p:sp>
+        <p:nvSpPr>
+          <p:cNvPr id="2" name="Folienbildplatzhalter 1"/>
+          <p:cNvSpPr>
+            <a:spLocks noGrp="1" noRot="1" noChangeAspect="1"/>
+          </p:cNvSpPr>
+          <p:nvPr>
+            <p:ph type="sldImg"/>
+          </p:nvPr>
+        </p:nvSpPr>
+        <p:spPr/>
+      </p:sp>
+      <p:sp>
+        <p:nvSpPr>
+          <p:cNvPr id="3" name="Notizenplatzhalter 2"/>
+          <p:cNvSpPr>
+            <a:spLocks noGrp="1"/>
+          </p:cNvSpPr>
+          <p:nvPr>
+            <p:ph type="body" idx="1"/>
+          </p:nvPr>
+        </p:nvSpPr>
+        <p:spPr/>
+        <p:txBody>
+          <a:bodyPr/>
+          <a:lstStyle/>
+          <a:p>
+            <a:endParaRPr lang="de-DE"/>
+          </a:p>
+        </p:txBody>
+      </p:sp>
+      <p:sp>
+        <p:nvSpPr>
+          <p:cNvPr id="4" name="Foliennummernplatzhalter 3"/>
+          <p:cNvSpPr>
+            <a:spLocks noGrp="1"/>
+          </p:cNvSpPr>
+          <p:nvPr>
+            <p:ph type="sldNum" sz="quarter" idx="5"/>
+          </p:nvPr>
+        </p:nvSpPr>
+        <p:spPr/>
+        <p:txBody>
+          <a:bodyPr/>
+          <a:lstStyle/>
+          <a:p>
+            <a:fld id="{238902E6-424B-1C48-8D10-94E97A9F44CE}" type="slidenum">
+              <a:rPr lang="de-DE"/>
+              <a:t>4</a:t>
             </a:fld>
             <a:endParaRPr lang="de-DE"/>
           </a:p>
@@ -862,7 +947,7 @@
           <a:lstStyle/>
           <a:p>
             <a:fld id="{A813844F-FEE2-E341-B97B-DB0CD4D59B2D}" type="datetimeFigureOut">
-              <a:t>05.12.22</a:t>
+              <a:t>07.12.22</a:t>
             </a:fld>
             <a:endParaRPr lang="de-DE"/>
           </a:p>
@@ -1058,7 +1143,7 @@
           <a:lstStyle/>
           <a:p>
             <a:fld id="{A813844F-FEE2-E341-B97B-DB0CD4D59B2D}" type="datetimeFigureOut">
-              <a:t>05.12.22</a:t>
+              <a:t>07.12.22</a:t>
             </a:fld>
             <a:endParaRPr lang="de-DE"/>
           </a:p>
@@ -1264,7 +1349,7 @@
           <a:lstStyle/>
           <a:p>
             <a:fld id="{A813844F-FEE2-E341-B97B-DB0CD4D59B2D}" type="datetimeFigureOut">
-              <a:t>05.12.22</a:t>
+              <a:t>07.12.22</a:t>
             </a:fld>
             <a:endParaRPr lang="de-DE"/>
           </a:p>
@@ -1460,7 +1545,7 @@
           <a:lstStyle/>
           <a:p>
             <a:fld id="{A813844F-FEE2-E341-B97B-DB0CD4D59B2D}" type="datetimeFigureOut">
-              <a:t>05.12.22</a:t>
+              <a:t>07.12.22</a:t>
             </a:fld>
             <a:endParaRPr lang="de-DE"/>
           </a:p>
@@ -1733,7 +1818,7 @@
           <a:lstStyle/>
           <a:p>
             <a:fld id="{A813844F-FEE2-E341-B97B-DB0CD4D59B2D}" type="datetimeFigureOut">
-              <a:t>05.12.22</a:t>
+              <a:t>07.12.22</a:t>
             </a:fld>
             <a:endParaRPr lang="de-DE"/>
           </a:p>
@@ -1996,7 +2081,7 @@
           <a:lstStyle/>
           <a:p>
             <a:fld id="{A813844F-FEE2-E341-B97B-DB0CD4D59B2D}" type="datetimeFigureOut">
-              <a:t>05.12.22</a:t>
+              <a:t>07.12.22</a:t>
             </a:fld>
             <a:endParaRPr lang="de-DE"/>
           </a:p>
@@ -2406,7 +2491,7 @@
           <a:lstStyle/>
           <a:p>
             <a:fld id="{A813844F-FEE2-E341-B97B-DB0CD4D59B2D}" type="datetimeFigureOut">
-              <a:t>05.12.22</a:t>
+              <a:t>07.12.22</a:t>
             </a:fld>
             <a:endParaRPr lang="de-DE"/>
           </a:p>
@@ -2545,7 +2630,7 @@
           <a:lstStyle/>
           <a:p>
             <a:fld id="{A813844F-FEE2-E341-B97B-DB0CD4D59B2D}" type="datetimeFigureOut">
-              <a:t>05.12.22</a:t>
+              <a:t>07.12.22</a:t>
             </a:fld>
             <a:endParaRPr lang="de-DE"/>
           </a:p>
@@ -2656,7 +2741,7 @@
           <a:lstStyle/>
           <a:p>
             <a:fld id="{A813844F-FEE2-E341-B97B-DB0CD4D59B2D}" type="datetimeFigureOut">
-              <a:t>05.12.22</a:t>
+              <a:t>07.12.22</a:t>
             </a:fld>
             <a:endParaRPr lang="de-DE"/>
           </a:p>
@@ -2965,7 +3050,7 @@
           <a:lstStyle/>
           <a:p>
             <a:fld id="{A813844F-FEE2-E341-B97B-DB0CD4D59B2D}" type="datetimeFigureOut">
-              <a:t>05.12.22</a:t>
+              <a:t>07.12.22</a:t>
             </a:fld>
             <a:endParaRPr lang="de-DE"/>
           </a:p>
@@ -3251,7 +3336,7 @@
           <a:lstStyle/>
           <a:p>
             <a:fld id="{A813844F-FEE2-E341-B97B-DB0CD4D59B2D}" type="datetimeFigureOut">
-              <a:t>05.12.22</a:t>
+              <a:t>07.12.22</a:t>
             </a:fld>
             <a:endParaRPr lang="de-DE"/>
           </a:p>
@@ -3490,7 +3575,7 @@
           </a:lstStyle>
           <a:p>
             <a:fld id="{A813844F-FEE2-E341-B97B-DB0CD4D59B2D}" type="datetimeFigureOut">
-              <a:t>05.12.22</a:t>
+              <a:t>07.12.22</a:t>
             </a:fld>
             <a:endParaRPr lang="de-DE"/>
           </a:p>
@@ -3908,6 +3993,203 @@
       </p:grpSpPr>
       <p:pic>
         <p:nvPicPr>
+          <p:cNvPr id="9" name="Picture 4">
+            <a:extLst>
+              <a:ext uri="{FF2B5EF4-FFF2-40B4-BE49-F238E27FC236}">
+                <a16:creationId xmlns:a16="http://schemas.microsoft.com/office/drawing/2014/main" id="{07D7F670-F926-2FD7-C269-835E14C073E2}"/>
+              </a:ext>
+            </a:extLst>
+          </p:cNvPr>
+          <p:cNvPicPr>
+            <a:picLocks noChangeAspect="1" noChangeArrowheads="1"/>
+          </p:cNvPicPr>
+          <p:nvPr/>
+        </p:nvPicPr>
+        <p:blipFill>
+          <a:blip r:embed="rId3">
+            <a:extLst>
+              <a:ext uri="{28A0092B-C50C-407E-A947-70E740481C1C}">
+                <a14:useLocalDpi xmlns:a14="http://schemas.microsoft.com/office/drawing/2010/main" val="0"/>
+              </a:ext>
+            </a:extLst>
+          </a:blip>
+          <a:srcRect/>
+          <a:stretch>
+            <a:fillRect/>
+          </a:stretch>
+        </p:blipFill>
+        <p:spPr bwMode="auto">
+          <a:xfrm>
+            <a:off x="2150076" y="-2533"/>
+            <a:ext cx="7891848" cy="6863066"/>
+          </a:xfrm>
+          <a:prstGeom prst="rect">
+            <a:avLst/>
+          </a:prstGeom>
+          <a:noFill/>
+          <a:extLst>
+            <a:ext uri="{909E8E84-426E-40DD-AFC4-6F175D3DCCD1}">
+              <a14:hiddenFill xmlns:a14="http://schemas.microsoft.com/office/drawing/2010/main">
+                <a:solidFill>
+                  <a:srgbClr val="FFFFFF"/>
+                </a:solidFill>
+              </a14:hiddenFill>
+            </a:ext>
+          </a:extLst>
+        </p:spPr>
+      </p:pic>
+      <p:sp>
+        <p:nvSpPr>
+          <p:cNvPr id="8" name="Rechteck 7">
+            <a:extLst>
+              <a:ext uri="{FF2B5EF4-FFF2-40B4-BE49-F238E27FC236}">
+                <a16:creationId xmlns:a16="http://schemas.microsoft.com/office/drawing/2014/main" id="{5EB23FFE-8242-EECA-1A65-A980CE4751DA}"/>
+              </a:ext>
+            </a:extLst>
+          </p:cNvPr>
+          <p:cNvSpPr/>
+          <p:nvPr/>
+        </p:nvSpPr>
+        <p:spPr>
+          <a:xfrm>
+            <a:off x="9144000" y="172995"/>
+            <a:ext cx="939114" cy="5807675"/>
+          </a:xfrm>
+          <a:prstGeom prst="rect">
+            <a:avLst/>
+          </a:prstGeom>
+          <a:solidFill>
+            <a:schemeClr val="bg1"/>
+          </a:solidFill>
+          <a:ln>
+            <a:solidFill>
+              <a:schemeClr val="bg1"/>
+            </a:solidFill>
+          </a:ln>
+        </p:spPr>
+        <p:style>
+          <a:lnRef idx="2">
+            <a:schemeClr val="accent1">
+              <a:shade val="50000"/>
+            </a:schemeClr>
+          </a:lnRef>
+          <a:fillRef idx="1">
+            <a:schemeClr val="accent1"/>
+          </a:fillRef>
+          <a:effectRef idx="0">
+            <a:schemeClr val="accent1"/>
+          </a:effectRef>
+          <a:fontRef idx="minor">
+            <a:schemeClr val="lt1"/>
+          </a:fontRef>
+        </p:style>
+        <p:txBody>
+          <a:bodyPr rtlCol="0" anchor="ctr"/>
+          <a:lstStyle/>
+          <a:p>
+            <a:pPr algn="ctr"/>
+            <a:endParaRPr lang="de-DE"/>
+          </a:p>
+        </p:txBody>
+      </p:sp>
+      <p:pic>
+        <p:nvPicPr>
+          <p:cNvPr id="5" name="Grafik 4">
+            <a:extLst>
+              <a:ext uri="{FF2B5EF4-FFF2-40B4-BE49-F238E27FC236}">
+                <a16:creationId xmlns:a16="http://schemas.microsoft.com/office/drawing/2014/main" id="{7622D8FF-AC99-55C6-BCA6-FB132BCCBBA7}"/>
+              </a:ext>
+            </a:extLst>
+          </p:cNvPr>
+          <p:cNvPicPr>
+            <a:picLocks noChangeAspect="1"/>
+          </p:cNvPicPr>
+          <p:nvPr/>
+        </p:nvPicPr>
+        <p:blipFill>
+          <a:blip r:embed="rId4"/>
+          <a:stretch>
+            <a:fillRect/>
+          </a:stretch>
+        </p:blipFill>
+        <p:spPr>
+          <a:xfrm>
+            <a:off x="9488533" y="364045"/>
+            <a:ext cx="779777" cy="5182515"/>
+          </a:xfrm>
+          <a:prstGeom prst="rect">
+            <a:avLst/>
+          </a:prstGeom>
+        </p:spPr>
+      </p:pic>
+      <p:sp>
+        <p:nvSpPr>
+          <p:cNvPr id="4" name="Textfeld 3">
+            <a:extLst>
+              <a:ext uri="{FF2B5EF4-FFF2-40B4-BE49-F238E27FC236}">
+                <a16:creationId xmlns:a16="http://schemas.microsoft.com/office/drawing/2014/main" id="{40449692-859C-2835-F60E-A8B394F444F1}"/>
+              </a:ext>
+            </a:extLst>
+          </p:cNvPr>
+          <p:cNvSpPr txBox="1"/>
+          <p:nvPr/>
+        </p:nvSpPr>
+        <p:spPr>
+          <a:xfrm rot="16200000">
+            <a:off x="7765471" y="2891860"/>
+            <a:ext cx="3154256" cy="400110"/>
+          </a:xfrm>
+          <a:prstGeom prst="rect">
+            <a:avLst/>
+          </a:prstGeom>
+          <a:noFill/>
+        </p:spPr>
+        <p:txBody>
+          <a:bodyPr wrap="square" rtlCol="0">
+            <a:spAutoFit/>
+          </a:bodyPr>
+          <a:lstStyle/>
+          <a:p>
+            <a:pPr algn="ctr"/>
+            <a:r>
+              <a:rPr lang="de-DE" sz="2000"/>
+              <a:t>Correlation Coefficient</a:t>
+            </a:r>
+          </a:p>
+        </p:txBody>
+      </p:sp>
+    </p:spTree>
+    <p:extLst>
+      <p:ext uri="{BB962C8B-B14F-4D97-AF65-F5344CB8AC3E}">
+        <p14:creationId xmlns:p14="http://schemas.microsoft.com/office/powerpoint/2010/main" val="1527511105"/>
+      </p:ext>
+    </p:extLst>
+  </p:cSld>
+  <p:clrMapOvr>
+    <a:masterClrMapping/>
+  </p:clrMapOvr>
+</p:sld>
+</file>
+
+<file path=ppt/slides/slide2.xml><?xml version="1.0" encoding="utf-8"?>
+<p:sld xmlns:a="http://schemas.openxmlformats.org/drawingml/2006/main" xmlns:r="http://schemas.openxmlformats.org/officeDocument/2006/relationships" xmlns:p="http://schemas.openxmlformats.org/presentationml/2006/main">
+  <p:cSld>
+    <p:spTree>
+      <p:nvGrpSpPr>
+        <p:cNvPr id="1" name=""/>
+        <p:cNvGrpSpPr/>
+        <p:nvPr/>
+      </p:nvGrpSpPr>
+      <p:grpSpPr>
+        <a:xfrm>
+          <a:off x="0" y="0"/>
+          <a:ext cx="0" cy="0"/>
+          <a:chOff x="0" y="0"/>
+          <a:chExt cx="0" cy="0"/>
+        </a:xfrm>
+      </p:grpSpPr>
+      <p:pic>
+        <p:nvPicPr>
           <p:cNvPr id="1028" name="Picture 4">
             <a:extLst>
               <a:ext uri="{FF2B5EF4-FFF2-40B4-BE49-F238E27FC236}">
@@ -4100,7 +4382,7 @@
     </p:spTree>
     <p:extLst>
       <p:ext uri="{BB962C8B-B14F-4D97-AF65-F5344CB8AC3E}">
-        <p14:creationId xmlns:p14="http://schemas.microsoft.com/office/powerpoint/2010/main" val="1527511105"/>
+        <p14:creationId xmlns:p14="http://schemas.microsoft.com/office/powerpoint/2010/main" val="1045529663"/>
       </p:ext>
     </p:extLst>
   </p:cSld>
@@ -4110,7 +4392,7 @@
 </p:sld>
 </file>
 
-<file path=ppt/slides/slide2.xml><?xml version="1.0" encoding="utf-8"?>
+<file path=ppt/slides/slide3.xml><?xml version="1.0" encoding="utf-8"?>
 <p:sld xmlns:a="http://schemas.openxmlformats.org/drawingml/2006/main" xmlns:r="http://schemas.openxmlformats.org/officeDocument/2006/relationships" xmlns:p="http://schemas.openxmlformats.org/presentationml/2006/main">
   <p:cSld>
     <p:spTree>
@@ -4129,10 +4411,10 @@
       </p:grpSpPr>
       <p:pic>
         <p:nvPicPr>
-          <p:cNvPr id="3074" name="Picture 2">
-            <a:extLst>
-              <a:ext uri="{FF2B5EF4-FFF2-40B4-BE49-F238E27FC236}">
-                <a16:creationId xmlns:a16="http://schemas.microsoft.com/office/drawing/2014/main" id="{304E7797-C666-5664-5103-E6186A3EA9CC}"/>
+          <p:cNvPr id="2" name="Picture 2">
+            <a:extLst>
+              <a:ext uri="{FF2B5EF4-FFF2-40B4-BE49-F238E27FC236}">
+                <a16:creationId xmlns:a16="http://schemas.microsoft.com/office/drawing/2014/main" id="{8BBC3618-A151-4772-556A-369529627BC3}"/>
               </a:ext>
             </a:extLst>
           </p:cNvPr>
@@ -4156,8 +4438,8 @@
         </p:blipFill>
         <p:spPr bwMode="auto">
           <a:xfrm>
-            <a:off x="303354" y="1924050"/>
-            <a:ext cx="11353800" cy="3009900"/>
+            <a:off x="316054" y="1923617"/>
+            <a:ext cx="11341100" cy="2590800"/>
           </a:xfrm>
           <a:prstGeom prst="rect">
             <a:avLst/>
@@ -4188,7 +4470,7 @@
         </p:nvSpPr>
         <p:spPr>
           <a:xfrm>
-            <a:off x="5636871" y="4664597"/>
+            <a:off x="5636871" y="4269176"/>
             <a:ext cx="1551007" cy="532436"/>
           </a:xfrm>
           <a:prstGeom prst="rect">
@@ -4331,7 +4613,7 @@
         </p:nvSpPr>
         <p:spPr>
           <a:xfrm>
-            <a:off x="6179798" y="4511494"/>
+            <a:off x="6179798" y="4227288"/>
             <a:ext cx="2161812" cy="369332"/>
           </a:xfrm>
           <a:prstGeom prst="rect">
@@ -4366,7 +4648,7 @@
         </p:nvSpPr>
         <p:spPr>
           <a:xfrm rot="16200000">
-            <a:off x="10325561" y="2665912"/>
+            <a:off x="10325561" y="2455843"/>
             <a:ext cx="1280010" cy="584775"/>
           </a:xfrm>
           <a:prstGeom prst="rect">
@@ -4401,7 +4683,7 @@
 </p:sld>
 </file>
 
-<file path=ppt/slides/slide3.xml><?xml version="1.0" encoding="utf-8"?>
+<file path=ppt/slides/slide4.xml><?xml version="1.0" encoding="utf-8"?>
 <p:sld xmlns:a="http://schemas.openxmlformats.org/drawingml/2006/main" xmlns:r="http://schemas.openxmlformats.org/officeDocument/2006/relationships" xmlns:p="http://schemas.openxmlformats.org/presentationml/2006/main">
   <p:cSld>
     <p:spTree>

</xml_diff>

<commit_message>
Add notebook with (pairwise) statistics on CICMoD indices (#25)
</commit_message>
<xml_diff>
--- a/figures/combined_figures.pptx
+++ b/figures/combined_figures.pptx
@@ -5,12 +5,13 @@
     <p:sldMasterId id="2147483648" r:id="rId1"/>
   </p:sldMasterIdLst>
   <p:notesMasterIdLst>
-    <p:notesMasterId r:id="rId5"/>
+    <p:notesMasterId r:id="rId6"/>
   </p:notesMasterIdLst>
   <p:sldIdLst>
     <p:sldId id="256" r:id="rId2"/>
-    <p:sldId id="257" r:id="rId3"/>
-    <p:sldId id="258" r:id="rId4"/>
+    <p:sldId id="259" r:id="rId3"/>
+    <p:sldId id="257" r:id="rId4"/>
+    <p:sldId id="258" r:id="rId5"/>
   </p:sldIdLst>
   <p:sldSz cx="12192000" cy="6858000"/>
   <p:notesSz cx="6858000" cy="9144000"/>
@@ -198,7 +199,7 @@
           </a:lstStyle>
           <a:p>
             <a:fld id="{77F0B5B9-2F05-8040-835B-A9EE0944125F}" type="datetimeFigureOut">
-              <a:t>05.12.22</a:t>
+              <a:t>07.12.22</a:t>
             </a:fld>
             <a:endParaRPr lang="de-DE"/>
           </a:p>
@@ -622,7 +623,7 @@
     </p:spTree>
     <p:extLst>
       <p:ext uri="{BB962C8B-B14F-4D97-AF65-F5344CB8AC3E}">
-        <p14:creationId xmlns:p14="http://schemas.microsoft.com/office/powerpoint/2010/main" val="3852857426"/>
+        <p14:creationId xmlns:p14="http://schemas.microsoft.com/office/powerpoint/2010/main" val="63657794"/>
       </p:ext>
     </p:extLst>
   </p:cSld>
@@ -698,6 +699,90 @@
             <a:fld id="{238902E6-424B-1C48-8D10-94E97A9F44CE}" type="slidenum">
               <a:rPr lang="de-DE"/>
               <a:t>3</a:t>
+            </a:fld>
+            <a:endParaRPr lang="de-DE"/>
+          </a:p>
+        </p:txBody>
+      </p:sp>
+    </p:spTree>
+    <p:extLst>
+      <p:ext uri="{BB962C8B-B14F-4D97-AF65-F5344CB8AC3E}">
+        <p14:creationId xmlns:p14="http://schemas.microsoft.com/office/powerpoint/2010/main" val="3852857426"/>
+      </p:ext>
+    </p:extLst>
+  </p:cSld>
+  <p:clrMapOvr>
+    <a:masterClrMapping/>
+  </p:clrMapOvr>
+</p:notes>
+</file>
+
+<file path=ppt/notesSlides/notesSlide4.xml><?xml version="1.0" encoding="utf-8"?>
+<p:notes xmlns:a="http://schemas.openxmlformats.org/drawingml/2006/main" xmlns:r="http://schemas.openxmlformats.org/officeDocument/2006/relationships" xmlns:p="http://schemas.openxmlformats.org/presentationml/2006/main">
+  <p:cSld>
+    <p:spTree>
+      <p:nvGrpSpPr>
+        <p:cNvPr id="1" name=""/>
+        <p:cNvGrpSpPr/>
+        <p:nvPr/>
+      </p:nvGrpSpPr>
+      <p:grpSpPr>
+        <a:xfrm>
+          <a:off x="0" y="0"/>
+          <a:ext cx="0" cy="0"/>
+          <a:chOff x="0" y="0"/>
+          <a:chExt cx="0" cy="0"/>
+        </a:xfrm>
+      </p:grpSpPr>
+      <p:sp>
+        <p:nvSpPr>
+          <p:cNvPr id="2" name="Folienbildplatzhalter 1"/>
+          <p:cNvSpPr>
+            <a:spLocks noGrp="1" noRot="1" noChangeAspect="1"/>
+          </p:cNvSpPr>
+          <p:nvPr>
+            <p:ph type="sldImg"/>
+          </p:nvPr>
+        </p:nvSpPr>
+        <p:spPr/>
+      </p:sp>
+      <p:sp>
+        <p:nvSpPr>
+          <p:cNvPr id="3" name="Notizenplatzhalter 2"/>
+          <p:cNvSpPr>
+            <a:spLocks noGrp="1"/>
+          </p:cNvSpPr>
+          <p:nvPr>
+            <p:ph type="body" idx="1"/>
+          </p:nvPr>
+        </p:nvSpPr>
+        <p:spPr/>
+        <p:txBody>
+          <a:bodyPr/>
+          <a:lstStyle/>
+          <a:p>
+            <a:endParaRPr lang="de-DE"/>
+          </a:p>
+        </p:txBody>
+      </p:sp>
+      <p:sp>
+        <p:nvSpPr>
+          <p:cNvPr id="4" name="Foliennummernplatzhalter 3"/>
+          <p:cNvSpPr>
+            <a:spLocks noGrp="1"/>
+          </p:cNvSpPr>
+          <p:nvPr>
+            <p:ph type="sldNum" sz="quarter" idx="5"/>
+          </p:nvPr>
+        </p:nvSpPr>
+        <p:spPr/>
+        <p:txBody>
+          <a:bodyPr/>
+          <a:lstStyle/>
+          <a:p>
+            <a:fld id="{238902E6-424B-1C48-8D10-94E97A9F44CE}" type="slidenum">
+              <a:rPr lang="de-DE"/>
+              <a:t>4</a:t>
             </a:fld>
             <a:endParaRPr lang="de-DE"/>
           </a:p>
@@ -862,7 +947,7 @@
           <a:lstStyle/>
           <a:p>
             <a:fld id="{A813844F-FEE2-E341-B97B-DB0CD4D59B2D}" type="datetimeFigureOut">
-              <a:t>05.12.22</a:t>
+              <a:t>07.12.22</a:t>
             </a:fld>
             <a:endParaRPr lang="de-DE"/>
           </a:p>
@@ -1058,7 +1143,7 @@
           <a:lstStyle/>
           <a:p>
             <a:fld id="{A813844F-FEE2-E341-B97B-DB0CD4D59B2D}" type="datetimeFigureOut">
-              <a:t>05.12.22</a:t>
+              <a:t>07.12.22</a:t>
             </a:fld>
             <a:endParaRPr lang="de-DE"/>
           </a:p>
@@ -1264,7 +1349,7 @@
           <a:lstStyle/>
           <a:p>
             <a:fld id="{A813844F-FEE2-E341-B97B-DB0CD4D59B2D}" type="datetimeFigureOut">
-              <a:t>05.12.22</a:t>
+              <a:t>07.12.22</a:t>
             </a:fld>
             <a:endParaRPr lang="de-DE"/>
           </a:p>
@@ -1460,7 +1545,7 @@
           <a:lstStyle/>
           <a:p>
             <a:fld id="{A813844F-FEE2-E341-B97B-DB0CD4D59B2D}" type="datetimeFigureOut">
-              <a:t>05.12.22</a:t>
+              <a:t>07.12.22</a:t>
             </a:fld>
             <a:endParaRPr lang="de-DE"/>
           </a:p>
@@ -1733,7 +1818,7 @@
           <a:lstStyle/>
           <a:p>
             <a:fld id="{A813844F-FEE2-E341-B97B-DB0CD4D59B2D}" type="datetimeFigureOut">
-              <a:t>05.12.22</a:t>
+              <a:t>07.12.22</a:t>
             </a:fld>
             <a:endParaRPr lang="de-DE"/>
           </a:p>
@@ -1996,7 +2081,7 @@
           <a:lstStyle/>
           <a:p>
             <a:fld id="{A813844F-FEE2-E341-B97B-DB0CD4D59B2D}" type="datetimeFigureOut">
-              <a:t>05.12.22</a:t>
+              <a:t>07.12.22</a:t>
             </a:fld>
             <a:endParaRPr lang="de-DE"/>
           </a:p>
@@ -2406,7 +2491,7 @@
           <a:lstStyle/>
           <a:p>
             <a:fld id="{A813844F-FEE2-E341-B97B-DB0CD4D59B2D}" type="datetimeFigureOut">
-              <a:t>05.12.22</a:t>
+              <a:t>07.12.22</a:t>
             </a:fld>
             <a:endParaRPr lang="de-DE"/>
           </a:p>
@@ -2545,7 +2630,7 @@
           <a:lstStyle/>
           <a:p>
             <a:fld id="{A813844F-FEE2-E341-B97B-DB0CD4D59B2D}" type="datetimeFigureOut">
-              <a:t>05.12.22</a:t>
+              <a:t>07.12.22</a:t>
             </a:fld>
             <a:endParaRPr lang="de-DE"/>
           </a:p>
@@ -2656,7 +2741,7 @@
           <a:lstStyle/>
           <a:p>
             <a:fld id="{A813844F-FEE2-E341-B97B-DB0CD4D59B2D}" type="datetimeFigureOut">
-              <a:t>05.12.22</a:t>
+              <a:t>07.12.22</a:t>
             </a:fld>
             <a:endParaRPr lang="de-DE"/>
           </a:p>
@@ -2965,7 +3050,7 @@
           <a:lstStyle/>
           <a:p>
             <a:fld id="{A813844F-FEE2-E341-B97B-DB0CD4D59B2D}" type="datetimeFigureOut">
-              <a:t>05.12.22</a:t>
+              <a:t>07.12.22</a:t>
             </a:fld>
             <a:endParaRPr lang="de-DE"/>
           </a:p>
@@ -3251,7 +3336,7 @@
           <a:lstStyle/>
           <a:p>
             <a:fld id="{A813844F-FEE2-E341-B97B-DB0CD4D59B2D}" type="datetimeFigureOut">
-              <a:t>05.12.22</a:t>
+              <a:t>07.12.22</a:t>
             </a:fld>
             <a:endParaRPr lang="de-DE"/>
           </a:p>
@@ -3490,7 +3575,7 @@
           </a:lstStyle>
           <a:p>
             <a:fld id="{A813844F-FEE2-E341-B97B-DB0CD4D59B2D}" type="datetimeFigureOut">
-              <a:t>05.12.22</a:t>
+              <a:t>07.12.22</a:t>
             </a:fld>
             <a:endParaRPr lang="de-DE"/>
           </a:p>
@@ -3908,6 +3993,203 @@
       </p:grpSpPr>
       <p:pic>
         <p:nvPicPr>
+          <p:cNvPr id="9" name="Picture 4">
+            <a:extLst>
+              <a:ext uri="{FF2B5EF4-FFF2-40B4-BE49-F238E27FC236}">
+                <a16:creationId xmlns:a16="http://schemas.microsoft.com/office/drawing/2014/main" id="{07D7F670-F926-2FD7-C269-835E14C073E2}"/>
+              </a:ext>
+            </a:extLst>
+          </p:cNvPr>
+          <p:cNvPicPr>
+            <a:picLocks noChangeAspect="1" noChangeArrowheads="1"/>
+          </p:cNvPicPr>
+          <p:nvPr/>
+        </p:nvPicPr>
+        <p:blipFill>
+          <a:blip r:embed="rId3">
+            <a:extLst>
+              <a:ext uri="{28A0092B-C50C-407E-A947-70E740481C1C}">
+                <a14:useLocalDpi xmlns:a14="http://schemas.microsoft.com/office/drawing/2010/main" val="0"/>
+              </a:ext>
+            </a:extLst>
+          </a:blip>
+          <a:srcRect/>
+          <a:stretch>
+            <a:fillRect/>
+          </a:stretch>
+        </p:blipFill>
+        <p:spPr bwMode="auto">
+          <a:xfrm>
+            <a:off x="2150076" y="-2533"/>
+            <a:ext cx="7891848" cy="6863066"/>
+          </a:xfrm>
+          <a:prstGeom prst="rect">
+            <a:avLst/>
+          </a:prstGeom>
+          <a:noFill/>
+          <a:extLst>
+            <a:ext uri="{909E8E84-426E-40DD-AFC4-6F175D3DCCD1}">
+              <a14:hiddenFill xmlns:a14="http://schemas.microsoft.com/office/drawing/2010/main">
+                <a:solidFill>
+                  <a:srgbClr val="FFFFFF"/>
+                </a:solidFill>
+              </a14:hiddenFill>
+            </a:ext>
+          </a:extLst>
+        </p:spPr>
+      </p:pic>
+      <p:sp>
+        <p:nvSpPr>
+          <p:cNvPr id="8" name="Rechteck 7">
+            <a:extLst>
+              <a:ext uri="{FF2B5EF4-FFF2-40B4-BE49-F238E27FC236}">
+                <a16:creationId xmlns:a16="http://schemas.microsoft.com/office/drawing/2014/main" id="{5EB23FFE-8242-EECA-1A65-A980CE4751DA}"/>
+              </a:ext>
+            </a:extLst>
+          </p:cNvPr>
+          <p:cNvSpPr/>
+          <p:nvPr/>
+        </p:nvSpPr>
+        <p:spPr>
+          <a:xfrm>
+            <a:off x="9144000" y="172995"/>
+            <a:ext cx="939114" cy="5807675"/>
+          </a:xfrm>
+          <a:prstGeom prst="rect">
+            <a:avLst/>
+          </a:prstGeom>
+          <a:solidFill>
+            <a:schemeClr val="bg1"/>
+          </a:solidFill>
+          <a:ln>
+            <a:solidFill>
+              <a:schemeClr val="bg1"/>
+            </a:solidFill>
+          </a:ln>
+        </p:spPr>
+        <p:style>
+          <a:lnRef idx="2">
+            <a:schemeClr val="accent1">
+              <a:shade val="50000"/>
+            </a:schemeClr>
+          </a:lnRef>
+          <a:fillRef idx="1">
+            <a:schemeClr val="accent1"/>
+          </a:fillRef>
+          <a:effectRef idx="0">
+            <a:schemeClr val="accent1"/>
+          </a:effectRef>
+          <a:fontRef idx="minor">
+            <a:schemeClr val="lt1"/>
+          </a:fontRef>
+        </p:style>
+        <p:txBody>
+          <a:bodyPr rtlCol="0" anchor="ctr"/>
+          <a:lstStyle/>
+          <a:p>
+            <a:pPr algn="ctr"/>
+            <a:endParaRPr lang="de-DE"/>
+          </a:p>
+        </p:txBody>
+      </p:sp>
+      <p:pic>
+        <p:nvPicPr>
+          <p:cNvPr id="5" name="Grafik 4">
+            <a:extLst>
+              <a:ext uri="{FF2B5EF4-FFF2-40B4-BE49-F238E27FC236}">
+                <a16:creationId xmlns:a16="http://schemas.microsoft.com/office/drawing/2014/main" id="{7622D8FF-AC99-55C6-BCA6-FB132BCCBBA7}"/>
+              </a:ext>
+            </a:extLst>
+          </p:cNvPr>
+          <p:cNvPicPr>
+            <a:picLocks noChangeAspect="1"/>
+          </p:cNvPicPr>
+          <p:nvPr/>
+        </p:nvPicPr>
+        <p:blipFill>
+          <a:blip r:embed="rId4"/>
+          <a:stretch>
+            <a:fillRect/>
+          </a:stretch>
+        </p:blipFill>
+        <p:spPr>
+          <a:xfrm>
+            <a:off x="9488533" y="364045"/>
+            <a:ext cx="779777" cy="5182515"/>
+          </a:xfrm>
+          <a:prstGeom prst="rect">
+            <a:avLst/>
+          </a:prstGeom>
+        </p:spPr>
+      </p:pic>
+      <p:sp>
+        <p:nvSpPr>
+          <p:cNvPr id="4" name="Textfeld 3">
+            <a:extLst>
+              <a:ext uri="{FF2B5EF4-FFF2-40B4-BE49-F238E27FC236}">
+                <a16:creationId xmlns:a16="http://schemas.microsoft.com/office/drawing/2014/main" id="{40449692-859C-2835-F60E-A8B394F444F1}"/>
+              </a:ext>
+            </a:extLst>
+          </p:cNvPr>
+          <p:cNvSpPr txBox="1"/>
+          <p:nvPr/>
+        </p:nvSpPr>
+        <p:spPr>
+          <a:xfrm rot="16200000">
+            <a:off x="7765471" y="2891860"/>
+            <a:ext cx="3154256" cy="400110"/>
+          </a:xfrm>
+          <a:prstGeom prst="rect">
+            <a:avLst/>
+          </a:prstGeom>
+          <a:noFill/>
+        </p:spPr>
+        <p:txBody>
+          <a:bodyPr wrap="square" rtlCol="0">
+            <a:spAutoFit/>
+          </a:bodyPr>
+          <a:lstStyle/>
+          <a:p>
+            <a:pPr algn="ctr"/>
+            <a:r>
+              <a:rPr lang="de-DE" sz="2000"/>
+              <a:t>Correlation Coefficient</a:t>
+            </a:r>
+          </a:p>
+        </p:txBody>
+      </p:sp>
+    </p:spTree>
+    <p:extLst>
+      <p:ext uri="{BB962C8B-B14F-4D97-AF65-F5344CB8AC3E}">
+        <p14:creationId xmlns:p14="http://schemas.microsoft.com/office/powerpoint/2010/main" val="1527511105"/>
+      </p:ext>
+    </p:extLst>
+  </p:cSld>
+  <p:clrMapOvr>
+    <a:masterClrMapping/>
+  </p:clrMapOvr>
+</p:sld>
+</file>
+
+<file path=ppt/slides/slide2.xml><?xml version="1.0" encoding="utf-8"?>
+<p:sld xmlns:a="http://schemas.openxmlformats.org/drawingml/2006/main" xmlns:r="http://schemas.openxmlformats.org/officeDocument/2006/relationships" xmlns:p="http://schemas.openxmlformats.org/presentationml/2006/main">
+  <p:cSld>
+    <p:spTree>
+      <p:nvGrpSpPr>
+        <p:cNvPr id="1" name=""/>
+        <p:cNvGrpSpPr/>
+        <p:nvPr/>
+      </p:nvGrpSpPr>
+      <p:grpSpPr>
+        <a:xfrm>
+          <a:off x="0" y="0"/>
+          <a:ext cx="0" cy="0"/>
+          <a:chOff x="0" y="0"/>
+          <a:chExt cx="0" cy="0"/>
+        </a:xfrm>
+      </p:grpSpPr>
+      <p:pic>
+        <p:nvPicPr>
           <p:cNvPr id="1028" name="Picture 4">
             <a:extLst>
               <a:ext uri="{FF2B5EF4-FFF2-40B4-BE49-F238E27FC236}">
@@ -4100,7 +4382,7 @@
     </p:spTree>
     <p:extLst>
       <p:ext uri="{BB962C8B-B14F-4D97-AF65-F5344CB8AC3E}">
-        <p14:creationId xmlns:p14="http://schemas.microsoft.com/office/powerpoint/2010/main" val="1527511105"/>
+        <p14:creationId xmlns:p14="http://schemas.microsoft.com/office/powerpoint/2010/main" val="1045529663"/>
       </p:ext>
     </p:extLst>
   </p:cSld>
@@ -4110,7 +4392,7 @@
 </p:sld>
 </file>
 
-<file path=ppt/slides/slide2.xml><?xml version="1.0" encoding="utf-8"?>
+<file path=ppt/slides/slide3.xml><?xml version="1.0" encoding="utf-8"?>
 <p:sld xmlns:a="http://schemas.openxmlformats.org/drawingml/2006/main" xmlns:r="http://schemas.openxmlformats.org/officeDocument/2006/relationships" xmlns:p="http://schemas.openxmlformats.org/presentationml/2006/main">
   <p:cSld>
     <p:spTree>
@@ -4129,10 +4411,10 @@
       </p:grpSpPr>
       <p:pic>
         <p:nvPicPr>
-          <p:cNvPr id="3074" name="Picture 2">
-            <a:extLst>
-              <a:ext uri="{FF2B5EF4-FFF2-40B4-BE49-F238E27FC236}">
-                <a16:creationId xmlns:a16="http://schemas.microsoft.com/office/drawing/2014/main" id="{304E7797-C666-5664-5103-E6186A3EA9CC}"/>
+          <p:cNvPr id="2" name="Picture 2">
+            <a:extLst>
+              <a:ext uri="{FF2B5EF4-FFF2-40B4-BE49-F238E27FC236}">
+                <a16:creationId xmlns:a16="http://schemas.microsoft.com/office/drawing/2014/main" id="{8BBC3618-A151-4772-556A-369529627BC3}"/>
               </a:ext>
             </a:extLst>
           </p:cNvPr>
@@ -4156,8 +4438,8 @@
         </p:blipFill>
         <p:spPr bwMode="auto">
           <a:xfrm>
-            <a:off x="303354" y="1924050"/>
-            <a:ext cx="11353800" cy="3009900"/>
+            <a:off x="316054" y="1923617"/>
+            <a:ext cx="11341100" cy="2590800"/>
           </a:xfrm>
           <a:prstGeom prst="rect">
             <a:avLst/>
@@ -4188,7 +4470,7 @@
         </p:nvSpPr>
         <p:spPr>
           <a:xfrm>
-            <a:off x="5636871" y="4664597"/>
+            <a:off x="5636871" y="4269176"/>
             <a:ext cx="1551007" cy="532436"/>
           </a:xfrm>
           <a:prstGeom prst="rect">
@@ -4331,7 +4613,7 @@
         </p:nvSpPr>
         <p:spPr>
           <a:xfrm>
-            <a:off x="6179798" y="4511494"/>
+            <a:off x="6179798" y="4227288"/>
             <a:ext cx="2161812" cy="369332"/>
           </a:xfrm>
           <a:prstGeom prst="rect">
@@ -4366,7 +4648,7 @@
         </p:nvSpPr>
         <p:spPr>
           <a:xfrm rot="16200000">
-            <a:off x="10325561" y="2665912"/>
+            <a:off x="10325561" y="2455843"/>
             <a:ext cx="1280010" cy="584775"/>
           </a:xfrm>
           <a:prstGeom prst="rect">
@@ -4401,7 +4683,7 @@
 </p:sld>
 </file>
 
-<file path=ppt/slides/slide3.xml><?xml version="1.0" encoding="utf-8"?>
+<file path=ppt/slides/slide4.xml><?xml version="1.0" encoding="utf-8"?>
 <p:sld xmlns:a="http://schemas.openxmlformats.org/drawingml/2006/main" xmlns:r="http://schemas.openxmlformats.org/officeDocument/2006/relationships" xmlns:p="http://schemas.openxmlformats.org/presentationml/2006/main">
   <p:cSld>
     <p:spTree>

</xml_diff>

<commit_message>
Update release number in data loading
</commit_message>
<xml_diff>
--- a/figures/combined_figures.pptx
+++ b/figures/combined_figures.pptx
@@ -204,7 +204,7 @@
           </a:lstStyle>
           <a:p>
             <a:fld id="{77F0B5B9-2F05-8040-835B-A9EE0944125F}" type="datetimeFigureOut">
-              <a:t>13.12.22</a:t>
+              <a:t>14.12.22</a:t>
             </a:fld>
             <a:endParaRPr lang="de-DE"/>
           </a:p>
@@ -1372,7 +1372,7 @@
           <a:lstStyle/>
           <a:p>
             <a:fld id="{A813844F-FEE2-E341-B97B-DB0CD4D59B2D}" type="datetimeFigureOut">
-              <a:t>13.12.22</a:t>
+              <a:t>14.12.22</a:t>
             </a:fld>
             <a:endParaRPr lang="de-DE"/>
           </a:p>
@@ -1568,7 +1568,7 @@
           <a:lstStyle/>
           <a:p>
             <a:fld id="{A813844F-FEE2-E341-B97B-DB0CD4D59B2D}" type="datetimeFigureOut">
-              <a:t>13.12.22</a:t>
+              <a:t>14.12.22</a:t>
             </a:fld>
             <a:endParaRPr lang="de-DE"/>
           </a:p>
@@ -1774,7 +1774,7 @@
           <a:lstStyle/>
           <a:p>
             <a:fld id="{A813844F-FEE2-E341-B97B-DB0CD4D59B2D}" type="datetimeFigureOut">
-              <a:t>13.12.22</a:t>
+              <a:t>14.12.22</a:t>
             </a:fld>
             <a:endParaRPr lang="de-DE"/>
           </a:p>
@@ -1970,7 +1970,7 @@
           <a:lstStyle/>
           <a:p>
             <a:fld id="{A813844F-FEE2-E341-B97B-DB0CD4D59B2D}" type="datetimeFigureOut">
-              <a:t>13.12.22</a:t>
+              <a:t>14.12.22</a:t>
             </a:fld>
             <a:endParaRPr lang="de-DE"/>
           </a:p>
@@ -2243,7 +2243,7 @@
           <a:lstStyle/>
           <a:p>
             <a:fld id="{A813844F-FEE2-E341-B97B-DB0CD4D59B2D}" type="datetimeFigureOut">
-              <a:t>13.12.22</a:t>
+              <a:t>14.12.22</a:t>
             </a:fld>
             <a:endParaRPr lang="de-DE"/>
           </a:p>
@@ -2506,7 +2506,7 @@
           <a:lstStyle/>
           <a:p>
             <a:fld id="{A813844F-FEE2-E341-B97B-DB0CD4D59B2D}" type="datetimeFigureOut">
-              <a:t>13.12.22</a:t>
+              <a:t>14.12.22</a:t>
             </a:fld>
             <a:endParaRPr lang="de-DE"/>
           </a:p>
@@ -2916,7 +2916,7 @@
           <a:lstStyle/>
           <a:p>
             <a:fld id="{A813844F-FEE2-E341-B97B-DB0CD4D59B2D}" type="datetimeFigureOut">
-              <a:t>13.12.22</a:t>
+              <a:t>14.12.22</a:t>
             </a:fld>
             <a:endParaRPr lang="de-DE"/>
           </a:p>
@@ -3055,7 +3055,7 @@
           <a:lstStyle/>
           <a:p>
             <a:fld id="{A813844F-FEE2-E341-B97B-DB0CD4D59B2D}" type="datetimeFigureOut">
-              <a:t>13.12.22</a:t>
+              <a:t>14.12.22</a:t>
             </a:fld>
             <a:endParaRPr lang="de-DE"/>
           </a:p>
@@ -3166,7 +3166,7 @@
           <a:lstStyle/>
           <a:p>
             <a:fld id="{A813844F-FEE2-E341-B97B-DB0CD4D59B2D}" type="datetimeFigureOut">
-              <a:t>13.12.22</a:t>
+              <a:t>14.12.22</a:t>
             </a:fld>
             <a:endParaRPr lang="de-DE"/>
           </a:p>
@@ -3475,7 +3475,7 @@
           <a:lstStyle/>
           <a:p>
             <a:fld id="{A813844F-FEE2-E341-B97B-DB0CD4D59B2D}" type="datetimeFigureOut">
-              <a:t>13.12.22</a:t>
+              <a:t>14.12.22</a:t>
             </a:fld>
             <a:endParaRPr lang="de-DE"/>
           </a:p>
@@ -3761,7 +3761,7 @@
           <a:lstStyle/>
           <a:p>
             <a:fld id="{A813844F-FEE2-E341-B97B-DB0CD4D59B2D}" type="datetimeFigureOut">
-              <a:t>13.12.22</a:t>
+              <a:t>14.12.22</a:t>
             </a:fld>
             <a:endParaRPr lang="de-DE"/>
           </a:p>
@@ -4000,7 +4000,7 @@
           </a:lstStyle>
           <a:p>
             <a:fld id="{A813844F-FEE2-E341-B97B-DB0CD4D59B2D}" type="datetimeFigureOut">
-              <a:t>13.12.22</a:t>
+              <a:t>14.12.22</a:t>
             </a:fld>
             <a:endParaRPr lang="de-DE"/>
           </a:p>
@@ -6482,64 +6482,143 @@
       </p:grpSpPr>
       <p:pic>
         <p:nvPicPr>
-          <p:cNvPr id="10" name="Grafik 9">
-            <a:extLst>
-              <a:ext uri="{FF2B5EF4-FFF2-40B4-BE49-F238E27FC236}">
-                <a16:creationId xmlns:a16="http://schemas.microsoft.com/office/drawing/2014/main" id="{D4851332-A506-3EE7-E3CF-32FBE6507D08}"/>
+          <p:cNvPr id="1028" name="Picture 4">
+            <a:extLst>
+              <a:ext uri="{FF2B5EF4-FFF2-40B4-BE49-F238E27FC236}">
+                <a16:creationId xmlns:a16="http://schemas.microsoft.com/office/drawing/2014/main" id="{F0CBFD18-436B-16E8-66AD-612BCB473E7B}"/>
               </a:ext>
             </a:extLst>
           </p:cNvPr>
           <p:cNvPicPr>
-            <a:picLocks noChangeAspect="1"/>
+            <a:picLocks noChangeAspect="1" noChangeArrowheads="1"/>
           </p:cNvPicPr>
           <p:nvPr/>
         </p:nvPicPr>
         <p:blipFill>
-          <a:blip r:embed="rId3"/>
+          <a:blip r:embed="rId3">
+            <a:extLst>
+              <a:ext uri="{28A0092B-C50C-407E-A947-70E740481C1C}">
+                <a14:useLocalDpi xmlns:a14="http://schemas.microsoft.com/office/drawing/2010/main" val="0"/>
+              </a:ext>
+            </a:extLst>
+          </a:blip>
+          <a:srcRect/>
           <a:stretch>
             <a:fillRect/>
           </a:stretch>
         </p:blipFill>
-        <p:spPr>
+        <p:spPr bwMode="auto">
           <a:xfrm>
-            <a:off x="4149295" y="1308100"/>
-            <a:ext cx="3695700" cy="2120900"/>
+            <a:off x="2961217" y="939800"/>
+            <a:ext cx="5067300" cy="4978400"/>
           </a:xfrm>
           <a:prstGeom prst="rect">
             <a:avLst/>
           </a:prstGeom>
+          <a:noFill/>
+          <a:extLst>
+            <a:ext uri="{909E8E84-426E-40DD-AFC4-6F175D3DCCD1}">
+              <a14:hiddenFill xmlns:a14="http://schemas.microsoft.com/office/drawing/2010/main">
+                <a:solidFill>
+                  <a:srgbClr val="FFFFFF"/>
+                </a:solidFill>
+              </a14:hiddenFill>
+            </a:ext>
+          </a:extLst>
         </p:spPr>
       </p:pic>
-      <p:pic>
-        <p:nvPicPr>
-          <p:cNvPr id="11" name="Grafik 10">
-            <a:extLst>
-              <a:ext uri="{FF2B5EF4-FFF2-40B4-BE49-F238E27FC236}">
-                <a16:creationId xmlns:a16="http://schemas.microsoft.com/office/drawing/2014/main" id="{25D06AE9-07B8-7768-B1D7-1E93F7FC9EB0}"/>
-              </a:ext>
-            </a:extLst>
-          </p:cNvPr>
-          <p:cNvPicPr>
-            <a:picLocks noChangeAspect="1"/>
-          </p:cNvPicPr>
+      <p:sp>
+        <p:nvSpPr>
+          <p:cNvPr id="2" name="Textfeld 1">
+            <a:extLst>
+              <a:ext uri="{FF2B5EF4-FFF2-40B4-BE49-F238E27FC236}">
+                <a16:creationId xmlns:a16="http://schemas.microsoft.com/office/drawing/2014/main" id="{C8CACCBA-630B-624E-8108-6AB3F85F1553}"/>
+              </a:ext>
+            </a:extLst>
+          </p:cNvPr>
+          <p:cNvSpPr txBox="1"/>
           <p:nvPr/>
-        </p:nvPicPr>
-        <p:blipFill>
-          <a:blip r:embed="rId4"/>
-          <a:stretch>
-            <a:fillRect/>
-          </a:stretch>
-        </p:blipFill>
+        </p:nvSpPr>
         <p:spPr>
           <a:xfrm>
-            <a:off x="4149295" y="3429000"/>
-            <a:ext cx="3695700" cy="2120900"/>
+            <a:off x="6470946" y="1250803"/>
+            <a:ext cx="1346886" cy="307777"/>
           </a:xfrm>
           <a:prstGeom prst="rect">
             <a:avLst/>
           </a:prstGeom>
-        </p:spPr>
-      </p:pic>
+          <a:solidFill>
+            <a:schemeClr val="bg1">
+              <a:lumMod val="85000"/>
+            </a:schemeClr>
+          </a:solidFill>
+          <a:ln>
+            <a:noFill/>
+          </a:ln>
+        </p:spPr>
+        <p:txBody>
+          <a:bodyPr wrap="square" rtlCol="0">
+            <a:spAutoFit/>
+          </a:bodyPr>
+          <a:lstStyle/>
+          <a:p>
+            <a:pPr algn="r"/>
+            <a:r>
+              <a:rPr lang="de-DE" sz="1400">
+                <a:latin typeface="Arial" panose="020B0604020202020204" pitchFamily="34" charset="0"/>
+                <a:cs typeface="Arial" panose="020B0604020202020204" pitchFamily="34" charset="0"/>
+              </a:rPr>
+              <a:t>current phase</a:t>
+            </a:r>
+          </a:p>
+        </p:txBody>
+      </p:sp>
+      <p:sp>
+        <p:nvSpPr>
+          <p:cNvPr id="3" name="Textfeld 2">
+            <a:extLst>
+              <a:ext uri="{FF2B5EF4-FFF2-40B4-BE49-F238E27FC236}">
+                <a16:creationId xmlns:a16="http://schemas.microsoft.com/office/drawing/2014/main" id="{761261D5-8606-C19A-C88C-C1A6786E4EAC}"/>
+              </a:ext>
+            </a:extLst>
+          </p:cNvPr>
+          <p:cNvSpPr txBox="1"/>
+          <p:nvPr/>
+        </p:nvSpPr>
+        <p:spPr>
+          <a:xfrm>
+            <a:off x="5704932" y="3514808"/>
+            <a:ext cx="2112900" cy="307777"/>
+          </a:xfrm>
+          <a:prstGeom prst="rect">
+            <a:avLst/>
+          </a:prstGeom>
+          <a:solidFill>
+            <a:schemeClr val="bg1">
+              <a:lumMod val="85000"/>
+            </a:schemeClr>
+          </a:solidFill>
+          <a:ln>
+            <a:noFill/>
+          </a:ln>
+        </p:spPr>
+        <p:txBody>
+          <a:bodyPr wrap="square" rtlCol="0">
+            <a:spAutoFit/>
+          </a:bodyPr>
+          <a:lstStyle/>
+          <a:p>
+            <a:pPr algn="r"/>
+            <a:r>
+              <a:rPr lang="de-DE" sz="1400">
+                <a:latin typeface="Arial" panose="020B0604020202020204" pitchFamily="34" charset="0"/>
+                <a:cs typeface="Arial" panose="020B0604020202020204" pitchFamily="34" charset="0"/>
+              </a:rPr>
+              <a:t>6 months into the future</a:t>
+            </a:r>
+          </a:p>
+        </p:txBody>
+      </p:sp>
     </p:spTree>
     <p:extLst>
       <p:ext uri="{BB962C8B-B14F-4D97-AF65-F5344CB8AC3E}">

</xml_diff>

<commit_message>
Update figures with data from current csv output
</commit_message>
<xml_diff>
--- a/figures/combined_figures.pptx
+++ b/figures/combined_figures.pptx
@@ -5,18 +5,20 @@
     <p:sldMasterId id="2147483648" r:id="rId1"/>
   </p:sldMasterIdLst>
   <p:notesMasterIdLst>
-    <p:notesMasterId r:id="rId11"/>
+    <p:notesMasterId r:id="rId13"/>
   </p:notesMasterIdLst>
   <p:sldIdLst>
     <p:sldId id="256" r:id="rId2"/>
     <p:sldId id="263" r:id="rId3"/>
-    <p:sldId id="259" r:id="rId4"/>
-    <p:sldId id="260" r:id="rId5"/>
-    <p:sldId id="257" r:id="rId6"/>
-    <p:sldId id="264" r:id="rId7"/>
-    <p:sldId id="258" r:id="rId8"/>
-    <p:sldId id="261" r:id="rId9"/>
-    <p:sldId id="262" r:id="rId10"/>
+    <p:sldId id="265" r:id="rId4"/>
+    <p:sldId id="259" r:id="rId5"/>
+    <p:sldId id="260" r:id="rId6"/>
+    <p:sldId id="257" r:id="rId7"/>
+    <p:sldId id="264" r:id="rId8"/>
+    <p:sldId id="258" r:id="rId9"/>
+    <p:sldId id="266" r:id="rId10"/>
+    <p:sldId id="261" r:id="rId11"/>
+    <p:sldId id="262" r:id="rId12"/>
   </p:sldIdLst>
   <p:sldSz cx="12192000" cy="6858000"/>
   <p:notesSz cx="6858000" cy="9144000"/>
@@ -204,7 +206,7 @@
           </a:lstStyle>
           <a:p>
             <a:fld id="{77F0B5B9-2F05-8040-835B-A9EE0944125F}" type="datetimeFigureOut">
-              <a:t>14.12.22</a:t>
+              <a:t>27.03.23</a:t>
             </a:fld>
             <a:endParaRPr lang="de-DE"/>
           </a:p>
@@ -554,6 +556,174 @@
 </p:notes>
 </file>
 
+<file path=ppt/notesSlides/notesSlide10.xml><?xml version="1.0" encoding="utf-8"?>
+<p:notes xmlns:a="http://schemas.openxmlformats.org/drawingml/2006/main" xmlns:r="http://schemas.openxmlformats.org/officeDocument/2006/relationships" xmlns:p="http://schemas.openxmlformats.org/presentationml/2006/main">
+  <p:cSld>
+    <p:spTree>
+      <p:nvGrpSpPr>
+        <p:cNvPr id="1" name=""/>
+        <p:cNvGrpSpPr/>
+        <p:nvPr/>
+      </p:nvGrpSpPr>
+      <p:grpSpPr>
+        <a:xfrm>
+          <a:off x="0" y="0"/>
+          <a:ext cx="0" cy="0"/>
+          <a:chOff x="0" y="0"/>
+          <a:chExt cx="0" cy="0"/>
+        </a:xfrm>
+      </p:grpSpPr>
+      <p:sp>
+        <p:nvSpPr>
+          <p:cNvPr id="2" name="Folienbildplatzhalter 1"/>
+          <p:cNvSpPr>
+            <a:spLocks noGrp="1" noRot="1" noChangeAspect="1"/>
+          </p:cNvSpPr>
+          <p:nvPr>
+            <p:ph type="sldImg"/>
+          </p:nvPr>
+        </p:nvSpPr>
+        <p:spPr/>
+      </p:sp>
+      <p:sp>
+        <p:nvSpPr>
+          <p:cNvPr id="3" name="Notizenplatzhalter 2"/>
+          <p:cNvSpPr>
+            <a:spLocks noGrp="1"/>
+          </p:cNvSpPr>
+          <p:nvPr>
+            <p:ph type="body" idx="1"/>
+          </p:nvPr>
+        </p:nvSpPr>
+        <p:spPr/>
+        <p:txBody>
+          <a:bodyPr/>
+          <a:lstStyle/>
+          <a:p>
+            <a:endParaRPr lang="de-DE"/>
+          </a:p>
+        </p:txBody>
+      </p:sp>
+      <p:sp>
+        <p:nvSpPr>
+          <p:cNvPr id="4" name="Foliennummernplatzhalter 3"/>
+          <p:cNvSpPr>
+            <a:spLocks noGrp="1"/>
+          </p:cNvSpPr>
+          <p:nvPr>
+            <p:ph type="sldNum" sz="quarter" idx="5"/>
+          </p:nvPr>
+        </p:nvSpPr>
+        <p:spPr/>
+        <p:txBody>
+          <a:bodyPr/>
+          <a:lstStyle/>
+          <a:p>
+            <a:fld id="{238902E6-424B-1C48-8D10-94E97A9F44CE}" type="slidenum">
+              <a:rPr lang="de-DE"/>
+              <a:t>10</a:t>
+            </a:fld>
+            <a:endParaRPr lang="de-DE"/>
+          </a:p>
+        </p:txBody>
+      </p:sp>
+    </p:spTree>
+    <p:extLst>
+      <p:ext uri="{BB962C8B-B14F-4D97-AF65-F5344CB8AC3E}">
+        <p14:creationId xmlns:p14="http://schemas.microsoft.com/office/powerpoint/2010/main" val="649238304"/>
+      </p:ext>
+    </p:extLst>
+  </p:cSld>
+  <p:clrMapOvr>
+    <a:masterClrMapping/>
+  </p:clrMapOvr>
+</p:notes>
+</file>
+
+<file path=ppt/notesSlides/notesSlide11.xml><?xml version="1.0" encoding="utf-8"?>
+<p:notes xmlns:a="http://schemas.openxmlformats.org/drawingml/2006/main" xmlns:r="http://schemas.openxmlformats.org/officeDocument/2006/relationships" xmlns:p="http://schemas.openxmlformats.org/presentationml/2006/main">
+  <p:cSld>
+    <p:spTree>
+      <p:nvGrpSpPr>
+        <p:cNvPr id="1" name=""/>
+        <p:cNvGrpSpPr/>
+        <p:nvPr/>
+      </p:nvGrpSpPr>
+      <p:grpSpPr>
+        <a:xfrm>
+          <a:off x="0" y="0"/>
+          <a:ext cx="0" cy="0"/>
+          <a:chOff x="0" y="0"/>
+          <a:chExt cx="0" cy="0"/>
+        </a:xfrm>
+      </p:grpSpPr>
+      <p:sp>
+        <p:nvSpPr>
+          <p:cNvPr id="2" name="Folienbildplatzhalter 1"/>
+          <p:cNvSpPr>
+            <a:spLocks noGrp="1" noRot="1" noChangeAspect="1"/>
+          </p:cNvSpPr>
+          <p:nvPr>
+            <p:ph type="sldImg"/>
+          </p:nvPr>
+        </p:nvSpPr>
+        <p:spPr/>
+      </p:sp>
+      <p:sp>
+        <p:nvSpPr>
+          <p:cNvPr id="3" name="Notizenplatzhalter 2"/>
+          <p:cNvSpPr>
+            <a:spLocks noGrp="1"/>
+          </p:cNvSpPr>
+          <p:nvPr>
+            <p:ph type="body" idx="1"/>
+          </p:nvPr>
+        </p:nvSpPr>
+        <p:spPr/>
+        <p:txBody>
+          <a:bodyPr/>
+          <a:lstStyle/>
+          <a:p>
+            <a:endParaRPr lang="de-DE"/>
+          </a:p>
+        </p:txBody>
+      </p:sp>
+      <p:sp>
+        <p:nvSpPr>
+          <p:cNvPr id="4" name="Foliennummernplatzhalter 3"/>
+          <p:cNvSpPr>
+            <a:spLocks noGrp="1"/>
+          </p:cNvSpPr>
+          <p:nvPr>
+            <p:ph type="sldNum" sz="quarter" idx="5"/>
+          </p:nvPr>
+        </p:nvSpPr>
+        <p:spPr/>
+        <p:txBody>
+          <a:bodyPr/>
+          <a:lstStyle/>
+          <a:p>
+            <a:fld id="{238902E6-424B-1C48-8D10-94E97A9F44CE}" type="slidenum">
+              <a:rPr lang="de-DE"/>
+              <a:t>11</a:t>
+            </a:fld>
+            <a:endParaRPr lang="de-DE"/>
+          </a:p>
+        </p:txBody>
+      </p:sp>
+    </p:spTree>
+    <p:extLst>
+      <p:ext uri="{BB962C8B-B14F-4D97-AF65-F5344CB8AC3E}">
+        <p14:creationId xmlns:p14="http://schemas.microsoft.com/office/powerpoint/2010/main" val="3834326946"/>
+      </p:ext>
+    </p:extLst>
+  </p:cSld>
+  <p:clrMapOvr>
+    <a:masterClrMapping/>
+  </p:clrMapOvr>
+</p:notes>
+</file>
+
 <file path=ppt/notesSlides/notesSlide2.xml><?xml version="1.0" encoding="utf-8"?>
 <p:notes xmlns:a="http://schemas.openxmlformats.org/drawingml/2006/main" xmlns:r="http://schemas.openxmlformats.org/officeDocument/2006/relationships" xmlns:p="http://schemas.openxmlformats.org/presentationml/2006/main">
   <p:cSld>
@@ -712,7 +882,7 @@
     </p:spTree>
     <p:extLst>
       <p:ext uri="{BB962C8B-B14F-4D97-AF65-F5344CB8AC3E}">
-        <p14:creationId xmlns:p14="http://schemas.microsoft.com/office/powerpoint/2010/main" val="63657794"/>
+        <p14:creationId xmlns:p14="http://schemas.microsoft.com/office/powerpoint/2010/main" val="2647785862"/>
       </p:ext>
     </p:extLst>
   </p:cSld>
@@ -796,7 +966,7 @@
     </p:spTree>
     <p:extLst>
       <p:ext uri="{BB962C8B-B14F-4D97-AF65-F5344CB8AC3E}">
-        <p14:creationId xmlns:p14="http://schemas.microsoft.com/office/powerpoint/2010/main" val="3366827042"/>
+        <p14:creationId xmlns:p14="http://schemas.microsoft.com/office/powerpoint/2010/main" val="63657794"/>
       </p:ext>
     </p:extLst>
   </p:cSld>
@@ -880,7 +1050,7 @@
     </p:spTree>
     <p:extLst>
       <p:ext uri="{BB962C8B-B14F-4D97-AF65-F5344CB8AC3E}">
-        <p14:creationId xmlns:p14="http://schemas.microsoft.com/office/powerpoint/2010/main" val="3852857426"/>
+        <p14:creationId xmlns:p14="http://schemas.microsoft.com/office/powerpoint/2010/main" val="3366827042"/>
       </p:ext>
     </p:extLst>
   </p:cSld>
@@ -964,7 +1134,7 @@
     </p:spTree>
     <p:extLst>
       <p:ext uri="{BB962C8B-B14F-4D97-AF65-F5344CB8AC3E}">
-        <p14:creationId xmlns:p14="http://schemas.microsoft.com/office/powerpoint/2010/main" val="3247660228"/>
+        <p14:creationId xmlns:p14="http://schemas.microsoft.com/office/powerpoint/2010/main" val="3852857426"/>
       </p:ext>
     </p:extLst>
   </p:cSld>
@@ -1048,7 +1218,7 @@
     </p:spTree>
     <p:extLst>
       <p:ext uri="{BB962C8B-B14F-4D97-AF65-F5344CB8AC3E}">
-        <p14:creationId xmlns:p14="http://schemas.microsoft.com/office/powerpoint/2010/main" val="1238356670"/>
+        <p14:creationId xmlns:p14="http://schemas.microsoft.com/office/powerpoint/2010/main" val="3247660228"/>
       </p:ext>
     </p:extLst>
   </p:cSld>
@@ -1132,7 +1302,7 @@
     </p:spTree>
     <p:extLst>
       <p:ext uri="{BB962C8B-B14F-4D97-AF65-F5344CB8AC3E}">
-        <p14:creationId xmlns:p14="http://schemas.microsoft.com/office/powerpoint/2010/main" val="649238304"/>
+        <p14:creationId xmlns:p14="http://schemas.microsoft.com/office/powerpoint/2010/main" val="1238356670"/>
       </p:ext>
     </p:extLst>
   </p:cSld>
@@ -1216,7 +1386,7 @@
     </p:spTree>
     <p:extLst>
       <p:ext uri="{BB962C8B-B14F-4D97-AF65-F5344CB8AC3E}">
-        <p14:creationId xmlns:p14="http://schemas.microsoft.com/office/powerpoint/2010/main" val="3834326946"/>
+        <p14:creationId xmlns:p14="http://schemas.microsoft.com/office/powerpoint/2010/main" val="3539636532"/>
       </p:ext>
     </p:extLst>
   </p:cSld>
@@ -1372,7 +1542,7 @@
           <a:lstStyle/>
           <a:p>
             <a:fld id="{A813844F-FEE2-E341-B97B-DB0CD4D59B2D}" type="datetimeFigureOut">
-              <a:t>14.12.22</a:t>
+              <a:t>27.03.23</a:t>
             </a:fld>
             <a:endParaRPr lang="de-DE"/>
           </a:p>
@@ -1568,7 +1738,7 @@
           <a:lstStyle/>
           <a:p>
             <a:fld id="{A813844F-FEE2-E341-B97B-DB0CD4D59B2D}" type="datetimeFigureOut">
-              <a:t>14.12.22</a:t>
+              <a:t>27.03.23</a:t>
             </a:fld>
             <a:endParaRPr lang="de-DE"/>
           </a:p>
@@ -1774,7 +1944,7 @@
           <a:lstStyle/>
           <a:p>
             <a:fld id="{A813844F-FEE2-E341-B97B-DB0CD4D59B2D}" type="datetimeFigureOut">
-              <a:t>14.12.22</a:t>
+              <a:t>27.03.23</a:t>
             </a:fld>
             <a:endParaRPr lang="de-DE"/>
           </a:p>
@@ -1970,7 +2140,7 @@
           <a:lstStyle/>
           <a:p>
             <a:fld id="{A813844F-FEE2-E341-B97B-DB0CD4D59B2D}" type="datetimeFigureOut">
-              <a:t>14.12.22</a:t>
+              <a:t>27.03.23</a:t>
             </a:fld>
             <a:endParaRPr lang="de-DE"/>
           </a:p>
@@ -2243,7 +2413,7 @@
           <a:lstStyle/>
           <a:p>
             <a:fld id="{A813844F-FEE2-E341-B97B-DB0CD4D59B2D}" type="datetimeFigureOut">
-              <a:t>14.12.22</a:t>
+              <a:t>27.03.23</a:t>
             </a:fld>
             <a:endParaRPr lang="de-DE"/>
           </a:p>
@@ -2506,7 +2676,7 @@
           <a:lstStyle/>
           <a:p>
             <a:fld id="{A813844F-FEE2-E341-B97B-DB0CD4D59B2D}" type="datetimeFigureOut">
-              <a:t>14.12.22</a:t>
+              <a:t>27.03.23</a:t>
             </a:fld>
             <a:endParaRPr lang="de-DE"/>
           </a:p>
@@ -2916,7 +3086,7 @@
           <a:lstStyle/>
           <a:p>
             <a:fld id="{A813844F-FEE2-E341-B97B-DB0CD4D59B2D}" type="datetimeFigureOut">
-              <a:t>14.12.22</a:t>
+              <a:t>27.03.23</a:t>
             </a:fld>
             <a:endParaRPr lang="de-DE"/>
           </a:p>
@@ -3055,7 +3225,7 @@
           <a:lstStyle/>
           <a:p>
             <a:fld id="{A813844F-FEE2-E341-B97B-DB0CD4D59B2D}" type="datetimeFigureOut">
-              <a:t>14.12.22</a:t>
+              <a:t>27.03.23</a:t>
             </a:fld>
             <a:endParaRPr lang="de-DE"/>
           </a:p>
@@ -3166,7 +3336,7 @@
           <a:lstStyle/>
           <a:p>
             <a:fld id="{A813844F-FEE2-E341-B97B-DB0CD4D59B2D}" type="datetimeFigureOut">
-              <a:t>14.12.22</a:t>
+              <a:t>27.03.23</a:t>
             </a:fld>
             <a:endParaRPr lang="de-DE"/>
           </a:p>
@@ -3475,7 +3645,7 @@
           <a:lstStyle/>
           <a:p>
             <a:fld id="{A813844F-FEE2-E341-B97B-DB0CD4D59B2D}" type="datetimeFigureOut">
-              <a:t>14.12.22</a:t>
+              <a:t>27.03.23</a:t>
             </a:fld>
             <a:endParaRPr lang="de-DE"/>
           </a:p>
@@ -3761,7 +3931,7 @@
           <a:lstStyle/>
           <a:p>
             <a:fld id="{A813844F-FEE2-E341-B97B-DB0CD4D59B2D}" type="datetimeFigureOut">
-              <a:t>14.12.22</a:t>
+              <a:t>27.03.23</a:t>
             </a:fld>
             <a:endParaRPr lang="de-DE"/>
           </a:p>
@@ -4000,7 +4170,7 @@
           </a:lstStyle>
           <a:p>
             <a:fld id="{A813844F-FEE2-E341-B97B-DB0CD4D59B2D}" type="datetimeFigureOut">
-              <a:t>14.12.22</a:t>
+              <a:t>27.03.23</a:t>
             </a:fld>
             <a:endParaRPr lang="de-DE"/>
           </a:p>
@@ -4596,6 +4766,538 @@
 </p:sld>
 </file>
 
+<file path=ppt/slides/slide10.xml><?xml version="1.0" encoding="utf-8"?>
+<p:sld xmlns:a="http://schemas.openxmlformats.org/drawingml/2006/main" xmlns:r="http://schemas.openxmlformats.org/officeDocument/2006/relationships" xmlns:p="http://schemas.openxmlformats.org/presentationml/2006/main">
+  <p:cSld>
+    <p:spTree>
+      <p:nvGrpSpPr>
+        <p:cNvPr id="1" name=""/>
+        <p:cNvGrpSpPr/>
+        <p:nvPr/>
+      </p:nvGrpSpPr>
+      <p:grpSpPr>
+        <a:xfrm>
+          <a:off x="0" y="0"/>
+          <a:ext cx="0" cy="0"/>
+          <a:chOff x="0" y="0"/>
+          <a:chExt cx="0" cy="0"/>
+        </a:xfrm>
+      </p:grpSpPr>
+      <p:pic>
+        <p:nvPicPr>
+          <p:cNvPr id="2" name="Grafik 1">
+            <a:extLst>
+              <a:ext uri="{FF2B5EF4-FFF2-40B4-BE49-F238E27FC236}">
+                <a16:creationId xmlns:a16="http://schemas.microsoft.com/office/drawing/2014/main" id="{9768EA39-627B-C584-A24D-E6D1A5B4D95B}"/>
+              </a:ext>
+            </a:extLst>
+          </p:cNvPr>
+          <p:cNvPicPr>
+            <a:picLocks noChangeAspect="1"/>
+          </p:cNvPicPr>
+          <p:nvPr/>
+        </p:nvPicPr>
+        <p:blipFill>
+          <a:blip r:embed="rId3"/>
+          <a:stretch>
+            <a:fillRect/>
+          </a:stretch>
+        </p:blipFill>
+        <p:spPr>
+          <a:xfrm>
+            <a:off x="1920433" y="368782"/>
+            <a:ext cx="7772400" cy="1907249"/>
+          </a:xfrm>
+          <a:prstGeom prst="rect">
+            <a:avLst/>
+          </a:prstGeom>
+        </p:spPr>
+      </p:pic>
+      <p:pic>
+        <p:nvPicPr>
+          <p:cNvPr id="3" name="Grafik 2">
+            <a:extLst>
+              <a:ext uri="{FF2B5EF4-FFF2-40B4-BE49-F238E27FC236}">
+                <a16:creationId xmlns:a16="http://schemas.microsoft.com/office/drawing/2014/main" id="{ECE26964-11E3-91D4-9480-6EB9044F4DDB}"/>
+              </a:ext>
+            </a:extLst>
+          </p:cNvPr>
+          <p:cNvPicPr>
+            <a:picLocks noChangeAspect="1"/>
+          </p:cNvPicPr>
+          <p:nvPr/>
+        </p:nvPicPr>
+        <p:blipFill>
+          <a:blip r:embed="rId4"/>
+          <a:stretch>
+            <a:fillRect/>
+          </a:stretch>
+        </p:blipFill>
+        <p:spPr>
+          <a:xfrm>
+            <a:off x="1920433" y="2375819"/>
+            <a:ext cx="7772400" cy="3749968"/>
+          </a:xfrm>
+          <a:prstGeom prst="rect">
+            <a:avLst/>
+          </a:prstGeom>
+        </p:spPr>
+      </p:pic>
+      <p:sp>
+        <p:nvSpPr>
+          <p:cNvPr id="6" name="Textfeld 5">
+            <a:extLst>
+              <a:ext uri="{FF2B5EF4-FFF2-40B4-BE49-F238E27FC236}">
+                <a16:creationId xmlns:a16="http://schemas.microsoft.com/office/drawing/2014/main" id="{BD99F089-52D4-5901-CBE0-D593D0D09E69}"/>
+              </a:ext>
+            </a:extLst>
+          </p:cNvPr>
+          <p:cNvSpPr txBox="1"/>
+          <p:nvPr/>
+        </p:nvSpPr>
+        <p:spPr>
+          <a:xfrm>
+            <a:off x="5336286" y="572768"/>
+            <a:ext cx="295234" cy="338554"/>
+          </a:xfrm>
+          <a:prstGeom prst="rect">
+            <a:avLst/>
+          </a:prstGeom>
+          <a:solidFill>
+            <a:schemeClr val="bg1">
+              <a:lumMod val="75000"/>
+            </a:schemeClr>
+          </a:solidFill>
+          <a:ln>
+            <a:noFill/>
+          </a:ln>
+        </p:spPr>
+        <p:txBody>
+          <a:bodyPr wrap="square" rtlCol="0">
+            <a:spAutoFit/>
+          </a:bodyPr>
+          <a:lstStyle/>
+          <a:p>
+            <a:r>
+              <a:rPr lang="de-DE" sz="1600" b="1">
+                <a:latin typeface="Arial" panose="020B0604020202020204" pitchFamily="34" charset="0"/>
+                <a:cs typeface="Arial" panose="020B0604020202020204" pitchFamily="34" charset="0"/>
+              </a:rPr>
+              <a:t>A</a:t>
+            </a:r>
+          </a:p>
+        </p:txBody>
+      </p:sp>
+      <p:sp>
+        <p:nvSpPr>
+          <p:cNvPr id="7" name="Textfeld 6">
+            <a:extLst>
+              <a:ext uri="{FF2B5EF4-FFF2-40B4-BE49-F238E27FC236}">
+                <a16:creationId xmlns:a16="http://schemas.microsoft.com/office/drawing/2014/main" id="{0857B115-7DD7-115E-E2DE-85BCB71B157F}"/>
+              </a:ext>
+            </a:extLst>
+          </p:cNvPr>
+          <p:cNvSpPr txBox="1"/>
+          <p:nvPr/>
+        </p:nvSpPr>
+        <p:spPr>
+          <a:xfrm>
+            <a:off x="5316622" y="2409579"/>
+            <a:ext cx="295234" cy="338554"/>
+          </a:xfrm>
+          <a:prstGeom prst="rect">
+            <a:avLst/>
+          </a:prstGeom>
+          <a:solidFill>
+            <a:schemeClr val="bg1">
+              <a:lumMod val="75000"/>
+            </a:schemeClr>
+          </a:solidFill>
+          <a:ln>
+            <a:noFill/>
+          </a:ln>
+        </p:spPr>
+        <p:txBody>
+          <a:bodyPr wrap="square" rtlCol="0">
+            <a:spAutoFit/>
+          </a:bodyPr>
+          <a:lstStyle/>
+          <a:p>
+            <a:r>
+              <a:rPr lang="de-DE" sz="1600" b="1">
+                <a:latin typeface="Arial" panose="020B0604020202020204" pitchFamily="34" charset="0"/>
+                <a:cs typeface="Arial" panose="020B0604020202020204" pitchFamily="34" charset="0"/>
+              </a:rPr>
+              <a:t>C</a:t>
+            </a:r>
+          </a:p>
+        </p:txBody>
+      </p:sp>
+      <p:sp>
+        <p:nvSpPr>
+          <p:cNvPr id="8" name="Textfeld 7">
+            <a:extLst>
+              <a:ext uri="{FF2B5EF4-FFF2-40B4-BE49-F238E27FC236}">
+                <a16:creationId xmlns:a16="http://schemas.microsoft.com/office/drawing/2014/main" id="{5ED38475-75D3-7859-4982-A8443EAD950A}"/>
+              </a:ext>
+            </a:extLst>
+          </p:cNvPr>
+          <p:cNvSpPr txBox="1"/>
+          <p:nvPr/>
+        </p:nvSpPr>
+        <p:spPr>
+          <a:xfrm>
+            <a:off x="5316622" y="4266054"/>
+            <a:ext cx="295234" cy="338554"/>
+          </a:xfrm>
+          <a:prstGeom prst="rect">
+            <a:avLst/>
+          </a:prstGeom>
+          <a:solidFill>
+            <a:schemeClr val="bg1">
+              <a:lumMod val="75000"/>
+            </a:schemeClr>
+          </a:solidFill>
+          <a:ln>
+            <a:noFill/>
+          </a:ln>
+        </p:spPr>
+        <p:txBody>
+          <a:bodyPr wrap="square" rtlCol="0">
+            <a:spAutoFit/>
+          </a:bodyPr>
+          <a:lstStyle/>
+          <a:p>
+            <a:r>
+              <a:rPr lang="de-DE" sz="1600" b="1">
+                <a:latin typeface="Arial" panose="020B0604020202020204" pitchFamily="34" charset="0"/>
+                <a:cs typeface="Arial" panose="020B0604020202020204" pitchFamily="34" charset="0"/>
+              </a:rPr>
+              <a:t>E</a:t>
+            </a:r>
+          </a:p>
+        </p:txBody>
+      </p:sp>
+      <p:sp>
+        <p:nvSpPr>
+          <p:cNvPr id="9" name="Textfeld 8">
+            <a:extLst>
+              <a:ext uri="{FF2B5EF4-FFF2-40B4-BE49-F238E27FC236}">
+                <a16:creationId xmlns:a16="http://schemas.microsoft.com/office/drawing/2014/main" id="{4348FDF3-1A08-65CC-E590-F25704D00823}"/>
+              </a:ext>
+            </a:extLst>
+          </p:cNvPr>
+          <p:cNvSpPr txBox="1"/>
+          <p:nvPr/>
+        </p:nvSpPr>
+        <p:spPr>
+          <a:xfrm>
+            <a:off x="8291279" y="565003"/>
+            <a:ext cx="1346886" cy="307777"/>
+          </a:xfrm>
+          <a:prstGeom prst="rect">
+            <a:avLst/>
+          </a:prstGeom>
+          <a:solidFill>
+            <a:schemeClr val="bg1">
+              <a:lumMod val="85000"/>
+            </a:schemeClr>
+          </a:solidFill>
+          <a:ln>
+            <a:noFill/>
+          </a:ln>
+        </p:spPr>
+        <p:txBody>
+          <a:bodyPr wrap="square" rtlCol="0">
+            <a:spAutoFit/>
+          </a:bodyPr>
+          <a:lstStyle/>
+          <a:p>
+            <a:pPr algn="r"/>
+            <a:r>
+              <a:rPr lang="de-DE" sz="1400">
+                <a:latin typeface="Arial" panose="020B0604020202020204" pitchFamily="34" charset="0"/>
+                <a:cs typeface="Arial" panose="020B0604020202020204" pitchFamily="34" charset="0"/>
+              </a:rPr>
+              <a:t>current phase</a:t>
+            </a:r>
+          </a:p>
+        </p:txBody>
+      </p:sp>
+      <p:sp>
+        <p:nvSpPr>
+          <p:cNvPr id="4" name="Textfeld 3">
+            <a:extLst>
+              <a:ext uri="{FF2B5EF4-FFF2-40B4-BE49-F238E27FC236}">
+                <a16:creationId xmlns:a16="http://schemas.microsoft.com/office/drawing/2014/main" id="{AD11839F-9FBD-2811-225A-66B10D8C04E8}"/>
+              </a:ext>
+            </a:extLst>
+          </p:cNvPr>
+          <p:cNvSpPr txBox="1"/>
+          <p:nvPr/>
+        </p:nvSpPr>
+        <p:spPr>
+          <a:xfrm>
+            <a:off x="7512909" y="4259875"/>
+            <a:ext cx="2112900" cy="307777"/>
+          </a:xfrm>
+          <a:prstGeom prst="rect">
+            <a:avLst/>
+          </a:prstGeom>
+          <a:solidFill>
+            <a:schemeClr val="bg1">
+              <a:lumMod val="85000"/>
+            </a:schemeClr>
+          </a:solidFill>
+          <a:ln>
+            <a:noFill/>
+          </a:ln>
+        </p:spPr>
+        <p:txBody>
+          <a:bodyPr wrap="square" rtlCol="0">
+            <a:spAutoFit/>
+          </a:bodyPr>
+          <a:lstStyle/>
+          <a:p>
+            <a:pPr algn="r"/>
+            <a:r>
+              <a:rPr lang="de-DE" sz="1400">
+                <a:latin typeface="Arial" panose="020B0604020202020204" pitchFamily="34" charset="0"/>
+                <a:cs typeface="Arial" panose="020B0604020202020204" pitchFamily="34" charset="0"/>
+              </a:rPr>
+              <a:t>6 months into the future</a:t>
+            </a:r>
+          </a:p>
+        </p:txBody>
+      </p:sp>
+      <p:sp>
+        <p:nvSpPr>
+          <p:cNvPr id="5" name="Textfeld 4">
+            <a:extLst>
+              <a:ext uri="{FF2B5EF4-FFF2-40B4-BE49-F238E27FC236}">
+                <a16:creationId xmlns:a16="http://schemas.microsoft.com/office/drawing/2014/main" id="{D3ED66BC-1506-D292-1F7D-6653E36C647D}"/>
+              </a:ext>
+            </a:extLst>
+          </p:cNvPr>
+          <p:cNvSpPr txBox="1"/>
+          <p:nvPr/>
+        </p:nvSpPr>
+        <p:spPr>
+          <a:xfrm>
+            <a:off x="7512908" y="2409579"/>
+            <a:ext cx="2125257" cy="307777"/>
+          </a:xfrm>
+          <a:prstGeom prst="rect">
+            <a:avLst/>
+          </a:prstGeom>
+          <a:solidFill>
+            <a:schemeClr val="bg1">
+              <a:lumMod val="85000"/>
+            </a:schemeClr>
+          </a:solidFill>
+          <a:ln>
+            <a:noFill/>
+          </a:ln>
+        </p:spPr>
+        <p:txBody>
+          <a:bodyPr wrap="square" rtlCol="0">
+            <a:spAutoFit/>
+          </a:bodyPr>
+          <a:lstStyle/>
+          <a:p>
+            <a:pPr algn="r"/>
+            <a:r>
+              <a:rPr lang="de-DE" sz="1400">
+                <a:latin typeface="Arial" panose="020B0604020202020204" pitchFamily="34" charset="0"/>
+                <a:cs typeface="Arial" panose="020B0604020202020204" pitchFamily="34" charset="0"/>
+              </a:rPr>
+              <a:t>3 months into the future</a:t>
+            </a:r>
+          </a:p>
+        </p:txBody>
+      </p:sp>
+    </p:spTree>
+    <p:extLst>
+      <p:ext uri="{BB962C8B-B14F-4D97-AF65-F5344CB8AC3E}">
+        <p14:creationId xmlns:p14="http://schemas.microsoft.com/office/powerpoint/2010/main" val="2555539366"/>
+      </p:ext>
+    </p:extLst>
+  </p:cSld>
+  <p:clrMapOvr>
+    <a:masterClrMapping/>
+  </p:clrMapOvr>
+</p:sld>
+</file>
+
+<file path=ppt/slides/slide11.xml><?xml version="1.0" encoding="utf-8"?>
+<p:sld xmlns:a="http://schemas.openxmlformats.org/drawingml/2006/main" xmlns:r="http://schemas.openxmlformats.org/officeDocument/2006/relationships" xmlns:p="http://schemas.openxmlformats.org/presentationml/2006/main">
+  <p:cSld>
+    <p:spTree>
+      <p:nvGrpSpPr>
+        <p:cNvPr id="1" name=""/>
+        <p:cNvGrpSpPr/>
+        <p:nvPr/>
+      </p:nvGrpSpPr>
+      <p:grpSpPr>
+        <a:xfrm>
+          <a:off x="0" y="0"/>
+          <a:ext cx="0" cy="0"/>
+          <a:chOff x="0" y="0"/>
+          <a:chExt cx="0" cy="0"/>
+        </a:xfrm>
+      </p:grpSpPr>
+      <p:pic>
+        <p:nvPicPr>
+          <p:cNvPr id="1028" name="Picture 4">
+            <a:extLst>
+              <a:ext uri="{FF2B5EF4-FFF2-40B4-BE49-F238E27FC236}">
+                <a16:creationId xmlns:a16="http://schemas.microsoft.com/office/drawing/2014/main" id="{F0CBFD18-436B-16E8-66AD-612BCB473E7B}"/>
+              </a:ext>
+            </a:extLst>
+          </p:cNvPr>
+          <p:cNvPicPr>
+            <a:picLocks noChangeAspect="1" noChangeArrowheads="1"/>
+          </p:cNvPicPr>
+          <p:nvPr/>
+        </p:nvPicPr>
+        <p:blipFill>
+          <a:blip r:embed="rId3">
+            <a:extLst>
+              <a:ext uri="{28A0092B-C50C-407E-A947-70E740481C1C}">
+                <a14:useLocalDpi xmlns:a14="http://schemas.microsoft.com/office/drawing/2010/main" val="0"/>
+              </a:ext>
+            </a:extLst>
+          </a:blip>
+          <a:srcRect/>
+          <a:stretch>
+            <a:fillRect/>
+          </a:stretch>
+        </p:blipFill>
+        <p:spPr bwMode="auto">
+          <a:xfrm>
+            <a:off x="2961217" y="939800"/>
+            <a:ext cx="5067300" cy="4978400"/>
+          </a:xfrm>
+          <a:prstGeom prst="rect">
+            <a:avLst/>
+          </a:prstGeom>
+          <a:noFill/>
+          <a:extLst>
+            <a:ext uri="{909E8E84-426E-40DD-AFC4-6F175D3DCCD1}">
+              <a14:hiddenFill xmlns:a14="http://schemas.microsoft.com/office/drawing/2010/main">
+                <a:solidFill>
+                  <a:srgbClr val="FFFFFF"/>
+                </a:solidFill>
+              </a14:hiddenFill>
+            </a:ext>
+          </a:extLst>
+        </p:spPr>
+      </p:pic>
+      <p:sp>
+        <p:nvSpPr>
+          <p:cNvPr id="2" name="Textfeld 1">
+            <a:extLst>
+              <a:ext uri="{FF2B5EF4-FFF2-40B4-BE49-F238E27FC236}">
+                <a16:creationId xmlns:a16="http://schemas.microsoft.com/office/drawing/2014/main" id="{C8CACCBA-630B-624E-8108-6AB3F85F1553}"/>
+              </a:ext>
+            </a:extLst>
+          </p:cNvPr>
+          <p:cNvSpPr txBox="1"/>
+          <p:nvPr/>
+        </p:nvSpPr>
+        <p:spPr>
+          <a:xfrm>
+            <a:off x="6470946" y="1250803"/>
+            <a:ext cx="1346886" cy="307777"/>
+          </a:xfrm>
+          <a:prstGeom prst="rect">
+            <a:avLst/>
+          </a:prstGeom>
+          <a:solidFill>
+            <a:schemeClr val="bg1">
+              <a:lumMod val="85000"/>
+            </a:schemeClr>
+          </a:solidFill>
+          <a:ln>
+            <a:noFill/>
+          </a:ln>
+        </p:spPr>
+        <p:txBody>
+          <a:bodyPr wrap="square" rtlCol="0">
+            <a:spAutoFit/>
+          </a:bodyPr>
+          <a:lstStyle/>
+          <a:p>
+            <a:pPr algn="r"/>
+            <a:r>
+              <a:rPr lang="de-DE" sz="1400">
+                <a:latin typeface="Arial" panose="020B0604020202020204" pitchFamily="34" charset="0"/>
+                <a:cs typeface="Arial" panose="020B0604020202020204" pitchFamily="34" charset="0"/>
+              </a:rPr>
+              <a:t>current phase</a:t>
+            </a:r>
+          </a:p>
+        </p:txBody>
+      </p:sp>
+      <p:sp>
+        <p:nvSpPr>
+          <p:cNvPr id="3" name="Textfeld 2">
+            <a:extLst>
+              <a:ext uri="{FF2B5EF4-FFF2-40B4-BE49-F238E27FC236}">
+                <a16:creationId xmlns:a16="http://schemas.microsoft.com/office/drawing/2014/main" id="{761261D5-8606-C19A-C88C-C1A6786E4EAC}"/>
+              </a:ext>
+            </a:extLst>
+          </p:cNvPr>
+          <p:cNvSpPr txBox="1"/>
+          <p:nvPr/>
+        </p:nvSpPr>
+        <p:spPr>
+          <a:xfrm>
+            <a:off x="5704932" y="3514808"/>
+            <a:ext cx="2112900" cy="307777"/>
+          </a:xfrm>
+          <a:prstGeom prst="rect">
+            <a:avLst/>
+          </a:prstGeom>
+          <a:solidFill>
+            <a:schemeClr val="bg1">
+              <a:lumMod val="85000"/>
+            </a:schemeClr>
+          </a:solidFill>
+          <a:ln>
+            <a:noFill/>
+          </a:ln>
+        </p:spPr>
+        <p:txBody>
+          <a:bodyPr wrap="square" rtlCol="0">
+            <a:spAutoFit/>
+          </a:bodyPr>
+          <a:lstStyle/>
+          <a:p>
+            <a:pPr algn="r"/>
+            <a:r>
+              <a:rPr lang="de-DE" sz="1400">
+                <a:latin typeface="Arial" panose="020B0604020202020204" pitchFamily="34" charset="0"/>
+                <a:cs typeface="Arial" panose="020B0604020202020204" pitchFamily="34" charset="0"/>
+              </a:rPr>
+              <a:t>6 months into the future</a:t>
+            </a:r>
+          </a:p>
+        </p:txBody>
+      </p:sp>
+    </p:spTree>
+    <p:extLst>
+      <p:ext uri="{BB962C8B-B14F-4D97-AF65-F5344CB8AC3E}">
+        <p14:creationId xmlns:p14="http://schemas.microsoft.com/office/powerpoint/2010/main" val="2079808273"/>
+      </p:ext>
+    </p:extLst>
+  </p:cSld>
+  <p:clrMapOvr>
+    <a:masterClrMapping/>
+  </p:clrMapOvr>
+</p:sld>
+</file>
+
 <file path=ppt/slides/slide2.xml><?xml version="1.0" encoding="utf-8"?>
 <p:sld xmlns:a="http://schemas.openxmlformats.org/drawingml/2006/main" xmlns:r="http://schemas.openxmlformats.org/officeDocument/2006/relationships" xmlns:p="http://schemas.openxmlformats.org/presentationml/2006/main">
   <p:cSld>
@@ -4615,10 +5317,10 @@
       </p:grpSpPr>
       <p:pic>
         <p:nvPicPr>
-          <p:cNvPr id="1026" name="Picture 2">
-            <a:extLst>
-              <a:ext uri="{FF2B5EF4-FFF2-40B4-BE49-F238E27FC236}">
-                <a16:creationId xmlns:a16="http://schemas.microsoft.com/office/drawing/2014/main" id="{7A188BDA-B97C-E86B-955F-7CF7D230A99F}"/>
+          <p:cNvPr id="1030" name="Picture 6">
+            <a:extLst>
+              <a:ext uri="{FF2B5EF4-FFF2-40B4-BE49-F238E27FC236}">
+                <a16:creationId xmlns:a16="http://schemas.microsoft.com/office/drawing/2014/main" id="{7EDA449D-A036-3496-F478-7F6CF6BE7307}"/>
               </a:ext>
             </a:extLst>
           </p:cNvPr>
@@ -4642,7 +5344,7 @@
         </p:blipFill>
         <p:spPr bwMode="auto">
           <a:xfrm>
-            <a:off x="871797" y="320761"/>
+            <a:off x="903761" y="345989"/>
             <a:ext cx="7493000" cy="6438900"/>
           </a:xfrm>
           <a:prstGeom prst="rect">
@@ -4812,10 +5514,10 @@
       </p:grpSpPr>
       <p:pic>
         <p:nvPicPr>
-          <p:cNvPr id="1028" name="Picture 4">
-            <a:extLst>
-              <a:ext uri="{FF2B5EF4-FFF2-40B4-BE49-F238E27FC236}">
-                <a16:creationId xmlns:a16="http://schemas.microsoft.com/office/drawing/2014/main" id="{403C4B18-0BBB-ACF7-0804-5DF4AE733F1C}"/>
+          <p:cNvPr id="3074" name="Picture 2">
+            <a:extLst>
+              <a:ext uri="{FF2B5EF4-FFF2-40B4-BE49-F238E27FC236}">
+                <a16:creationId xmlns:a16="http://schemas.microsoft.com/office/drawing/2014/main" id="{3791505B-48AD-9E26-9805-23E74E3666E4}"/>
               </a:ext>
             </a:extLst>
           </p:cNvPr>
@@ -4839,8 +5541,8 @@
         </p:blipFill>
         <p:spPr bwMode="auto">
           <a:xfrm>
-            <a:off x="82550" y="389525"/>
-            <a:ext cx="12026900" cy="6426200"/>
+            <a:off x="903761" y="345989"/>
+            <a:ext cx="7493000" cy="6438900"/>
           </a:xfrm>
           <a:prstGeom prst="rect">
             <a:avLst/>
@@ -4862,7 +5564,7 @@
           <p:cNvPr id="3" name="Rechteck 2">
             <a:extLst>
               <a:ext uri="{FF2B5EF4-FFF2-40B4-BE49-F238E27FC236}">
-                <a16:creationId xmlns:a16="http://schemas.microsoft.com/office/drawing/2014/main" id="{8A60A9A5-47B6-F11F-0488-373B184D160E}"/>
+                <a16:creationId xmlns:a16="http://schemas.microsoft.com/office/drawing/2014/main" id="{13B182CA-8220-7294-84E1-E79342174349}"/>
               </a:ext>
             </a:extLst>
           </p:cNvPr>
@@ -4871,8 +5573,8 @@
         </p:nvSpPr>
         <p:spPr>
           <a:xfrm>
-            <a:off x="669413" y="413473"/>
-            <a:ext cx="11125028" cy="316656"/>
+            <a:off x="7426411" y="345989"/>
+            <a:ext cx="1258135" cy="5486400"/>
           </a:xfrm>
           <a:prstGeom prst="rect">
             <a:avLst/>
@@ -4911,12 +5613,48 @@
           </a:p>
         </p:txBody>
       </p:sp>
+      <p:sp>
+        <p:nvSpPr>
+          <p:cNvPr id="4" name="Textfeld 3">
+            <a:extLst>
+              <a:ext uri="{FF2B5EF4-FFF2-40B4-BE49-F238E27FC236}">
+                <a16:creationId xmlns:a16="http://schemas.microsoft.com/office/drawing/2014/main" id="{40449692-859C-2835-F60E-A8B394F444F1}"/>
+              </a:ext>
+            </a:extLst>
+          </p:cNvPr>
+          <p:cNvSpPr txBox="1"/>
+          <p:nvPr/>
+        </p:nvSpPr>
+        <p:spPr>
+          <a:xfrm rot="16200000">
+            <a:off x="6049338" y="2827352"/>
+            <a:ext cx="3154256" cy="400110"/>
+          </a:xfrm>
+          <a:prstGeom prst="rect">
+            <a:avLst/>
+          </a:prstGeom>
+          <a:noFill/>
+        </p:spPr>
+        <p:txBody>
+          <a:bodyPr wrap="square" rtlCol="0">
+            <a:spAutoFit/>
+          </a:bodyPr>
+          <a:lstStyle/>
+          <a:p>
+            <a:pPr algn="ctr"/>
+            <a:r>
+              <a:rPr lang="de-DE" sz="2000"/>
+              <a:t>Correlation Coefficient</a:t>
+            </a:r>
+          </a:p>
+        </p:txBody>
+      </p:sp>
       <p:pic>
         <p:nvPicPr>
           <p:cNvPr id="2" name="Grafik 1">
             <a:extLst>
               <a:ext uri="{FF2B5EF4-FFF2-40B4-BE49-F238E27FC236}">
-                <a16:creationId xmlns:a16="http://schemas.microsoft.com/office/drawing/2014/main" id="{9F385B11-B76C-975F-ED35-74CBEC826BB2}"/>
+                <a16:creationId xmlns:a16="http://schemas.microsoft.com/office/drawing/2014/main" id="{3DD5B366-C4CF-7EE4-1361-A058FBAC2364}"/>
               </a:ext>
             </a:extLst>
           </p:cNvPr>
@@ -4933,68 +5671,8 @@
         </p:blipFill>
         <p:spPr>
           <a:xfrm>
-            <a:off x="712980" y="251079"/>
-            <a:ext cx="11093818" cy="310678"/>
-          </a:xfrm>
-          <a:prstGeom prst="rect">
-            <a:avLst/>
-          </a:prstGeom>
-        </p:spPr>
-      </p:pic>
-      <p:pic>
-        <p:nvPicPr>
-          <p:cNvPr id="6" name="Grafik 5">
-            <a:extLst>
-              <a:ext uri="{FF2B5EF4-FFF2-40B4-BE49-F238E27FC236}">
-                <a16:creationId xmlns:a16="http://schemas.microsoft.com/office/drawing/2014/main" id="{2FFC7A13-B98E-AB04-FB10-F2DD88448CE5}"/>
-              </a:ext>
-            </a:extLst>
-          </p:cNvPr>
-          <p:cNvPicPr>
-            <a:picLocks noChangeAspect="1"/>
-          </p:cNvPicPr>
-          <p:nvPr/>
-        </p:nvPicPr>
-        <p:blipFill>
-          <a:blip r:embed="rId5"/>
-          <a:stretch>
-            <a:fillRect/>
-          </a:stretch>
-        </p:blipFill>
-        <p:spPr>
-          <a:xfrm>
-            <a:off x="7436855" y="1145892"/>
-            <a:ext cx="482282" cy="227988"/>
-          </a:xfrm>
-          <a:prstGeom prst="rect">
-            <a:avLst/>
-          </a:prstGeom>
-        </p:spPr>
-      </p:pic>
-      <p:pic>
-        <p:nvPicPr>
-          <p:cNvPr id="7" name="Grafik 6">
-            <a:extLst>
-              <a:ext uri="{FF2B5EF4-FFF2-40B4-BE49-F238E27FC236}">
-                <a16:creationId xmlns:a16="http://schemas.microsoft.com/office/drawing/2014/main" id="{B453D44E-AAB2-9C2B-5E0E-4652021B3F58}"/>
-              </a:ext>
-            </a:extLst>
-          </p:cNvPr>
-          <p:cNvPicPr>
-            <a:picLocks noChangeAspect="1"/>
-          </p:cNvPicPr>
-          <p:nvPr/>
-        </p:nvPicPr>
-        <p:blipFill>
-          <a:blip r:embed="rId5"/>
-          <a:stretch>
-            <a:fillRect/>
-          </a:stretch>
-        </p:blipFill>
-        <p:spPr>
-          <a:xfrm>
-            <a:off x="7355830" y="4145664"/>
-            <a:ext cx="482282" cy="227988"/>
+            <a:off x="7728781" y="531339"/>
+            <a:ext cx="856182" cy="5125823"/>
           </a:xfrm>
           <a:prstGeom prst="rect">
             <a:avLst/>
@@ -5004,7 +5682,7 @@
     </p:spTree>
     <p:extLst>
       <p:ext uri="{BB962C8B-B14F-4D97-AF65-F5344CB8AC3E}">
-        <p14:creationId xmlns:p14="http://schemas.microsoft.com/office/powerpoint/2010/main" val="1045529663"/>
+        <p14:creationId xmlns:p14="http://schemas.microsoft.com/office/powerpoint/2010/main" val="116128757"/>
       </p:ext>
     </p:extLst>
   </p:cSld>
@@ -5031,6 +5709,53 @@
           <a:chExt cx="0" cy="0"/>
         </a:xfrm>
       </p:grpSpPr>
+      <p:pic>
+        <p:nvPicPr>
+          <p:cNvPr id="1028" name="Picture 4">
+            <a:extLst>
+              <a:ext uri="{FF2B5EF4-FFF2-40B4-BE49-F238E27FC236}">
+                <a16:creationId xmlns:a16="http://schemas.microsoft.com/office/drawing/2014/main" id="{403C4B18-0BBB-ACF7-0804-5DF4AE733F1C}"/>
+              </a:ext>
+            </a:extLst>
+          </p:cNvPr>
+          <p:cNvPicPr>
+            <a:picLocks noChangeAspect="1" noChangeArrowheads="1"/>
+          </p:cNvPicPr>
+          <p:nvPr/>
+        </p:nvPicPr>
+        <p:blipFill>
+          <a:blip r:embed="rId3">
+            <a:extLst>
+              <a:ext uri="{28A0092B-C50C-407E-A947-70E740481C1C}">
+                <a14:useLocalDpi xmlns:a14="http://schemas.microsoft.com/office/drawing/2010/main" val="0"/>
+              </a:ext>
+            </a:extLst>
+          </a:blip>
+          <a:srcRect/>
+          <a:stretch>
+            <a:fillRect/>
+          </a:stretch>
+        </p:blipFill>
+        <p:spPr bwMode="auto">
+          <a:xfrm>
+            <a:off x="82550" y="389525"/>
+            <a:ext cx="12026900" cy="6426200"/>
+          </a:xfrm>
+          <a:prstGeom prst="rect">
+            <a:avLst/>
+          </a:prstGeom>
+          <a:noFill/>
+          <a:extLst>
+            <a:ext uri="{909E8E84-426E-40DD-AFC4-6F175D3DCCD1}">
+              <a14:hiddenFill xmlns:a14="http://schemas.microsoft.com/office/drawing/2010/main">
+                <a:solidFill>
+                  <a:srgbClr val="FFFFFF"/>
+                </a:solidFill>
+              </a14:hiddenFill>
+            </a:ext>
+          </a:extLst>
+        </p:spPr>
+      </p:pic>
       <p:sp>
         <p:nvSpPr>
           <p:cNvPr id="3" name="Rechteck 2">
@@ -5100,7 +5825,7 @@
           <p:nvPr/>
         </p:nvPicPr>
         <p:blipFill>
-          <a:blip r:embed="rId3"/>
+          <a:blip r:embed="rId4"/>
           <a:stretch>
             <a:fillRect/>
           </a:stretch>
@@ -5117,10 +5842,10 @@
       </p:pic>
       <p:pic>
         <p:nvPicPr>
-          <p:cNvPr id="4" name="Grafik 3">
-            <a:extLst>
-              <a:ext uri="{FF2B5EF4-FFF2-40B4-BE49-F238E27FC236}">
-                <a16:creationId xmlns:a16="http://schemas.microsoft.com/office/drawing/2014/main" id="{BAD3BF93-35FC-5BAE-7673-3E28D46CD80D}"/>
+          <p:cNvPr id="6" name="Grafik 5">
+            <a:extLst>
+              <a:ext uri="{FF2B5EF4-FFF2-40B4-BE49-F238E27FC236}">
+                <a16:creationId xmlns:a16="http://schemas.microsoft.com/office/drawing/2014/main" id="{2FFC7A13-B98E-AB04-FB10-F2DD88448CE5}"/>
               </a:ext>
             </a:extLst>
           </p:cNvPr>
@@ -5130,15 +5855,45 @@
           <p:nvPr/>
         </p:nvPicPr>
         <p:blipFill>
-          <a:blip r:embed="rId4"/>
+          <a:blip r:embed="rId5"/>
           <a:stretch>
             <a:fillRect/>
           </a:stretch>
         </p:blipFill>
         <p:spPr>
           <a:xfrm>
-            <a:off x="397559" y="571801"/>
-            <a:ext cx="11396882" cy="2893508"/>
+            <a:off x="7436855" y="1145892"/>
+            <a:ext cx="482282" cy="227988"/>
+          </a:xfrm>
+          <a:prstGeom prst="rect">
+            <a:avLst/>
+          </a:prstGeom>
+        </p:spPr>
+      </p:pic>
+      <p:pic>
+        <p:nvPicPr>
+          <p:cNvPr id="7" name="Grafik 6">
+            <a:extLst>
+              <a:ext uri="{FF2B5EF4-FFF2-40B4-BE49-F238E27FC236}">
+                <a16:creationId xmlns:a16="http://schemas.microsoft.com/office/drawing/2014/main" id="{B453D44E-AAB2-9C2B-5E0E-4652021B3F58}"/>
+              </a:ext>
+            </a:extLst>
+          </p:cNvPr>
+          <p:cNvPicPr>
+            <a:picLocks noChangeAspect="1"/>
+          </p:cNvPicPr>
+          <p:nvPr/>
+        </p:nvPicPr>
+        <p:blipFill>
+          <a:blip r:embed="rId5"/>
+          <a:stretch>
+            <a:fillRect/>
+          </a:stretch>
+        </p:blipFill>
+        <p:spPr>
+          <a:xfrm>
+            <a:off x="7355830" y="4145664"/>
+            <a:ext cx="482282" cy="227988"/>
           </a:xfrm>
           <a:prstGeom prst="rect">
             <a:avLst/>
@@ -5148,7 +5903,7 @@
     </p:spTree>
     <p:extLst>
       <p:ext uri="{BB962C8B-B14F-4D97-AF65-F5344CB8AC3E}">
-        <p14:creationId xmlns:p14="http://schemas.microsoft.com/office/powerpoint/2010/main" val="3230322937"/>
+        <p14:creationId xmlns:p14="http://schemas.microsoft.com/office/powerpoint/2010/main" val="1045529663"/>
       </p:ext>
     </p:extLst>
   </p:cSld>
@@ -5175,59 +5930,12 @@
           <a:chExt cx="0" cy="0"/>
         </a:xfrm>
       </p:grpSpPr>
-      <p:pic>
-        <p:nvPicPr>
-          <p:cNvPr id="2" name="Picture 2">
-            <a:extLst>
-              <a:ext uri="{FF2B5EF4-FFF2-40B4-BE49-F238E27FC236}">
-                <a16:creationId xmlns:a16="http://schemas.microsoft.com/office/drawing/2014/main" id="{8BBC3618-A151-4772-556A-369529627BC3}"/>
-              </a:ext>
-            </a:extLst>
-          </p:cNvPr>
-          <p:cNvPicPr>
-            <a:picLocks noChangeAspect="1" noChangeArrowheads="1"/>
-          </p:cNvPicPr>
-          <p:nvPr/>
-        </p:nvPicPr>
-        <p:blipFill>
-          <a:blip r:embed="rId3">
-            <a:extLst>
-              <a:ext uri="{28A0092B-C50C-407E-A947-70E740481C1C}">
-                <a14:useLocalDpi xmlns:a14="http://schemas.microsoft.com/office/drawing/2010/main" val="0"/>
-              </a:ext>
-            </a:extLst>
-          </a:blip>
-          <a:srcRect/>
-          <a:stretch>
-            <a:fillRect/>
-          </a:stretch>
-        </p:blipFill>
-        <p:spPr bwMode="auto">
-          <a:xfrm>
-            <a:off x="316054" y="1923617"/>
-            <a:ext cx="11341100" cy="2590800"/>
-          </a:xfrm>
-          <a:prstGeom prst="rect">
-            <a:avLst/>
-          </a:prstGeom>
-          <a:noFill/>
-          <a:extLst>
-            <a:ext uri="{909E8E84-426E-40DD-AFC4-6F175D3DCCD1}">
-              <a14:hiddenFill xmlns:a14="http://schemas.microsoft.com/office/drawing/2010/main">
-                <a:solidFill>
-                  <a:srgbClr val="FFFFFF"/>
-                </a:solidFill>
-              </a14:hiddenFill>
-            </a:ext>
-          </a:extLst>
-        </p:spPr>
-      </p:pic>
-      <p:sp>
-        <p:nvSpPr>
-          <p:cNvPr id="4" name="Rechteck 3">
-            <a:extLst>
-              <a:ext uri="{FF2B5EF4-FFF2-40B4-BE49-F238E27FC236}">
-                <a16:creationId xmlns:a16="http://schemas.microsoft.com/office/drawing/2014/main" id="{9817D8CD-B2B1-4EBE-B8C5-63FCD2373FAB}"/>
+      <p:sp>
+        <p:nvSpPr>
+          <p:cNvPr id="3" name="Rechteck 2">
+            <a:extLst>
+              <a:ext uri="{FF2B5EF4-FFF2-40B4-BE49-F238E27FC236}">
+                <a16:creationId xmlns:a16="http://schemas.microsoft.com/office/drawing/2014/main" id="{8A60A9A5-47B6-F11F-0488-373B184D160E}"/>
               </a:ext>
             </a:extLst>
           </p:cNvPr>
@@ -5236,8 +5944,8 @@
         </p:nvSpPr>
         <p:spPr>
           <a:xfrm>
-            <a:off x="5636871" y="4269176"/>
-            <a:ext cx="1551007" cy="532436"/>
+            <a:off x="669413" y="413473"/>
+            <a:ext cx="11125028" cy="316656"/>
           </a:xfrm>
           <a:prstGeom prst="rect">
             <a:avLst/>
@@ -5276,170 +5984,70 @@
           </a:p>
         </p:txBody>
       </p:sp>
-      <p:sp>
-        <p:nvSpPr>
-          <p:cNvPr id="5" name="Rechteck 4">
-            <a:extLst>
-              <a:ext uri="{FF2B5EF4-FFF2-40B4-BE49-F238E27FC236}">
-                <a16:creationId xmlns:a16="http://schemas.microsoft.com/office/drawing/2014/main" id="{B7FED5E2-A39B-F2D3-9525-FA48411493F0}"/>
-              </a:ext>
-            </a:extLst>
-          </p:cNvPr>
-          <p:cNvSpPr/>
+      <p:pic>
+        <p:nvPicPr>
+          <p:cNvPr id="2" name="Grafik 1">
+            <a:extLst>
+              <a:ext uri="{FF2B5EF4-FFF2-40B4-BE49-F238E27FC236}">
+                <a16:creationId xmlns:a16="http://schemas.microsoft.com/office/drawing/2014/main" id="{9F385B11-B76C-975F-ED35-74CBEC826BB2}"/>
+              </a:ext>
+            </a:extLst>
+          </p:cNvPr>
+          <p:cNvPicPr>
+            <a:picLocks noChangeAspect="1"/>
+          </p:cNvPicPr>
           <p:nvPr/>
-        </p:nvSpPr>
-        <p:spPr>
-          <a:xfrm>
-            <a:off x="1" y="2397888"/>
-            <a:ext cx="534846" cy="947196"/>
+        </p:nvPicPr>
+        <p:blipFill>
+          <a:blip r:embed="rId3"/>
+          <a:stretch>
+            <a:fillRect/>
+          </a:stretch>
+        </p:blipFill>
+        <p:spPr>
+          <a:xfrm>
+            <a:off x="712980" y="251079"/>
+            <a:ext cx="11093818" cy="310678"/>
           </a:xfrm>
           <a:prstGeom prst="rect">
             <a:avLst/>
           </a:prstGeom>
-          <a:solidFill>
-            <a:schemeClr val="bg1"/>
-          </a:solidFill>
-          <a:ln>
-            <a:solidFill>
-              <a:schemeClr val="bg1"/>
-            </a:solidFill>
-          </a:ln>
-        </p:spPr>
-        <p:style>
-          <a:lnRef idx="2">
-            <a:schemeClr val="accent1">
-              <a:shade val="50000"/>
-            </a:schemeClr>
-          </a:lnRef>
-          <a:fillRef idx="1">
-            <a:schemeClr val="accent1"/>
-          </a:fillRef>
-          <a:effectRef idx="0">
-            <a:schemeClr val="accent1"/>
-          </a:effectRef>
-          <a:fontRef idx="minor">
-            <a:schemeClr val="lt1"/>
-          </a:fontRef>
-        </p:style>
-        <p:txBody>
-          <a:bodyPr rtlCol="0" anchor="ctr"/>
-          <a:lstStyle/>
-          <a:p>
-            <a:pPr algn="ctr"/>
-            <a:endParaRPr lang="de-DE"/>
-          </a:p>
-        </p:txBody>
-      </p:sp>
-      <p:sp>
-        <p:nvSpPr>
-          <p:cNvPr id="11" name="Textfeld 10">
-            <a:extLst>
-              <a:ext uri="{FF2B5EF4-FFF2-40B4-BE49-F238E27FC236}">
-                <a16:creationId xmlns:a16="http://schemas.microsoft.com/office/drawing/2014/main" id="{70EE1512-C048-8FEA-FDF5-127FCB9DBE48}"/>
-              </a:ext>
-            </a:extLst>
-          </p:cNvPr>
-          <p:cNvSpPr txBox="1"/>
+        </p:spPr>
+      </p:pic>
+      <p:pic>
+        <p:nvPicPr>
+          <p:cNvPr id="4" name="Grafik 3">
+            <a:extLst>
+              <a:ext uri="{FF2B5EF4-FFF2-40B4-BE49-F238E27FC236}">
+                <a16:creationId xmlns:a16="http://schemas.microsoft.com/office/drawing/2014/main" id="{BAD3BF93-35FC-5BAE-7673-3E28D46CD80D}"/>
+              </a:ext>
+            </a:extLst>
+          </p:cNvPr>
+          <p:cNvPicPr>
+            <a:picLocks noChangeAspect="1"/>
+          </p:cNvPicPr>
           <p:nvPr/>
-        </p:nvSpPr>
-        <p:spPr>
-          <a:xfrm rot="16200000">
-            <a:off x="-262128" y="2594936"/>
-            <a:ext cx="1130964" cy="369332"/>
+        </p:nvPicPr>
+        <p:blipFill>
+          <a:blip r:embed="rId4"/>
+          <a:stretch>
+            <a:fillRect/>
+          </a:stretch>
+        </p:blipFill>
+        <p:spPr>
+          <a:xfrm>
+            <a:off x="397559" y="571801"/>
+            <a:ext cx="11396882" cy="2893508"/>
           </a:xfrm>
           <a:prstGeom prst="rect">
             <a:avLst/>
           </a:prstGeom>
-          <a:noFill/>
-        </p:spPr>
-        <p:txBody>
-          <a:bodyPr wrap="square" rtlCol="0">
-            <a:spAutoFit/>
-          </a:bodyPr>
-          <a:lstStyle/>
-          <a:p>
-            <a:r>
-              <a:rPr lang="de-DE"/>
-              <a:t>Targets</a:t>
-            </a:r>
-          </a:p>
-        </p:txBody>
-      </p:sp>
-      <p:sp>
-        <p:nvSpPr>
-          <p:cNvPr id="12" name="Textfeld 11">
-            <a:extLst>
-              <a:ext uri="{FF2B5EF4-FFF2-40B4-BE49-F238E27FC236}">
-                <a16:creationId xmlns:a16="http://schemas.microsoft.com/office/drawing/2014/main" id="{10A65E60-8D34-9E58-05E5-F3BD887B2B84}"/>
-              </a:ext>
-            </a:extLst>
-          </p:cNvPr>
-          <p:cNvSpPr txBox="1"/>
-          <p:nvPr/>
-        </p:nvSpPr>
-        <p:spPr>
-          <a:xfrm>
-            <a:off x="6179798" y="4227288"/>
-            <a:ext cx="2161812" cy="369332"/>
-          </a:xfrm>
-          <a:prstGeom prst="rect">
-            <a:avLst/>
-          </a:prstGeom>
-          <a:noFill/>
-        </p:spPr>
-        <p:txBody>
-          <a:bodyPr wrap="square" rtlCol="0">
-            <a:spAutoFit/>
-          </a:bodyPr>
-          <a:lstStyle/>
-          <a:p>
-            <a:r>
-              <a:rPr lang="de-DE"/>
-              <a:t>Input Features</a:t>
-            </a:r>
-          </a:p>
-        </p:txBody>
-      </p:sp>
-      <p:sp>
-        <p:nvSpPr>
-          <p:cNvPr id="13" name="Textfeld 12">
-            <a:extLst>
-              <a:ext uri="{FF2B5EF4-FFF2-40B4-BE49-F238E27FC236}">
-                <a16:creationId xmlns:a16="http://schemas.microsoft.com/office/drawing/2014/main" id="{ADD40B8C-E0EC-1B7B-435B-53EC7EDFCDAD}"/>
-              </a:ext>
-            </a:extLst>
-          </p:cNvPr>
-          <p:cNvSpPr txBox="1"/>
-          <p:nvPr/>
-        </p:nvSpPr>
-        <p:spPr>
-          <a:xfrm rot="16200000">
-            <a:off x="10325561" y="2455843"/>
-            <a:ext cx="1280010" cy="584775"/>
-          </a:xfrm>
-          <a:prstGeom prst="rect">
-            <a:avLst/>
-          </a:prstGeom>
-          <a:noFill/>
-        </p:spPr>
-        <p:txBody>
-          <a:bodyPr wrap="square" rtlCol="0">
-            <a:spAutoFit/>
-          </a:bodyPr>
-          <a:lstStyle/>
-          <a:p>
-            <a:pPr algn="ctr"/>
-            <a:r>
-              <a:rPr lang="de-DE" sz="1600"/>
-              <a:t>Correlation Coefficient</a:t>
-            </a:r>
-          </a:p>
-        </p:txBody>
-      </p:sp>
+        </p:spPr>
+      </p:pic>
     </p:spTree>
     <p:extLst>
       <p:ext uri="{BB962C8B-B14F-4D97-AF65-F5344CB8AC3E}">
-        <p14:creationId xmlns:p14="http://schemas.microsoft.com/office/powerpoint/2010/main" val="3008082199"/>
+        <p14:creationId xmlns:p14="http://schemas.microsoft.com/office/powerpoint/2010/main" val="3230322937"/>
       </p:ext>
     </p:extLst>
   </p:cSld>
@@ -5468,10 +6076,10 @@
       </p:grpSpPr>
       <p:pic>
         <p:nvPicPr>
-          <p:cNvPr id="2052" name="Picture 4">
-            <a:extLst>
-              <a:ext uri="{FF2B5EF4-FFF2-40B4-BE49-F238E27FC236}">
-                <a16:creationId xmlns:a16="http://schemas.microsoft.com/office/drawing/2014/main" id="{1750A7BD-1EA7-FE04-1B0B-7E3D02683640}"/>
+          <p:cNvPr id="2" name="Picture 2">
+            <a:extLst>
+              <a:ext uri="{FF2B5EF4-FFF2-40B4-BE49-F238E27FC236}">
+                <a16:creationId xmlns:a16="http://schemas.microsoft.com/office/drawing/2014/main" id="{8BBC3618-A151-4772-556A-369529627BC3}"/>
               </a:ext>
             </a:extLst>
           </p:cNvPr>
@@ -5495,8 +6103,8 @@
         </p:blipFill>
         <p:spPr bwMode="auto">
           <a:xfrm>
-            <a:off x="252554" y="1967720"/>
-            <a:ext cx="11404600" cy="2628900"/>
+            <a:off x="316054" y="1923617"/>
+            <a:ext cx="11341100" cy="2590800"/>
           </a:xfrm>
           <a:prstGeom prst="rect">
             <a:avLst/>
@@ -5581,8 +6189,8 @@
         </p:nvSpPr>
         <p:spPr>
           <a:xfrm>
-            <a:off x="93974" y="2397888"/>
-            <a:ext cx="403802" cy="947196"/>
+            <a:off x="1" y="2397888"/>
+            <a:ext cx="534846" cy="947196"/>
           </a:xfrm>
           <a:prstGeom prst="rect">
             <a:avLst/>
@@ -5730,7 +6338,7 @@
     </p:spTree>
     <p:extLst>
       <p:ext uri="{BB962C8B-B14F-4D97-AF65-F5344CB8AC3E}">
-        <p14:creationId xmlns:p14="http://schemas.microsoft.com/office/powerpoint/2010/main" val="2040277198"/>
+        <p14:creationId xmlns:p14="http://schemas.microsoft.com/office/powerpoint/2010/main" val="3008082199"/>
       </p:ext>
     </p:extLst>
   </p:cSld>
@@ -5759,137 +6367,180 @@
       </p:grpSpPr>
       <p:pic>
         <p:nvPicPr>
-          <p:cNvPr id="2" name="Grafik 1">
-            <a:extLst>
-              <a:ext uri="{FF2B5EF4-FFF2-40B4-BE49-F238E27FC236}">
-                <a16:creationId xmlns:a16="http://schemas.microsoft.com/office/drawing/2014/main" id="{9768EA39-627B-C584-A24D-E6D1A5B4D95B}"/>
+          <p:cNvPr id="2052" name="Picture 4">
+            <a:extLst>
+              <a:ext uri="{FF2B5EF4-FFF2-40B4-BE49-F238E27FC236}">
+                <a16:creationId xmlns:a16="http://schemas.microsoft.com/office/drawing/2014/main" id="{1750A7BD-1EA7-FE04-1B0B-7E3D02683640}"/>
               </a:ext>
             </a:extLst>
           </p:cNvPr>
           <p:cNvPicPr>
-            <a:picLocks noChangeAspect="1"/>
+            <a:picLocks noChangeAspect="1" noChangeArrowheads="1"/>
           </p:cNvPicPr>
           <p:nvPr/>
         </p:nvPicPr>
         <p:blipFill>
-          <a:blip r:embed="rId3"/>
+          <a:blip r:embed="rId3">
+            <a:extLst>
+              <a:ext uri="{28A0092B-C50C-407E-A947-70E740481C1C}">
+                <a14:useLocalDpi xmlns:a14="http://schemas.microsoft.com/office/drawing/2010/main" val="0"/>
+              </a:ext>
+            </a:extLst>
+          </a:blip>
+          <a:srcRect/>
           <a:stretch>
             <a:fillRect/>
           </a:stretch>
         </p:blipFill>
-        <p:spPr>
-          <a:xfrm>
-            <a:off x="1920433" y="368782"/>
-            <a:ext cx="7772400" cy="1907249"/>
+        <p:spPr bwMode="auto">
+          <a:xfrm>
+            <a:off x="252554" y="1967720"/>
+            <a:ext cx="11404600" cy="2628900"/>
           </a:xfrm>
           <a:prstGeom prst="rect">
             <a:avLst/>
           </a:prstGeom>
+          <a:noFill/>
+          <a:extLst>
+            <a:ext uri="{909E8E84-426E-40DD-AFC4-6F175D3DCCD1}">
+              <a14:hiddenFill xmlns:a14="http://schemas.microsoft.com/office/drawing/2010/main">
+                <a:solidFill>
+                  <a:srgbClr val="FFFFFF"/>
+                </a:solidFill>
+              </a14:hiddenFill>
+            </a:ext>
+          </a:extLst>
         </p:spPr>
       </p:pic>
-      <p:pic>
-        <p:nvPicPr>
-          <p:cNvPr id="3" name="Grafik 2">
-            <a:extLst>
-              <a:ext uri="{FF2B5EF4-FFF2-40B4-BE49-F238E27FC236}">
-                <a16:creationId xmlns:a16="http://schemas.microsoft.com/office/drawing/2014/main" id="{ECE26964-11E3-91D4-9480-6EB9044F4DDB}"/>
-              </a:ext>
-            </a:extLst>
-          </p:cNvPr>
-          <p:cNvPicPr>
-            <a:picLocks noChangeAspect="1"/>
-          </p:cNvPicPr>
+      <p:sp>
+        <p:nvSpPr>
+          <p:cNvPr id="4" name="Rechteck 3">
+            <a:extLst>
+              <a:ext uri="{FF2B5EF4-FFF2-40B4-BE49-F238E27FC236}">
+                <a16:creationId xmlns:a16="http://schemas.microsoft.com/office/drawing/2014/main" id="{9817D8CD-B2B1-4EBE-B8C5-63FCD2373FAB}"/>
+              </a:ext>
+            </a:extLst>
+          </p:cNvPr>
+          <p:cNvSpPr/>
           <p:nvPr/>
-        </p:nvPicPr>
-        <p:blipFill>
-          <a:blip r:embed="rId4"/>
-          <a:stretch>
-            <a:fillRect/>
-          </a:stretch>
-        </p:blipFill>
-        <p:spPr>
-          <a:xfrm>
-            <a:off x="1920433" y="2375819"/>
-            <a:ext cx="7772400" cy="3749968"/>
-          </a:xfrm>
-          <a:prstGeom prst="rect">
-            <a:avLst/>
-          </a:prstGeom>
-        </p:spPr>
-      </p:pic>
-      <p:sp>
-        <p:nvSpPr>
-          <p:cNvPr id="6" name="Textfeld 5">
-            <a:extLst>
-              <a:ext uri="{FF2B5EF4-FFF2-40B4-BE49-F238E27FC236}">
-                <a16:creationId xmlns:a16="http://schemas.microsoft.com/office/drawing/2014/main" id="{BD99F089-52D4-5901-CBE0-D593D0D09E69}"/>
-              </a:ext>
-            </a:extLst>
-          </p:cNvPr>
-          <p:cNvSpPr txBox="1"/>
-          <p:nvPr/>
-        </p:nvSpPr>
-        <p:spPr>
-          <a:xfrm>
-            <a:off x="5336286" y="572768"/>
-            <a:ext cx="295234" cy="338554"/>
+        </p:nvSpPr>
+        <p:spPr>
+          <a:xfrm>
+            <a:off x="5636871" y="4269176"/>
+            <a:ext cx="1551007" cy="532436"/>
           </a:xfrm>
           <a:prstGeom prst="rect">
             <a:avLst/>
           </a:prstGeom>
           <a:solidFill>
-            <a:schemeClr val="bg1">
-              <a:lumMod val="75000"/>
-            </a:schemeClr>
+            <a:schemeClr val="bg1"/>
           </a:solidFill>
           <a:ln>
-            <a:noFill/>
+            <a:solidFill>
+              <a:schemeClr val="bg1"/>
+            </a:solidFill>
           </a:ln>
         </p:spPr>
-        <p:txBody>
-          <a:bodyPr wrap="square" rtlCol="0">
-            <a:spAutoFit/>
-          </a:bodyPr>
-          <a:lstStyle/>
-          <a:p>
-            <a:r>
-              <a:rPr lang="de-DE" sz="1600" b="1">
-                <a:latin typeface="Arial" panose="020B0604020202020204" pitchFamily="34" charset="0"/>
-                <a:cs typeface="Arial" panose="020B0604020202020204" pitchFamily="34" charset="0"/>
-              </a:rPr>
-              <a:t>A</a:t>
-            </a:r>
-          </a:p>
-        </p:txBody>
-      </p:sp>
-      <p:sp>
-        <p:nvSpPr>
-          <p:cNvPr id="7" name="Textfeld 6">
-            <a:extLst>
-              <a:ext uri="{FF2B5EF4-FFF2-40B4-BE49-F238E27FC236}">
-                <a16:creationId xmlns:a16="http://schemas.microsoft.com/office/drawing/2014/main" id="{0857B115-7DD7-115E-E2DE-85BCB71B157F}"/>
-              </a:ext>
-            </a:extLst>
-          </p:cNvPr>
-          <p:cNvSpPr txBox="1"/>
+        <p:style>
+          <a:lnRef idx="2">
+            <a:schemeClr val="accent1">
+              <a:shade val="50000"/>
+            </a:schemeClr>
+          </a:lnRef>
+          <a:fillRef idx="1">
+            <a:schemeClr val="accent1"/>
+          </a:fillRef>
+          <a:effectRef idx="0">
+            <a:schemeClr val="accent1"/>
+          </a:effectRef>
+          <a:fontRef idx="minor">
+            <a:schemeClr val="lt1"/>
+          </a:fontRef>
+        </p:style>
+        <p:txBody>
+          <a:bodyPr rtlCol="0" anchor="ctr"/>
+          <a:lstStyle/>
+          <a:p>
+            <a:pPr algn="ctr"/>
+            <a:endParaRPr lang="de-DE"/>
+          </a:p>
+        </p:txBody>
+      </p:sp>
+      <p:sp>
+        <p:nvSpPr>
+          <p:cNvPr id="5" name="Rechteck 4">
+            <a:extLst>
+              <a:ext uri="{FF2B5EF4-FFF2-40B4-BE49-F238E27FC236}">
+                <a16:creationId xmlns:a16="http://schemas.microsoft.com/office/drawing/2014/main" id="{B7FED5E2-A39B-F2D3-9525-FA48411493F0}"/>
+              </a:ext>
+            </a:extLst>
+          </p:cNvPr>
+          <p:cNvSpPr/>
           <p:nvPr/>
         </p:nvSpPr>
         <p:spPr>
           <a:xfrm>
-            <a:off x="5316622" y="2409579"/>
-            <a:ext cx="295234" cy="338554"/>
+            <a:off x="93974" y="2397888"/>
+            <a:ext cx="403802" cy="947196"/>
           </a:xfrm>
           <a:prstGeom prst="rect">
             <a:avLst/>
           </a:prstGeom>
           <a:solidFill>
-            <a:schemeClr val="bg1">
-              <a:lumMod val="75000"/>
-            </a:schemeClr>
+            <a:schemeClr val="bg1"/>
           </a:solidFill>
           <a:ln>
-            <a:noFill/>
+            <a:solidFill>
+              <a:schemeClr val="bg1"/>
+            </a:solidFill>
           </a:ln>
+        </p:spPr>
+        <p:style>
+          <a:lnRef idx="2">
+            <a:schemeClr val="accent1">
+              <a:shade val="50000"/>
+            </a:schemeClr>
+          </a:lnRef>
+          <a:fillRef idx="1">
+            <a:schemeClr val="accent1"/>
+          </a:fillRef>
+          <a:effectRef idx="0">
+            <a:schemeClr val="accent1"/>
+          </a:effectRef>
+          <a:fontRef idx="minor">
+            <a:schemeClr val="lt1"/>
+          </a:fontRef>
+        </p:style>
+        <p:txBody>
+          <a:bodyPr rtlCol="0" anchor="ctr"/>
+          <a:lstStyle/>
+          <a:p>
+            <a:pPr algn="ctr"/>
+            <a:endParaRPr lang="de-DE"/>
+          </a:p>
+        </p:txBody>
+      </p:sp>
+      <p:sp>
+        <p:nvSpPr>
+          <p:cNvPr id="11" name="Textfeld 10">
+            <a:extLst>
+              <a:ext uri="{FF2B5EF4-FFF2-40B4-BE49-F238E27FC236}">
+                <a16:creationId xmlns:a16="http://schemas.microsoft.com/office/drawing/2014/main" id="{70EE1512-C048-8FEA-FDF5-127FCB9DBE48}"/>
+              </a:ext>
+            </a:extLst>
+          </p:cNvPr>
+          <p:cNvSpPr txBox="1"/>
+          <p:nvPr/>
+        </p:nvSpPr>
+        <p:spPr>
+          <a:xfrm rot="16200000">
+            <a:off x="-262128" y="2594936"/>
+            <a:ext cx="1130964" cy="369332"/>
+          </a:xfrm>
+          <a:prstGeom prst="rect">
+            <a:avLst/>
+          </a:prstGeom>
+          <a:noFill/>
         </p:spPr>
         <p:txBody>
           <a:bodyPr wrap="square" rtlCol="0">
@@ -5898,21 +6549,18 @@
           <a:lstStyle/>
           <a:p>
             <a:r>
-              <a:rPr lang="de-DE" sz="1600" b="1">
-                <a:latin typeface="Arial" panose="020B0604020202020204" pitchFamily="34" charset="0"/>
-                <a:cs typeface="Arial" panose="020B0604020202020204" pitchFamily="34" charset="0"/>
-              </a:rPr>
-              <a:t>C</a:t>
-            </a:r>
-          </a:p>
-        </p:txBody>
-      </p:sp>
-      <p:sp>
-        <p:nvSpPr>
-          <p:cNvPr id="8" name="Textfeld 7">
-            <a:extLst>
-              <a:ext uri="{FF2B5EF4-FFF2-40B4-BE49-F238E27FC236}">
-                <a16:creationId xmlns:a16="http://schemas.microsoft.com/office/drawing/2014/main" id="{5ED38475-75D3-7859-4982-A8443EAD950A}"/>
+              <a:rPr lang="de-DE"/>
+              <a:t>Targets</a:t>
+            </a:r>
+          </a:p>
+        </p:txBody>
+      </p:sp>
+      <p:sp>
+        <p:nvSpPr>
+          <p:cNvPr id="12" name="Textfeld 11">
+            <a:extLst>
+              <a:ext uri="{FF2B5EF4-FFF2-40B4-BE49-F238E27FC236}">
+                <a16:creationId xmlns:a16="http://schemas.microsoft.com/office/drawing/2014/main" id="{10A65E60-8D34-9E58-05E5-F3BD887B2B84}"/>
               </a:ext>
             </a:extLst>
           </p:cNvPr>
@@ -5921,20 +6569,13 @@
         </p:nvSpPr>
         <p:spPr>
           <a:xfrm>
-            <a:off x="5316622" y="4266054"/>
-            <a:ext cx="295234" cy="338554"/>
+            <a:off x="6179798" y="4227288"/>
+            <a:ext cx="2161812" cy="369332"/>
           </a:xfrm>
           <a:prstGeom prst="rect">
             <a:avLst/>
           </a:prstGeom>
-          <a:solidFill>
-            <a:schemeClr val="bg1">
-              <a:lumMod val="75000"/>
-            </a:schemeClr>
-          </a:solidFill>
-          <a:ln>
-            <a:noFill/>
-          </a:ln>
+          <a:noFill/>
         </p:spPr>
         <p:txBody>
           <a:bodyPr wrap="square" rtlCol="0">
@@ -5943,21 +6584,18 @@
           <a:lstStyle/>
           <a:p>
             <a:r>
-              <a:rPr lang="de-DE" sz="1600" b="1">
-                <a:latin typeface="Arial" panose="020B0604020202020204" pitchFamily="34" charset="0"/>
-                <a:cs typeface="Arial" panose="020B0604020202020204" pitchFamily="34" charset="0"/>
-              </a:rPr>
-              <a:t>E</a:t>
-            </a:r>
-          </a:p>
-        </p:txBody>
-      </p:sp>
-      <p:sp>
-        <p:nvSpPr>
-          <p:cNvPr id="9" name="Textfeld 8">
-            <a:extLst>
-              <a:ext uri="{FF2B5EF4-FFF2-40B4-BE49-F238E27FC236}">
-                <a16:creationId xmlns:a16="http://schemas.microsoft.com/office/drawing/2014/main" id="{4348FDF3-1A08-65CC-E590-F25704D00823}"/>
+              <a:rPr lang="de-DE"/>
+              <a:t>Input Features</a:t>
+            </a:r>
+          </a:p>
+        </p:txBody>
+      </p:sp>
+      <p:sp>
+        <p:nvSpPr>
+          <p:cNvPr id="13" name="Textfeld 12">
+            <a:extLst>
+              <a:ext uri="{FF2B5EF4-FFF2-40B4-BE49-F238E27FC236}">
+                <a16:creationId xmlns:a16="http://schemas.microsoft.com/office/drawing/2014/main" id="{ADD40B8C-E0EC-1B7B-435B-53EC7EDFCDAD}"/>
               </a:ext>
             </a:extLst>
           </p:cNvPr>
@@ -5965,21 +6603,14 @@
           <p:nvPr/>
         </p:nvSpPr>
         <p:spPr>
-          <a:xfrm>
-            <a:off x="9352763" y="567869"/>
-            <a:ext cx="295234" cy="338554"/>
+          <a:xfrm rot="16200000">
+            <a:off x="10325561" y="2455843"/>
+            <a:ext cx="1280010" cy="584775"/>
           </a:xfrm>
           <a:prstGeom prst="rect">
             <a:avLst/>
           </a:prstGeom>
-          <a:solidFill>
-            <a:schemeClr val="bg1">
-              <a:lumMod val="75000"/>
-            </a:schemeClr>
-          </a:solidFill>
-          <a:ln>
-            <a:noFill/>
-          </a:ln>
+          <a:noFill/>
         </p:spPr>
         <p:txBody>
           <a:bodyPr wrap="square" rtlCol="0">
@@ -5987,102 +6618,10 @@
           </a:bodyPr>
           <a:lstStyle/>
           <a:p>
-            <a:r>
-              <a:rPr lang="de-DE" sz="1600" b="1">
-                <a:latin typeface="Arial" panose="020B0604020202020204" pitchFamily="34" charset="0"/>
-                <a:cs typeface="Arial" panose="020B0604020202020204" pitchFamily="34" charset="0"/>
-              </a:rPr>
-              <a:t>B</a:t>
-            </a:r>
-          </a:p>
-        </p:txBody>
-      </p:sp>
-      <p:sp>
-        <p:nvSpPr>
-          <p:cNvPr id="10" name="Textfeld 9">
-            <a:extLst>
-              <a:ext uri="{FF2B5EF4-FFF2-40B4-BE49-F238E27FC236}">
-                <a16:creationId xmlns:a16="http://schemas.microsoft.com/office/drawing/2014/main" id="{648FB14A-DF52-0A00-58EA-69ADBEFEDC0B}"/>
-              </a:ext>
-            </a:extLst>
-          </p:cNvPr>
-          <p:cNvSpPr txBox="1"/>
-          <p:nvPr/>
-        </p:nvSpPr>
-        <p:spPr>
-          <a:xfrm>
-            <a:off x="9342931" y="2404680"/>
-            <a:ext cx="295234" cy="338554"/>
-          </a:xfrm>
-          <a:prstGeom prst="rect">
-            <a:avLst/>
-          </a:prstGeom>
-          <a:solidFill>
-            <a:schemeClr val="bg1">
-              <a:lumMod val="75000"/>
-            </a:schemeClr>
-          </a:solidFill>
-          <a:ln>
-            <a:noFill/>
-          </a:ln>
-        </p:spPr>
-        <p:txBody>
-          <a:bodyPr wrap="square" rtlCol="0">
-            <a:spAutoFit/>
-          </a:bodyPr>
-          <a:lstStyle/>
-          <a:p>
-            <a:r>
-              <a:rPr lang="de-DE" sz="1600" b="1">
-                <a:latin typeface="Arial" panose="020B0604020202020204" pitchFamily="34" charset="0"/>
-                <a:cs typeface="Arial" panose="020B0604020202020204" pitchFamily="34" charset="0"/>
-              </a:rPr>
-              <a:t>D</a:t>
-            </a:r>
-          </a:p>
-        </p:txBody>
-      </p:sp>
-      <p:sp>
-        <p:nvSpPr>
-          <p:cNvPr id="14" name="Textfeld 13">
-            <a:extLst>
-              <a:ext uri="{FF2B5EF4-FFF2-40B4-BE49-F238E27FC236}">
-                <a16:creationId xmlns:a16="http://schemas.microsoft.com/office/drawing/2014/main" id="{55881114-08E5-ECB3-E7FD-47D157F3DBA4}"/>
-              </a:ext>
-            </a:extLst>
-          </p:cNvPr>
-          <p:cNvSpPr txBox="1"/>
-          <p:nvPr/>
-        </p:nvSpPr>
-        <p:spPr>
-          <a:xfrm>
-            <a:off x="9342931" y="4270987"/>
-            <a:ext cx="295234" cy="338554"/>
-          </a:xfrm>
-          <a:prstGeom prst="rect">
-            <a:avLst/>
-          </a:prstGeom>
-          <a:solidFill>
-            <a:schemeClr val="bg1">
-              <a:lumMod val="75000"/>
-            </a:schemeClr>
-          </a:solidFill>
-          <a:ln>
-            <a:noFill/>
-          </a:ln>
-        </p:spPr>
-        <p:txBody>
-          <a:bodyPr wrap="square" rtlCol="0">
-            <a:spAutoFit/>
-          </a:bodyPr>
-          <a:lstStyle/>
-          <a:p>
-            <a:r>
-              <a:rPr lang="de-DE" sz="1600" b="1">
-                <a:latin typeface="Arial" panose="020B0604020202020204" pitchFamily="34" charset="0"/>
-                <a:cs typeface="Arial" panose="020B0604020202020204" pitchFamily="34" charset="0"/>
-              </a:rPr>
-              <a:t>F</a:t>
+            <a:pPr algn="ctr"/>
+            <a:r>
+              <a:rPr lang="de-DE" sz="1600"/>
+              <a:t>Correlation Coefficient</a:t>
             </a:r>
           </a:p>
         </p:txBody>
@@ -6090,7 +6629,7 @@
     </p:spTree>
     <p:extLst>
       <p:ext uri="{BB962C8B-B14F-4D97-AF65-F5344CB8AC3E}">
-        <p14:creationId xmlns:p14="http://schemas.microsoft.com/office/powerpoint/2010/main" val="2201591049"/>
+        <p14:creationId xmlns:p14="http://schemas.microsoft.com/office/powerpoint/2010/main" val="2040277198"/>
       </p:ext>
     </p:extLst>
   </p:cSld>
@@ -6326,15 +6865,15 @@
         </p:nvSpPr>
         <p:spPr>
           <a:xfrm>
-            <a:off x="8291279" y="565003"/>
-            <a:ext cx="1346886" cy="307777"/>
+            <a:off x="9352763" y="567869"/>
+            <a:ext cx="295234" cy="338554"/>
           </a:xfrm>
           <a:prstGeom prst="rect">
             <a:avLst/>
           </a:prstGeom>
           <a:solidFill>
             <a:schemeClr val="bg1">
-              <a:lumMod val="85000"/>
+              <a:lumMod val="75000"/>
             </a:schemeClr>
           </a:solidFill>
           <a:ln>
@@ -6347,23 +6886,22 @@
           </a:bodyPr>
           <a:lstStyle/>
           <a:p>
-            <a:pPr algn="r"/>
-            <a:r>
-              <a:rPr lang="de-DE" sz="1400">
+            <a:r>
+              <a:rPr lang="de-DE" sz="1600" b="1">
                 <a:latin typeface="Arial" panose="020B0604020202020204" pitchFamily="34" charset="0"/>
                 <a:cs typeface="Arial" panose="020B0604020202020204" pitchFamily="34" charset="0"/>
               </a:rPr>
-              <a:t>current phase</a:t>
-            </a:r>
-          </a:p>
-        </p:txBody>
-      </p:sp>
-      <p:sp>
-        <p:nvSpPr>
-          <p:cNvPr id="4" name="Textfeld 3">
-            <a:extLst>
-              <a:ext uri="{FF2B5EF4-FFF2-40B4-BE49-F238E27FC236}">
-                <a16:creationId xmlns:a16="http://schemas.microsoft.com/office/drawing/2014/main" id="{AD11839F-9FBD-2811-225A-66B10D8C04E8}"/>
+              <a:t>B</a:t>
+            </a:r>
+          </a:p>
+        </p:txBody>
+      </p:sp>
+      <p:sp>
+        <p:nvSpPr>
+          <p:cNvPr id="10" name="Textfeld 9">
+            <a:extLst>
+              <a:ext uri="{FF2B5EF4-FFF2-40B4-BE49-F238E27FC236}">
+                <a16:creationId xmlns:a16="http://schemas.microsoft.com/office/drawing/2014/main" id="{648FB14A-DF52-0A00-58EA-69ADBEFEDC0B}"/>
               </a:ext>
             </a:extLst>
           </p:cNvPr>
@@ -6372,15 +6910,15 @@
         </p:nvSpPr>
         <p:spPr>
           <a:xfrm>
-            <a:off x="7512909" y="4259875"/>
-            <a:ext cx="2112900" cy="307777"/>
+            <a:off x="9342931" y="2404680"/>
+            <a:ext cx="295234" cy="338554"/>
           </a:xfrm>
           <a:prstGeom prst="rect">
             <a:avLst/>
           </a:prstGeom>
           <a:solidFill>
             <a:schemeClr val="bg1">
-              <a:lumMod val="85000"/>
+              <a:lumMod val="75000"/>
             </a:schemeClr>
           </a:solidFill>
           <a:ln>
@@ -6393,23 +6931,22 @@
           </a:bodyPr>
           <a:lstStyle/>
           <a:p>
-            <a:pPr algn="r"/>
-            <a:r>
-              <a:rPr lang="de-DE" sz="1400">
+            <a:r>
+              <a:rPr lang="de-DE" sz="1600" b="1">
                 <a:latin typeface="Arial" panose="020B0604020202020204" pitchFamily="34" charset="0"/>
                 <a:cs typeface="Arial" panose="020B0604020202020204" pitchFamily="34" charset="0"/>
               </a:rPr>
-              <a:t>6 months into the future</a:t>
-            </a:r>
-          </a:p>
-        </p:txBody>
-      </p:sp>
-      <p:sp>
-        <p:nvSpPr>
-          <p:cNvPr id="5" name="Textfeld 4">
-            <a:extLst>
-              <a:ext uri="{FF2B5EF4-FFF2-40B4-BE49-F238E27FC236}">
-                <a16:creationId xmlns:a16="http://schemas.microsoft.com/office/drawing/2014/main" id="{D3ED66BC-1506-D292-1F7D-6653E36C647D}"/>
+              <a:t>D</a:t>
+            </a:r>
+          </a:p>
+        </p:txBody>
+      </p:sp>
+      <p:sp>
+        <p:nvSpPr>
+          <p:cNvPr id="14" name="Textfeld 13">
+            <a:extLst>
+              <a:ext uri="{FF2B5EF4-FFF2-40B4-BE49-F238E27FC236}">
+                <a16:creationId xmlns:a16="http://schemas.microsoft.com/office/drawing/2014/main" id="{55881114-08E5-ECB3-E7FD-47D157F3DBA4}"/>
               </a:ext>
             </a:extLst>
           </p:cNvPr>
@@ -6418,15 +6955,15 @@
         </p:nvSpPr>
         <p:spPr>
           <a:xfrm>
-            <a:off x="7512908" y="2409579"/>
-            <a:ext cx="2125257" cy="307777"/>
+            <a:off x="9342931" y="4270987"/>
+            <a:ext cx="295234" cy="338554"/>
           </a:xfrm>
           <a:prstGeom prst="rect">
             <a:avLst/>
           </a:prstGeom>
           <a:solidFill>
             <a:schemeClr val="bg1">
-              <a:lumMod val="85000"/>
+              <a:lumMod val="75000"/>
             </a:schemeClr>
           </a:solidFill>
           <a:ln>
@@ -6439,13 +6976,12 @@
           </a:bodyPr>
           <a:lstStyle/>
           <a:p>
-            <a:pPr algn="r"/>
-            <a:r>
-              <a:rPr lang="de-DE" sz="1400">
+            <a:r>
+              <a:rPr lang="de-DE" sz="1600" b="1">
                 <a:latin typeface="Arial" panose="020B0604020202020204" pitchFamily="34" charset="0"/>
                 <a:cs typeface="Arial" panose="020B0604020202020204" pitchFamily="34" charset="0"/>
               </a:rPr>
-              <a:t>3 months into the future</a:t>
+              <a:t>F</a:t>
             </a:r>
           </a:p>
         </p:txBody>
@@ -6453,7 +6989,7 @@
     </p:spTree>
     <p:extLst>
       <p:ext uri="{BB962C8B-B14F-4D97-AF65-F5344CB8AC3E}">
-        <p14:creationId xmlns:p14="http://schemas.microsoft.com/office/powerpoint/2010/main" val="2555539366"/>
+        <p14:creationId xmlns:p14="http://schemas.microsoft.com/office/powerpoint/2010/main" val="2201591049"/>
       </p:ext>
     </p:extLst>
   </p:cSld>
@@ -6482,57 +7018,70 @@
       </p:grpSpPr>
       <p:pic>
         <p:nvPicPr>
-          <p:cNvPr id="1028" name="Picture 4">
-            <a:extLst>
-              <a:ext uri="{FF2B5EF4-FFF2-40B4-BE49-F238E27FC236}">
-                <a16:creationId xmlns:a16="http://schemas.microsoft.com/office/drawing/2014/main" id="{F0CBFD18-436B-16E8-66AD-612BCB473E7B}"/>
+          <p:cNvPr id="2" name="Grafik 1">
+            <a:extLst>
+              <a:ext uri="{FF2B5EF4-FFF2-40B4-BE49-F238E27FC236}">
+                <a16:creationId xmlns:a16="http://schemas.microsoft.com/office/drawing/2014/main" id="{9768EA39-627B-C584-A24D-E6D1A5B4D95B}"/>
               </a:ext>
             </a:extLst>
           </p:cNvPr>
           <p:cNvPicPr>
-            <a:picLocks noChangeAspect="1" noChangeArrowheads="1"/>
+            <a:picLocks noChangeAspect="1"/>
           </p:cNvPicPr>
           <p:nvPr/>
         </p:nvPicPr>
         <p:blipFill>
-          <a:blip r:embed="rId3">
-            <a:extLst>
-              <a:ext uri="{28A0092B-C50C-407E-A947-70E740481C1C}">
-                <a14:useLocalDpi xmlns:a14="http://schemas.microsoft.com/office/drawing/2010/main" val="0"/>
-              </a:ext>
-            </a:extLst>
-          </a:blip>
-          <a:srcRect/>
+          <a:blip r:embed="rId3"/>
           <a:stretch>
             <a:fillRect/>
           </a:stretch>
         </p:blipFill>
-        <p:spPr bwMode="auto">
-          <a:xfrm>
-            <a:off x="2961217" y="939800"/>
-            <a:ext cx="5067300" cy="4978400"/>
+        <p:spPr>
+          <a:xfrm>
+            <a:off x="1920433" y="368782"/>
+            <a:ext cx="7772400" cy="1907249"/>
           </a:xfrm>
           <a:prstGeom prst="rect">
             <a:avLst/>
           </a:prstGeom>
-          <a:noFill/>
-          <a:extLst>
-            <a:ext uri="{909E8E84-426E-40DD-AFC4-6F175D3DCCD1}">
-              <a14:hiddenFill xmlns:a14="http://schemas.microsoft.com/office/drawing/2010/main">
-                <a:solidFill>
-                  <a:srgbClr val="FFFFFF"/>
-                </a:solidFill>
-              </a14:hiddenFill>
-            </a:ext>
-          </a:extLst>
         </p:spPr>
       </p:pic>
-      <p:sp>
-        <p:nvSpPr>
-          <p:cNvPr id="2" name="Textfeld 1">
-            <a:extLst>
-              <a:ext uri="{FF2B5EF4-FFF2-40B4-BE49-F238E27FC236}">
-                <a16:creationId xmlns:a16="http://schemas.microsoft.com/office/drawing/2014/main" id="{C8CACCBA-630B-624E-8108-6AB3F85F1553}"/>
+      <p:pic>
+        <p:nvPicPr>
+          <p:cNvPr id="3" name="Grafik 2">
+            <a:extLst>
+              <a:ext uri="{FF2B5EF4-FFF2-40B4-BE49-F238E27FC236}">
+                <a16:creationId xmlns:a16="http://schemas.microsoft.com/office/drawing/2014/main" id="{ECE26964-11E3-91D4-9480-6EB9044F4DDB}"/>
+              </a:ext>
+            </a:extLst>
+          </p:cNvPr>
+          <p:cNvPicPr>
+            <a:picLocks noChangeAspect="1"/>
+          </p:cNvPicPr>
+          <p:nvPr/>
+        </p:nvPicPr>
+        <p:blipFill>
+          <a:blip r:embed="rId4"/>
+          <a:stretch>
+            <a:fillRect/>
+          </a:stretch>
+        </p:blipFill>
+        <p:spPr>
+          <a:xfrm>
+            <a:off x="1920433" y="2375819"/>
+            <a:ext cx="7772400" cy="3749968"/>
+          </a:xfrm>
+          <a:prstGeom prst="rect">
+            <a:avLst/>
+          </a:prstGeom>
+        </p:spPr>
+      </p:pic>
+      <p:sp>
+        <p:nvSpPr>
+          <p:cNvPr id="6" name="Textfeld 5">
+            <a:extLst>
+              <a:ext uri="{FF2B5EF4-FFF2-40B4-BE49-F238E27FC236}">
+                <a16:creationId xmlns:a16="http://schemas.microsoft.com/office/drawing/2014/main" id="{BD99F089-52D4-5901-CBE0-D593D0D09E69}"/>
               </a:ext>
             </a:extLst>
           </p:cNvPr>
@@ -6541,7 +7090,277 @@
         </p:nvSpPr>
         <p:spPr>
           <a:xfrm>
-            <a:off x="6470946" y="1250803"/>
+            <a:off x="5336286" y="572768"/>
+            <a:ext cx="295234" cy="338554"/>
+          </a:xfrm>
+          <a:prstGeom prst="rect">
+            <a:avLst/>
+          </a:prstGeom>
+          <a:solidFill>
+            <a:schemeClr val="bg1">
+              <a:lumMod val="75000"/>
+            </a:schemeClr>
+          </a:solidFill>
+          <a:ln>
+            <a:noFill/>
+          </a:ln>
+        </p:spPr>
+        <p:txBody>
+          <a:bodyPr wrap="square" rtlCol="0">
+            <a:spAutoFit/>
+          </a:bodyPr>
+          <a:lstStyle/>
+          <a:p>
+            <a:r>
+              <a:rPr lang="de-DE" sz="1600" b="1">
+                <a:latin typeface="Arial" panose="020B0604020202020204" pitchFamily="34" charset="0"/>
+                <a:cs typeface="Arial" panose="020B0604020202020204" pitchFamily="34" charset="0"/>
+              </a:rPr>
+              <a:t>A</a:t>
+            </a:r>
+          </a:p>
+        </p:txBody>
+      </p:sp>
+      <p:sp>
+        <p:nvSpPr>
+          <p:cNvPr id="7" name="Textfeld 6">
+            <a:extLst>
+              <a:ext uri="{FF2B5EF4-FFF2-40B4-BE49-F238E27FC236}">
+                <a16:creationId xmlns:a16="http://schemas.microsoft.com/office/drawing/2014/main" id="{0857B115-7DD7-115E-E2DE-85BCB71B157F}"/>
+              </a:ext>
+            </a:extLst>
+          </p:cNvPr>
+          <p:cNvSpPr txBox="1"/>
+          <p:nvPr/>
+        </p:nvSpPr>
+        <p:spPr>
+          <a:xfrm>
+            <a:off x="5316622" y="2409579"/>
+            <a:ext cx="295234" cy="338554"/>
+          </a:xfrm>
+          <a:prstGeom prst="rect">
+            <a:avLst/>
+          </a:prstGeom>
+          <a:solidFill>
+            <a:schemeClr val="bg1">
+              <a:lumMod val="75000"/>
+            </a:schemeClr>
+          </a:solidFill>
+          <a:ln>
+            <a:noFill/>
+          </a:ln>
+        </p:spPr>
+        <p:txBody>
+          <a:bodyPr wrap="square" rtlCol="0">
+            <a:spAutoFit/>
+          </a:bodyPr>
+          <a:lstStyle/>
+          <a:p>
+            <a:r>
+              <a:rPr lang="de-DE" sz="1600" b="1">
+                <a:latin typeface="Arial" panose="020B0604020202020204" pitchFamily="34" charset="0"/>
+                <a:cs typeface="Arial" panose="020B0604020202020204" pitchFamily="34" charset="0"/>
+              </a:rPr>
+              <a:t>C</a:t>
+            </a:r>
+          </a:p>
+        </p:txBody>
+      </p:sp>
+      <p:sp>
+        <p:nvSpPr>
+          <p:cNvPr id="8" name="Textfeld 7">
+            <a:extLst>
+              <a:ext uri="{FF2B5EF4-FFF2-40B4-BE49-F238E27FC236}">
+                <a16:creationId xmlns:a16="http://schemas.microsoft.com/office/drawing/2014/main" id="{5ED38475-75D3-7859-4982-A8443EAD950A}"/>
+              </a:ext>
+            </a:extLst>
+          </p:cNvPr>
+          <p:cNvSpPr txBox="1"/>
+          <p:nvPr/>
+        </p:nvSpPr>
+        <p:spPr>
+          <a:xfrm>
+            <a:off x="5316622" y="4266054"/>
+            <a:ext cx="295234" cy="338554"/>
+          </a:xfrm>
+          <a:prstGeom prst="rect">
+            <a:avLst/>
+          </a:prstGeom>
+          <a:solidFill>
+            <a:schemeClr val="bg1">
+              <a:lumMod val="75000"/>
+            </a:schemeClr>
+          </a:solidFill>
+          <a:ln>
+            <a:noFill/>
+          </a:ln>
+        </p:spPr>
+        <p:txBody>
+          <a:bodyPr wrap="square" rtlCol="0">
+            <a:spAutoFit/>
+          </a:bodyPr>
+          <a:lstStyle/>
+          <a:p>
+            <a:r>
+              <a:rPr lang="de-DE" sz="1600" b="1">
+                <a:latin typeface="Arial" panose="020B0604020202020204" pitchFamily="34" charset="0"/>
+                <a:cs typeface="Arial" panose="020B0604020202020204" pitchFamily="34" charset="0"/>
+              </a:rPr>
+              <a:t>E</a:t>
+            </a:r>
+          </a:p>
+        </p:txBody>
+      </p:sp>
+      <p:sp>
+        <p:nvSpPr>
+          <p:cNvPr id="9" name="Textfeld 8">
+            <a:extLst>
+              <a:ext uri="{FF2B5EF4-FFF2-40B4-BE49-F238E27FC236}">
+                <a16:creationId xmlns:a16="http://schemas.microsoft.com/office/drawing/2014/main" id="{4348FDF3-1A08-65CC-E590-F25704D00823}"/>
+              </a:ext>
+            </a:extLst>
+          </p:cNvPr>
+          <p:cNvSpPr txBox="1"/>
+          <p:nvPr/>
+        </p:nvSpPr>
+        <p:spPr>
+          <a:xfrm>
+            <a:off x="9352763" y="567869"/>
+            <a:ext cx="295234" cy="338554"/>
+          </a:xfrm>
+          <a:prstGeom prst="rect">
+            <a:avLst/>
+          </a:prstGeom>
+          <a:solidFill>
+            <a:schemeClr val="bg1">
+              <a:lumMod val="75000"/>
+            </a:schemeClr>
+          </a:solidFill>
+          <a:ln>
+            <a:noFill/>
+          </a:ln>
+        </p:spPr>
+        <p:txBody>
+          <a:bodyPr wrap="square" rtlCol="0">
+            <a:spAutoFit/>
+          </a:bodyPr>
+          <a:lstStyle/>
+          <a:p>
+            <a:r>
+              <a:rPr lang="de-DE" sz="1600" b="1">
+                <a:latin typeface="Arial" panose="020B0604020202020204" pitchFamily="34" charset="0"/>
+                <a:cs typeface="Arial" panose="020B0604020202020204" pitchFamily="34" charset="0"/>
+              </a:rPr>
+              <a:t>B</a:t>
+            </a:r>
+          </a:p>
+        </p:txBody>
+      </p:sp>
+      <p:sp>
+        <p:nvSpPr>
+          <p:cNvPr id="10" name="Textfeld 9">
+            <a:extLst>
+              <a:ext uri="{FF2B5EF4-FFF2-40B4-BE49-F238E27FC236}">
+                <a16:creationId xmlns:a16="http://schemas.microsoft.com/office/drawing/2014/main" id="{648FB14A-DF52-0A00-58EA-69ADBEFEDC0B}"/>
+              </a:ext>
+            </a:extLst>
+          </p:cNvPr>
+          <p:cNvSpPr txBox="1"/>
+          <p:nvPr/>
+        </p:nvSpPr>
+        <p:spPr>
+          <a:xfrm>
+            <a:off x="9342931" y="2404680"/>
+            <a:ext cx="295234" cy="338554"/>
+          </a:xfrm>
+          <a:prstGeom prst="rect">
+            <a:avLst/>
+          </a:prstGeom>
+          <a:solidFill>
+            <a:schemeClr val="bg1">
+              <a:lumMod val="75000"/>
+            </a:schemeClr>
+          </a:solidFill>
+          <a:ln>
+            <a:noFill/>
+          </a:ln>
+        </p:spPr>
+        <p:txBody>
+          <a:bodyPr wrap="square" rtlCol="0">
+            <a:spAutoFit/>
+          </a:bodyPr>
+          <a:lstStyle/>
+          <a:p>
+            <a:r>
+              <a:rPr lang="de-DE" sz="1600" b="1">
+                <a:latin typeface="Arial" panose="020B0604020202020204" pitchFamily="34" charset="0"/>
+                <a:cs typeface="Arial" panose="020B0604020202020204" pitchFamily="34" charset="0"/>
+              </a:rPr>
+              <a:t>D</a:t>
+            </a:r>
+          </a:p>
+        </p:txBody>
+      </p:sp>
+      <p:sp>
+        <p:nvSpPr>
+          <p:cNvPr id="14" name="Textfeld 13">
+            <a:extLst>
+              <a:ext uri="{FF2B5EF4-FFF2-40B4-BE49-F238E27FC236}">
+                <a16:creationId xmlns:a16="http://schemas.microsoft.com/office/drawing/2014/main" id="{55881114-08E5-ECB3-E7FD-47D157F3DBA4}"/>
+              </a:ext>
+            </a:extLst>
+          </p:cNvPr>
+          <p:cNvSpPr txBox="1"/>
+          <p:nvPr/>
+        </p:nvSpPr>
+        <p:spPr>
+          <a:xfrm>
+            <a:off x="9342931" y="4270987"/>
+            <a:ext cx="295234" cy="338554"/>
+          </a:xfrm>
+          <a:prstGeom prst="rect">
+            <a:avLst/>
+          </a:prstGeom>
+          <a:solidFill>
+            <a:schemeClr val="bg1">
+              <a:lumMod val="75000"/>
+            </a:schemeClr>
+          </a:solidFill>
+          <a:ln>
+            <a:noFill/>
+          </a:ln>
+        </p:spPr>
+        <p:txBody>
+          <a:bodyPr wrap="square" rtlCol="0">
+            <a:spAutoFit/>
+          </a:bodyPr>
+          <a:lstStyle/>
+          <a:p>
+            <a:r>
+              <a:rPr lang="de-DE" sz="1600" b="1">
+                <a:latin typeface="Arial" panose="020B0604020202020204" pitchFamily="34" charset="0"/>
+                <a:cs typeface="Arial" panose="020B0604020202020204" pitchFamily="34" charset="0"/>
+              </a:rPr>
+              <a:t>F</a:t>
+            </a:r>
+          </a:p>
+        </p:txBody>
+      </p:sp>
+      <p:sp>
+        <p:nvSpPr>
+          <p:cNvPr id="4" name="Textfeld 3">
+            <a:extLst>
+              <a:ext uri="{FF2B5EF4-FFF2-40B4-BE49-F238E27FC236}">
+                <a16:creationId xmlns:a16="http://schemas.microsoft.com/office/drawing/2014/main" id="{7BABB555-13DC-A8D2-AAAD-5B373E565114}"/>
+              </a:ext>
+            </a:extLst>
+          </p:cNvPr>
+          <p:cNvSpPr txBox="1"/>
+          <p:nvPr/>
+        </p:nvSpPr>
+        <p:spPr>
+          <a:xfrm>
+            <a:off x="2281474" y="578324"/>
             <a:ext cx="1346886" cy="307777"/>
           </a:xfrm>
           <a:prstGeom prst="rect">
@@ -6575,10 +7394,10 @@
       </p:sp>
       <p:sp>
         <p:nvSpPr>
-          <p:cNvPr id="3" name="Textfeld 2">
-            <a:extLst>
-              <a:ext uri="{FF2B5EF4-FFF2-40B4-BE49-F238E27FC236}">
-                <a16:creationId xmlns:a16="http://schemas.microsoft.com/office/drawing/2014/main" id="{761261D5-8606-C19A-C88C-C1A6786E4EAC}"/>
+          <p:cNvPr id="11" name="Textfeld 10">
+            <a:extLst>
+              <a:ext uri="{FF2B5EF4-FFF2-40B4-BE49-F238E27FC236}">
+                <a16:creationId xmlns:a16="http://schemas.microsoft.com/office/drawing/2014/main" id="{D584AB8B-F3C4-F936-656A-E30EDAC6609B}"/>
               </a:ext>
             </a:extLst>
           </p:cNvPr>
@@ -6587,8 +7406,8 @@
         </p:nvSpPr>
         <p:spPr>
           <a:xfrm>
-            <a:off x="5704932" y="3514808"/>
-            <a:ext cx="2112900" cy="307777"/>
+            <a:off x="2278261" y="2422864"/>
+            <a:ext cx="1716141" cy="307777"/>
           </a:xfrm>
           <a:prstGeom prst="rect">
             <a:avLst/>
@@ -6614,7 +7433,191 @@
                 <a:latin typeface="Arial" panose="020B0604020202020204" pitchFamily="34" charset="0"/>
                 <a:cs typeface="Arial" panose="020B0604020202020204" pitchFamily="34" charset="0"/>
               </a:rPr>
-              <a:t>6 months into the future</a:t>
+              <a:t>lead time 3 months</a:t>
+            </a:r>
+          </a:p>
+        </p:txBody>
+      </p:sp>
+      <p:sp>
+        <p:nvSpPr>
+          <p:cNvPr id="12" name="Textfeld 11">
+            <a:extLst>
+              <a:ext uri="{FF2B5EF4-FFF2-40B4-BE49-F238E27FC236}">
+                <a16:creationId xmlns:a16="http://schemas.microsoft.com/office/drawing/2014/main" id="{74DBD418-B92A-6436-C469-272324162816}"/>
+              </a:ext>
+            </a:extLst>
+          </p:cNvPr>
+          <p:cNvSpPr txBox="1"/>
+          <p:nvPr/>
+        </p:nvSpPr>
+        <p:spPr>
+          <a:xfrm>
+            <a:off x="2278260" y="4281224"/>
+            <a:ext cx="1716141" cy="307777"/>
+          </a:xfrm>
+          <a:prstGeom prst="rect">
+            <a:avLst/>
+          </a:prstGeom>
+          <a:solidFill>
+            <a:schemeClr val="bg1">
+              <a:lumMod val="85000"/>
+            </a:schemeClr>
+          </a:solidFill>
+          <a:ln>
+            <a:noFill/>
+          </a:ln>
+        </p:spPr>
+        <p:txBody>
+          <a:bodyPr wrap="square" rtlCol="0">
+            <a:spAutoFit/>
+          </a:bodyPr>
+          <a:lstStyle/>
+          <a:p>
+            <a:pPr algn="r"/>
+            <a:r>
+              <a:rPr lang="de-DE" sz="1400">
+                <a:latin typeface="Arial" panose="020B0604020202020204" pitchFamily="34" charset="0"/>
+                <a:cs typeface="Arial" panose="020B0604020202020204" pitchFamily="34" charset="0"/>
+              </a:rPr>
+              <a:t>lead time 6 months</a:t>
+            </a:r>
+          </a:p>
+        </p:txBody>
+      </p:sp>
+      <p:sp>
+        <p:nvSpPr>
+          <p:cNvPr id="13" name="Textfeld 12">
+            <a:extLst>
+              <a:ext uri="{FF2B5EF4-FFF2-40B4-BE49-F238E27FC236}">
+                <a16:creationId xmlns:a16="http://schemas.microsoft.com/office/drawing/2014/main" id="{934B77CD-FB80-4A47-6BA5-743B89D43C8D}"/>
+              </a:ext>
+            </a:extLst>
+          </p:cNvPr>
+          <p:cNvSpPr txBox="1"/>
+          <p:nvPr/>
+        </p:nvSpPr>
+        <p:spPr>
+          <a:xfrm>
+            <a:off x="6301786" y="578324"/>
+            <a:ext cx="1346886" cy="307777"/>
+          </a:xfrm>
+          <a:prstGeom prst="rect">
+            <a:avLst/>
+          </a:prstGeom>
+          <a:solidFill>
+            <a:schemeClr val="bg1">
+              <a:lumMod val="85000"/>
+            </a:schemeClr>
+          </a:solidFill>
+          <a:ln>
+            <a:noFill/>
+          </a:ln>
+        </p:spPr>
+        <p:txBody>
+          <a:bodyPr wrap="square" rtlCol="0">
+            <a:spAutoFit/>
+          </a:bodyPr>
+          <a:lstStyle/>
+          <a:p>
+            <a:pPr algn="r"/>
+            <a:r>
+              <a:rPr lang="de-DE" sz="1400">
+                <a:latin typeface="Arial" panose="020B0604020202020204" pitchFamily="34" charset="0"/>
+                <a:cs typeface="Arial" panose="020B0604020202020204" pitchFamily="34" charset="0"/>
+              </a:rPr>
+              <a:t>current phase</a:t>
+            </a:r>
+          </a:p>
+        </p:txBody>
+      </p:sp>
+      <p:sp>
+        <p:nvSpPr>
+          <p:cNvPr id="15" name="Textfeld 14">
+            <a:extLst>
+              <a:ext uri="{FF2B5EF4-FFF2-40B4-BE49-F238E27FC236}">
+                <a16:creationId xmlns:a16="http://schemas.microsoft.com/office/drawing/2014/main" id="{E8B0ABDA-7341-340F-D3B3-3298DDB666F8}"/>
+              </a:ext>
+            </a:extLst>
+          </p:cNvPr>
+          <p:cNvSpPr txBox="1"/>
+          <p:nvPr/>
+        </p:nvSpPr>
+        <p:spPr>
+          <a:xfrm>
+            <a:off x="6289429" y="2422864"/>
+            <a:ext cx="1716141" cy="307777"/>
+          </a:xfrm>
+          <a:prstGeom prst="rect">
+            <a:avLst/>
+          </a:prstGeom>
+          <a:solidFill>
+            <a:schemeClr val="bg1">
+              <a:lumMod val="85000"/>
+            </a:schemeClr>
+          </a:solidFill>
+          <a:ln>
+            <a:noFill/>
+          </a:ln>
+        </p:spPr>
+        <p:txBody>
+          <a:bodyPr wrap="square" rtlCol="0">
+            <a:spAutoFit/>
+          </a:bodyPr>
+          <a:lstStyle/>
+          <a:p>
+            <a:pPr algn="r"/>
+            <a:r>
+              <a:rPr lang="de-DE" sz="1400">
+                <a:latin typeface="Arial" panose="020B0604020202020204" pitchFamily="34" charset="0"/>
+                <a:cs typeface="Arial" panose="020B0604020202020204" pitchFamily="34" charset="0"/>
+              </a:rPr>
+              <a:t>lead time 3 months</a:t>
+            </a:r>
+          </a:p>
+        </p:txBody>
+      </p:sp>
+      <p:sp>
+        <p:nvSpPr>
+          <p:cNvPr id="16" name="Textfeld 15">
+            <a:extLst>
+              <a:ext uri="{FF2B5EF4-FFF2-40B4-BE49-F238E27FC236}">
+                <a16:creationId xmlns:a16="http://schemas.microsoft.com/office/drawing/2014/main" id="{3FACF2E9-9CC6-55E8-89DC-8B946404D0DA}"/>
+              </a:ext>
+            </a:extLst>
+          </p:cNvPr>
+          <p:cNvSpPr txBox="1"/>
+          <p:nvPr/>
+        </p:nvSpPr>
+        <p:spPr>
+          <a:xfrm>
+            <a:off x="6289428" y="4281224"/>
+            <a:ext cx="1716141" cy="307777"/>
+          </a:xfrm>
+          <a:prstGeom prst="rect">
+            <a:avLst/>
+          </a:prstGeom>
+          <a:solidFill>
+            <a:schemeClr val="bg1">
+              <a:lumMod val="85000"/>
+            </a:schemeClr>
+          </a:solidFill>
+          <a:ln>
+            <a:noFill/>
+          </a:ln>
+        </p:spPr>
+        <p:txBody>
+          <a:bodyPr wrap="square" rtlCol="0">
+            <a:spAutoFit/>
+          </a:bodyPr>
+          <a:lstStyle/>
+          <a:p>
+            <a:pPr algn="r"/>
+            <a:r>
+              <a:rPr lang="de-DE" sz="1400">
+                <a:latin typeface="Arial" panose="020B0604020202020204" pitchFamily="34" charset="0"/>
+                <a:cs typeface="Arial" panose="020B0604020202020204" pitchFamily="34" charset="0"/>
+              </a:rPr>
+              <a:t>lead time 6 months</a:t>
             </a:r>
           </a:p>
         </p:txBody>
@@ -6622,7 +7625,7 @@
     </p:spTree>
     <p:extLst>
       <p:ext uri="{BB962C8B-B14F-4D97-AF65-F5344CB8AC3E}">
-        <p14:creationId xmlns:p14="http://schemas.microsoft.com/office/powerpoint/2010/main" val="2079808273"/>
+        <p14:creationId xmlns:p14="http://schemas.microsoft.com/office/powerpoint/2010/main" val="3608400562"/>
       </p:ext>
     </p:extLst>
   </p:cSld>

</xml_diff>

<commit_message>
Update figures with data from current csv output (#28)
</commit_message>
<xml_diff>
--- a/figures/combined_figures.pptx
+++ b/figures/combined_figures.pptx
@@ -5,18 +5,20 @@
     <p:sldMasterId id="2147483648" r:id="rId1"/>
   </p:sldMasterIdLst>
   <p:notesMasterIdLst>
-    <p:notesMasterId r:id="rId11"/>
+    <p:notesMasterId r:id="rId13"/>
   </p:notesMasterIdLst>
   <p:sldIdLst>
     <p:sldId id="256" r:id="rId2"/>
     <p:sldId id="263" r:id="rId3"/>
-    <p:sldId id="259" r:id="rId4"/>
-    <p:sldId id="260" r:id="rId5"/>
-    <p:sldId id="257" r:id="rId6"/>
-    <p:sldId id="264" r:id="rId7"/>
-    <p:sldId id="258" r:id="rId8"/>
-    <p:sldId id="261" r:id="rId9"/>
-    <p:sldId id="262" r:id="rId10"/>
+    <p:sldId id="265" r:id="rId4"/>
+    <p:sldId id="259" r:id="rId5"/>
+    <p:sldId id="260" r:id="rId6"/>
+    <p:sldId id="257" r:id="rId7"/>
+    <p:sldId id="264" r:id="rId8"/>
+    <p:sldId id="258" r:id="rId9"/>
+    <p:sldId id="266" r:id="rId10"/>
+    <p:sldId id="261" r:id="rId11"/>
+    <p:sldId id="262" r:id="rId12"/>
   </p:sldIdLst>
   <p:sldSz cx="12192000" cy="6858000"/>
   <p:notesSz cx="6858000" cy="9144000"/>
@@ -204,7 +206,7 @@
           </a:lstStyle>
           <a:p>
             <a:fld id="{77F0B5B9-2F05-8040-835B-A9EE0944125F}" type="datetimeFigureOut">
-              <a:t>14.12.22</a:t>
+              <a:t>27.03.23</a:t>
             </a:fld>
             <a:endParaRPr lang="de-DE"/>
           </a:p>
@@ -554,6 +556,174 @@
 </p:notes>
 </file>
 
+<file path=ppt/notesSlides/notesSlide10.xml><?xml version="1.0" encoding="utf-8"?>
+<p:notes xmlns:a="http://schemas.openxmlformats.org/drawingml/2006/main" xmlns:r="http://schemas.openxmlformats.org/officeDocument/2006/relationships" xmlns:p="http://schemas.openxmlformats.org/presentationml/2006/main">
+  <p:cSld>
+    <p:spTree>
+      <p:nvGrpSpPr>
+        <p:cNvPr id="1" name=""/>
+        <p:cNvGrpSpPr/>
+        <p:nvPr/>
+      </p:nvGrpSpPr>
+      <p:grpSpPr>
+        <a:xfrm>
+          <a:off x="0" y="0"/>
+          <a:ext cx="0" cy="0"/>
+          <a:chOff x="0" y="0"/>
+          <a:chExt cx="0" cy="0"/>
+        </a:xfrm>
+      </p:grpSpPr>
+      <p:sp>
+        <p:nvSpPr>
+          <p:cNvPr id="2" name="Folienbildplatzhalter 1"/>
+          <p:cNvSpPr>
+            <a:spLocks noGrp="1" noRot="1" noChangeAspect="1"/>
+          </p:cNvSpPr>
+          <p:nvPr>
+            <p:ph type="sldImg"/>
+          </p:nvPr>
+        </p:nvSpPr>
+        <p:spPr/>
+      </p:sp>
+      <p:sp>
+        <p:nvSpPr>
+          <p:cNvPr id="3" name="Notizenplatzhalter 2"/>
+          <p:cNvSpPr>
+            <a:spLocks noGrp="1"/>
+          </p:cNvSpPr>
+          <p:nvPr>
+            <p:ph type="body" idx="1"/>
+          </p:nvPr>
+        </p:nvSpPr>
+        <p:spPr/>
+        <p:txBody>
+          <a:bodyPr/>
+          <a:lstStyle/>
+          <a:p>
+            <a:endParaRPr lang="de-DE"/>
+          </a:p>
+        </p:txBody>
+      </p:sp>
+      <p:sp>
+        <p:nvSpPr>
+          <p:cNvPr id="4" name="Foliennummernplatzhalter 3"/>
+          <p:cNvSpPr>
+            <a:spLocks noGrp="1"/>
+          </p:cNvSpPr>
+          <p:nvPr>
+            <p:ph type="sldNum" sz="quarter" idx="5"/>
+          </p:nvPr>
+        </p:nvSpPr>
+        <p:spPr/>
+        <p:txBody>
+          <a:bodyPr/>
+          <a:lstStyle/>
+          <a:p>
+            <a:fld id="{238902E6-424B-1C48-8D10-94E97A9F44CE}" type="slidenum">
+              <a:rPr lang="de-DE"/>
+              <a:t>10</a:t>
+            </a:fld>
+            <a:endParaRPr lang="de-DE"/>
+          </a:p>
+        </p:txBody>
+      </p:sp>
+    </p:spTree>
+    <p:extLst>
+      <p:ext uri="{BB962C8B-B14F-4D97-AF65-F5344CB8AC3E}">
+        <p14:creationId xmlns:p14="http://schemas.microsoft.com/office/powerpoint/2010/main" val="649238304"/>
+      </p:ext>
+    </p:extLst>
+  </p:cSld>
+  <p:clrMapOvr>
+    <a:masterClrMapping/>
+  </p:clrMapOvr>
+</p:notes>
+</file>
+
+<file path=ppt/notesSlides/notesSlide11.xml><?xml version="1.0" encoding="utf-8"?>
+<p:notes xmlns:a="http://schemas.openxmlformats.org/drawingml/2006/main" xmlns:r="http://schemas.openxmlformats.org/officeDocument/2006/relationships" xmlns:p="http://schemas.openxmlformats.org/presentationml/2006/main">
+  <p:cSld>
+    <p:spTree>
+      <p:nvGrpSpPr>
+        <p:cNvPr id="1" name=""/>
+        <p:cNvGrpSpPr/>
+        <p:nvPr/>
+      </p:nvGrpSpPr>
+      <p:grpSpPr>
+        <a:xfrm>
+          <a:off x="0" y="0"/>
+          <a:ext cx="0" cy="0"/>
+          <a:chOff x="0" y="0"/>
+          <a:chExt cx="0" cy="0"/>
+        </a:xfrm>
+      </p:grpSpPr>
+      <p:sp>
+        <p:nvSpPr>
+          <p:cNvPr id="2" name="Folienbildplatzhalter 1"/>
+          <p:cNvSpPr>
+            <a:spLocks noGrp="1" noRot="1" noChangeAspect="1"/>
+          </p:cNvSpPr>
+          <p:nvPr>
+            <p:ph type="sldImg"/>
+          </p:nvPr>
+        </p:nvSpPr>
+        <p:spPr/>
+      </p:sp>
+      <p:sp>
+        <p:nvSpPr>
+          <p:cNvPr id="3" name="Notizenplatzhalter 2"/>
+          <p:cNvSpPr>
+            <a:spLocks noGrp="1"/>
+          </p:cNvSpPr>
+          <p:nvPr>
+            <p:ph type="body" idx="1"/>
+          </p:nvPr>
+        </p:nvSpPr>
+        <p:spPr/>
+        <p:txBody>
+          <a:bodyPr/>
+          <a:lstStyle/>
+          <a:p>
+            <a:endParaRPr lang="de-DE"/>
+          </a:p>
+        </p:txBody>
+      </p:sp>
+      <p:sp>
+        <p:nvSpPr>
+          <p:cNvPr id="4" name="Foliennummernplatzhalter 3"/>
+          <p:cNvSpPr>
+            <a:spLocks noGrp="1"/>
+          </p:cNvSpPr>
+          <p:nvPr>
+            <p:ph type="sldNum" sz="quarter" idx="5"/>
+          </p:nvPr>
+        </p:nvSpPr>
+        <p:spPr/>
+        <p:txBody>
+          <a:bodyPr/>
+          <a:lstStyle/>
+          <a:p>
+            <a:fld id="{238902E6-424B-1C48-8D10-94E97A9F44CE}" type="slidenum">
+              <a:rPr lang="de-DE"/>
+              <a:t>11</a:t>
+            </a:fld>
+            <a:endParaRPr lang="de-DE"/>
+          </a:p>
+        </p:txBody>
+      </p:sp>
+    </p:spTree>
+    <p:extLst>
+      <p:ext uri="{BB962C8B-B14F-4D97-AF65-F5344CB8AC3E}">
+        <p14:creationId xmlns:p14="http://schemas.microsoft.com/office/powerpoint/2010/main" val="3834326946"/>
+      </p:ext>
+    </p:extLst>
+  </p:cSld>
+  <p:clrMapOvr>
+    <a:masterClrMapping/>
+  </p:clrMapOvr>
+</p:notes>
+</file>
+
 <file path=ppt/notesSlides/notesSlide2.xml><?xml version="1.0" encoding="utf-8"?>
 <p:notes xmlns:a="http://schemas.openxmlformats.org/drawingml/2006/main" xmlns:r="http://schemas.openxmlformats.org/officeDocument/2006/relationships" xmlns:p="http://schemas.openxmlformats.org/presentationml/2006/main">
   <p:cSld>
@@ -712,7 +882,7 @@
     </p:spTree>
     <p:extLst>
       <p:ext uri="{BB962C8B-B14F-4D97-AF65-F5344CB8AC3E}">
-        <p14:creationId xmlns:p14="http://schemas.microsoft.com/office/powerpoint/2010/main" val="63657794"/>
+        <p14:creationId xmlns:p14="http://schemas.microsoft.com/office/powerpoint/2010/main" val="2647785862"/>
       </p:ext>
     </p:extLst>
   </p:cSld>
@@ -796,7 +966,7 @@
     </p:spTree>
     <p:extLst>
       <p:ext uri="{BB962C8B-B14F-4D97-AF65-F5344CB8AC3E}">
-        <p14:creationId xmlns:p14="http://schemas.microsoft.com/office/powerpoint/2010/main" val="3366827042"/>
+        <p14:creationId xmlns:p14="http://schemas.microsoft.com/office/powerpoint/2010/main" val="63657794"/>
       </p:ext>
     </p:extLst>
   </p:cSld>
@@ -880,7 +1050,7 @@
     </p:spTree>
     <p:extLst>
       <p:ext uri="{BB962C8B-B14F-4D97-AF65-F5344CB8AC3E}">
-        <p14:creationId xmlns:p14="http://schemas.microsoft.com/office/powerpoint/2010/main" val="3852857426"/>
+        <p14:creationId xmlns:p14="http://schemas.microsoft.com/office/powerpoint/2010/main" val="3366827042"/>
       </p:ext>
     </p:extLst>
   </p:cSld>
@@ -964,7 +1134,7 @@
     </p:spTree>
     <p:extLst>
       <p:ext uri="{BB962C8B-B14F-4D97-AF65-F5344CB8AC3E}">
-        <p14:creationId xmlns:p14="http://schemas.microsoft.com/office/powerpoint/2010/main" val="3247660228"/>
+        <p14:creationId xmlns:p14="http://schemas.microsoft.com/office/powerpoint/2010/main" val="3852857426"/>
       </p:ext>
     </p:extLst>
   </p:cSld>
@@ -1048,7 +1218,7 @@
     </p:spTree>
     <p:extLst>
       <p:ext uri="{BB962C8B-B14F-4D97-AF65-F5344CB8AC3E}">
-        <p14:creationId xmlns:p14="http://schemas.microsoft.com/office/powerpoint/2010/main" val="1238356670"/>
+        <p14:creationId xmlns:p14="http://schemas.microsoft.com/office/powerpoint/2010/main" val="3247660228"/>
       </p:ext>
     </p:extLst>
   </p:cSld>
@@ -1132,7 +1302,7 @@
     </p:spTree>
     <p:extLst>
       <p:ext uri="{BB962C8B-B14F-4D97-AF65-F5344CB8AC3E}">
-        <p14:creationId xmlns:p14="http://schemas.microsoft.com/office/powerpoint/2010/main" val="649238304"/>
+        <p14:creationId xmlns:p14="http://schemas.microsoft.com/office/powerpoint/2010/main" val="1238356670"/>
       </p:ext>
     </p:extLst>
   </p:cSld>
@@ -1216,7 +1386,7 @@
     </p:spTree>
     <p:extLst>
       <p:ext uri="{BB962C8B-B14F-4D97-AF65-F5344CB8AC3E}">
-        <p14:creationId xmlns:p14="http://schemas.microsoft.com/office/powerpoint/2010/main" val="3834326946"/>
+        <p14:creationId xmlns:p14="http://schemas.microsoft.com/office/powerpoint/2010/main" val="3539636532"/>
       </p:ext>
     </p:extLst>
   </p:cSld>
@@ -1372,7 +1542,7 @@
           <a:lstStyle/>
           <a:p>
             <a:fld id="{A813844F-FEE2-E341-B97B-DB0CD4D59B2D}" type="datetimeFigureOut">
-              <a:t>14.12.22</a:t>
+              <a:t>27.03.23</a:t>
             </a:fld>
             <a:endParaRPr lang="de-DE"/>
           </a:p>
@@ -1568,7 +1738,7 @@
           <a:lstStyle/>
           <a:p>
             <a:fld id="{A813844F-FEE2-E341-B97B-DB0CD4D59B2D}" type="datetimeFigureOut">
-              <a:t>14.12.22</a:t>
+              <a:t>27.03.23</a:t>
             </a:fld>
             <a:endParaRPr lang="de-DE"/>
           </a:p>
@@ -1774,7 +1944,7 @@
           <a:lstStyle/>
           <a:p>
             <a:fld id="{A813844F-FEE2-E341-B97B-DB0CD4D59B2D}" type="datetimeFigureOut">
-              <a:t>14.12.22</a:t>
+              <a:t>27.03.23</a:t>
             </a:fld>
             <a:endParaRPr lang="de-DE"/>
           </a:p>
@@ -1970,7 +2140,7 @@
           <a:lstStyle/>
           <a:p>
             <a:fld id="{A813844F-FEE2-E341-B97B-DB0CD4D59B2D}" type="datetimeFigureOut">
-              <a:t>14.12.22</a:t>
+              <a:t>27.03.23</a:t>
             </a:fld>
             <a:endParaRPr lang="de-DE"/>
           </a:p>
@@ -2243,7 +2413,7 @@
           <a:lstStyle/>
           <a:p>
             <a:fld id="{A813844F-FEE2-E341-B97B-DB0CD4D59B2D}" type="datetimeFigureOut">
-              <a:t>14.12.22</a:t>
+              <a:t>27.03.23</a:t>
             </a:fld>
             <a:endParaRPr lang="de-DE"/>
           </a:p>
@@ -2506,7 +2676,7 @@
           <a:lstStyle/>
           <a:p>
             <a:fld id="{A813844F-FEE2-E341-B97B-DB0CD4D59B2D}" type="datetimeFigureOut">
-              <a:t>14.12.22</a:t>
+              <a:t>27.03.23</a:t>
             </a:fld>
             <a:endParaRPr lang="de-DE"/>
           </a:p>
@@ -2916,7 +3086,7 @@
           <a:lstStyle/>
           <a:p>
             <a:fld id="{A813844F-FEE2-E341-B97B-DB0CD4D59B2D}" type="datetimeFigureOut">
-              <a:t>14.12.22</a:t>
+              <a:t>27.03.23</a:t>
             </a:fld>
             <a:endParaRPr lang="de-DE"/>
           </a:p>
@@ -3055,7 +3225,7 @@
           <a:lstStyle/>
           <a:p>
             <a:fld id="{A813844F-FEE2-E341-B97B-DB0CD4D59B2D}" type="datetimeFigureOut">
-              <a:t>14.12.22</a:t>
+              <a:t>27.03.23</a:t>
             </a:fld>
             <a:endParaRPr lang="de-DE"/>
           </a:p>
@@ -3166,7 +3336,7 @@
           <a:lstStyle/>
           <a:p>
             <a:fld id="{A813844F-FEE2-E341-B97B-DB0CD4D59B2D}" type="datetimeFigureOut">
-              <a:t>14.12.22</a:t>
+              <a:t>27.03.23</a:t>
             </a:fld>
             <a:endParaRPr lang="de-DE"/>
           </a:p>
@@ -3475,7 +3645,7 @@
           <a:lstStyle/>
           <a:p>
             <a:fld id="{A813844F-FEE2-E341-B97B-DB0CD4D59B2D}" type="datetimeFigureOut">
-              <a:t>14.12.22</a:t>
+              <a:t>27.03.23</a:t>
             </a:fld>
             <a:endParaRPr lang="de-DE"/>
           </a:p>
@@ -3761,7 +3931,7 @@
           <a:lstStyle/>
           <a:p>
             <a:fld id="{A813844F-FEE2-E341-B97B-DB0CD4D59B2D}" type="datetimeFigureOut">
-              <a:t>14.12.22</a:t>
+              <a:t>27.03.23</a:t>
             </a:fld>
             <a:endParaRPr lang="de-DE"/>
           </a:p>
@@ -4000,7 +4170,7 @@
           </a:lstStyle>
           <a:p>
             <a:fld id="{A813844F-FEE2-E341-B97B-DB0CD4D59B2D}" type="datetimeFigureOut">
-              <a:t>14.12.22</a:t>
+              <a:t>27.03.23</a:t>
             </a:fld>
             <a:endParaRPr lang="de-DE"/>
           </a:p>
@@ -4596,6 +4766,538 @@
 </p:sld>
 </file>
 
+<file path=ppt/slides/slide10.xml><?xml version="1.0" encoding="utf-8"?>
+<p:sld xmlns:a="http://schemas.openxmlformats.org/drawingml/2006/main" xmlns:r="http://schemas.openxmlformats.org/officeDocument/2006/relationships" xmlns:p="http://schemas.openxmlformats.org/presentationml/2006/main">
+  <p:cSld>
+    <p:spTree>
+      <p:nvGrpSpPr>
+        <p:cNvPr id="1" name=""/>
+        <p:cNvGrpSpPr/>
+        <p:nvPr/>
+      </p:nvGrpSpPr>
+      <p:grpSpPr>
+        <a:xfrm>
+          <a:off x="0" y="0"/>
+          <a:ext cx="0" cy="0"/>
+          <a:chOff x="0" y="0"/>
+          <a:chExt cx="0" cy="0"/>
+        </a:xfrm>
+      </p:grpSpPr>
+      <p:pic>
+        <p:nvPicPr>
+          <p:cNvPr id="2" name="Grafik 1">
+            <a:extLst>
+              <a:ext uri="{FF2B5EF4-FFF2-40B4-BE49-F238E27FC236}">
+                <a16:creationId xmlns:a16="http://schemas.microsoft.com/office/drawing/2014/main" id="{9768EA39-627B-C584-A24D-E6D1A5B4D95B}"/>
+              </a:ext>
+            </a:extLst>
+          </p:cNvPr>
+          <p:cNvPicPr>
+            <a:picLocks noChangeAspect="1"/>
+          </p:cNvPicPr>
+          <p:nvPr/>
+        </p:nvPicPr>
+        <p:blipFill>
+          <a:blip r:embed="rId3"/>
+          <a:stretch>
+            <a:fillRect/>
+          </a:stretch>
+        </p:blipFill>
+        <p:spPr>
+          <a:xfrm>
+            <a:off x="1920433" y="368782"/>
+            <a:ext cx="7772400" cy="1907249"/>
+          </a:xfrm>
+          <a:prstGeom prst="rect">
+            <a:avLst/>
+          </a:prstGeom>
+        </p:spPr>
+      </p:pic>
+      <p:pic>
+        <p:nvPicPr>
+          <p:cNvPr id="3" name="Grafik 2">
+            <a:extLst>
+              <a:ext uri="{FF2B5EF4-FFF2-40B4-BE49-F238E27FC236}">
+                <a16:creationId xmlns:a16="http://schemas.microsoft.com/office/drawing/2014/main" id="{ECE26964-11E3-91D4-9480-6EB9044F4DDB}"/>
+              </a:ext>
+            </a:extLst>
+          </p:cNvPr>
+          <p:cNvPicPr>
+            <a:picLocks noChangeAspect="1"/>
+          </p:cNvPicPr>
+          <p:nvPr/>
+        </p:nvPicPr>
+        <p:blipFill>
+          <a:blip r:embed="rId4"/>
+          <a:stretch>
+            <a:fillRect/>
+          </a:stretch>
+        </p:blipFill>
+        <p:spPr>
+          <a:xfrm>
+            <a:off x="1920433" y="2375819"/>
+            <a:ext cx="7772400" cy="3749968"/>
+          </a:xfrm>
+          <a:prstGeom prst="rect">
+            <a:avLst/>
+          </a:prstGeom>
+        </p:spPr>
+      </p:pic>
+      <p:sp>
+        <p:nvSpPr>
+          <p:cNvPr id="6" name="Textfeld 5">
+            <a:extLst>
+              <a:ext uri="{FF2B5EF4-FFF2-40B4-BE49-F238E27FC236}">
+                <a16:creationId xmlns:a16="http://schemas.microsoft.com/office/drawing/2014/main" id="{BD99F089-52D4-5901-CBE0-D593D0D09E69}"/>
+              </a:ext>
+            </a:extLst>
+          </p:cNvPr>
+          <p:cNvSpPr txBox="1"/>
+          <p:nvPr/>
+        </p:nvSpPr>
+        <p:spPr>
+          <a:xfrm>
+            <a:off x="5336286" y="572768"/>
+            <a:ext cx="295234" cy="338554"/>
+          </a:xfrm>
+          <a:prstGeom prst="rect">
+            <a:avLst/>
+          </a:prstGeom>
+          <a:solidFill>
+            <a:schemeClr val="bg1">
+              <a:lumMod val="75000"/>
+            </a:schemeClr>
+          </a:solidFill>
+          <a:ln>
+            <a:noFill/>
+          </a:ln>
+        </p:spPr>
+        <p:txBody>
+          <a:bodyPr wrap="square" rtlCol="0">
+            <a:spAutoFit/>
+          </a:bodyPr>
+          <a:lstStyle/>
+          <a:p>
+            <a:r>
+              <a:rPr lang="de-DE" sz="1600" b="1">
+                <a:latin typeface="Arial" panose="020B0604020202020204" pitchFamily="34" charset="0"/>
+                <a:cs typeface="Arial" panose="020B0604020202020204" pitchFamily="34" charset="0"/>
+              </a:rPr>
+              <a:t>A</a:t>
+            </a:r>
+          </a:p>
+        </p:txBody>
+      </p:sp>
+      <p:sp>
+        <p:nvSpPr>
+          <p:cNvPr id="7" name="Textfeld 6">
+            <a:extLst>
+              <a:ext uri="{FF2B5EF4-FFF2-40B4-BE49-F238E27FC236}">
+                <a16:creationId xmlns:a16="http://schemas.microsoft.com/office/drawing/2014/main" id="{0857B115-7DD7-115E-E2DE-85BCB71B157F}"/>
+              </a:ext>
+            </a:extLst>
+          </p:cNvPr>
+          <p:cNvSpPr txBox="1"/>
+          <p:nvPr/>
+        </p:nvSpPr>
+        <p:spPr>
+          <a:xfrm>
+            <a:off x="5316622" y="2409579"/>
+            <a:ext cx="295234" cy="338554"/>
+          </a:xfrm>
+          <a:prstGeom prst="rect">
+            <a:avLst/>
+          </a:prstGeom>
+          <a:solidFill>
+            <a:schemeClr val="bg1">
+              <a:lumMod val="75000"/>
+            </a:schemeClr>
+          </a:solidFill>
+          <a:ln>
+            <a:noFill/>
+          </a:ln>
+        </p:spPr>
+        <p:txBody>
+          <a:bodyPr wrap="square" rtlCol="0">
+            <a:spAutoFit/>
+          </a:bodyPr>
+          <a:lstStyle/>
+          <a:p>
+            <a:r>
+              <a:rPr lang="de-DE" sz="1600" b="1">
+                <a:latin typeface="Arial" panose="020B0604020202020204" pitchFamily="34" charset="0"/>
+                <a:cs typeface="Arial" panose="020B0604020202020204" pitchFamily="34" charset="0"/>
+              </a:rPr>
+              <a:t>C</a:t>
+            </a:r>
+          </a:p>
+        </p:txBody>
+      </p:sp>
+      <p:sp>
+        <p:nvSpPr>
+          <p:cNvPr id="8" name="Textfeld 7">
+            <a:extLst>
+              <a:ext uri="{FF2B5EF4-FFF2-40B4-BE49-F238E27FC236}">
+                <a16:creationId xmlns:a16="http://schemas.microsoft.com/office/drawing/2014/main" id="{5ED38475-75D3-7859-4982-A8443EAD950A}"/>
+              </a:ext>
+            </a:extLst>
+          </p:cNvPr>
+          <p:cNvSpPr txBox="1"/>
+          <p:nvPr/>
+        </p:nvSpPr>
+        <p:spPr>
+          <a:xfrm>
+            <a:off x="5316622" y="4266054"/>
+            <a:ext cx="295234" cy="338554"/>
+          </a:xfrm>
+          <a:prstGeom prst="rect">
+            <a:avLst/>
+          </a:prstGeom>
+          <a:solidFill>
+            <a:schemeClr val="bg1">
+              <a:lumMod val="75000"/>
+            </a:schemeClr>
+          </a:solidFill>
+          <a:ln>
+            <a:noFill/>
+          </a:ln>
+        </p:spPr>
+        <p:txBody>
+          <a:bodyPr wrap="square" rtlCol="0">
+            <a:spAutoFit/>
+          </a:bodyPr>
+          <a:lstStyle/>
+          <a:p>
+            <a:r>
+              <a:rPr lang="de-DE" sz="1600" b="1">
+                <a:latin typeface="Arial" panose="020B0604020202020204" pitchFamily="34" charset="0"/>
+                <a:cs typeface="Arial" panose="020B0604020202020204" pitchFamily="34" charset="0"/>
+              </a:rPr>
+              <a:t>E</a:t>
+            </a:r>
+          </a:p>
+        </p:txBody>
+      </p:sp>
+      <p:sp>
+        <p:nvSpPr>
+          <p:cNvPr id="9" name="Textfeld 8">
+            <a:extLst>
+              <a:ext uri="{FF2B5EF4-FFF2-40B4-BE49-F238E27FC236}">
+                <a16:creationId xmlns:a16="http://schemas.microsoft.com/office/drawing/2014/main" id="{4348FDF3-1A08-65CC-E590-F25704D00823}"/>
+              </a:ext>
+            </a:extLst>
+          </p:cNvPr>
+          <p:cNvSpPr txBox="1"/>
+          <p:nvPr/>
+        </p:nvSpPr>
+        <p:spPr>
+          <a:xfrm>
+            <a:off x="8291279" y="565003"/>
+            <a:ext cx="1346886" cy="307777"/>
+          </a:xfrm>
+          <a:prstGeom prst="rect">
+            <a:avLst/>
+          </a:prstGeom>
+          <a:solidFill>
+            <a:schemeClr val="bg1">
+              <a:lumMod val="85000"/>
+            </a:schemeClr>
+          </a:solidFill>
+          <a:ln>
+            <a:noFill/>
+          </a:ln>
+        </p:spPr>
+        <p:txBody>
+          <a:bodyPr wrap="square" rtlCol="0">
+            <a:spAutoFit/>
+          </a:bodyPr>
+          <a:lstStyle/>
+          <a:p>
+            <a:pPr algn="r"/>
+            <a:r>
+              <a:rPr lang="de-DE" sz="1400">
+                <a:latin typeface="Arial" panose="020B0604020202020204" pitchFamily="34" charset="0"/>
+                <a:cs typeface="Arial" panose="020B0604020202020204" pitchFamily="34" charset="0"/>
+              </a:rPr>
+              <a:t>current phase</a:t>
+            </a:r>
+          </a:p>
+        </p:txBody>
+      </p:sp>
+      <p:sp>
+        <p:nvSpPr>
+          <p:cNvPr id="4" name="Textfeld 3">
+            <a:extLst>
+              <a:ext uri="{FF2B5EF4-FFF2-40B4-BE49-F238E27FC236}">
+                <a16:creationId xmlns:a16="http://schemas.microsoft.com/office/drawing/2014/main" id="{AD11839F-9FBD-2811-225A-66B10D8C04E8}"/>
+              </a:ext>
+            </a:extLst>
+          </p:cNvPr>
+          <p:cNvSpPr txBox="1"/>
+          <p:nvPr/>
+        </p:nvSpPr>
+        <p:spPr>
+          <a:xfrm>
+            <a:off x="7512909" y="4259875"/>
+            <a:ext cx="2112900" cy="307777"/>
+          </a:xfrm>
+          <a:prstGeom prst="rect">
+            <a:avLst/>
+          </a:prstGeom>
+          <a:solidFill>
+            <a:schemeClr val="bg1">
+              <a:lumMod val="85000"/>
+            </a:schemeClr>
+          </a:solidFill>
+          <a:ln>
+            <a:noFill/>
+          </a:ln>
+        </p:spPr>
+        <p:txBody>
+          <a:bodyPr wrap="square" rtlCol="0">
+            <a:spAutoFit/>
+          </a:bodyPr>
+          <a:lstStyle/>
+          <a:p>
+            <a:pPr algn="r"/>
+            <a:r>
+              <a:rPr lang="de-DE" sz="1400">
+                <a:latin typeface="Arial" panose="020B0604020202020204" pitchFamily="34" charset="0"/>
+                <a:cs typeface="Arial" panose="020B0604020202020204" pitchFamily="34" charset="0"/>
+              </a:rPr>
+              <a:t>6 months into the future</a:t>
+            </a:r>
+          </a:p>
+        </p:txBody>
+      </p:sp>
+      <p:sp>
+        <p:nvSpPr>
+          <p:cNvPr id="5" name="Textfeld 4">
+            <a:extLst>
+              <a:ext uri="{FF2B5EF4-FFF2-40B4-BE49-F238E27FC236}">
+                <a16:creationId xmlns:a16="http://schemas.microsoft.com/office/drawing/2014/main" id="{D3ED66BC-1506-D292-1F7D-6653E36C647D}"/>
+              </a:ext>
+            </a:extLst>
+          </p:cNvPr>
+          <p:cNvSpPr txBox="1"/>
+          <p:nvPr/>
+        </p:nvSpPr>
+        <p:spPr>
+          <a:xfrm>
+            <a:off x="7512908" y="2409579"/>
+            <a:ext cx="2125257" cy="307777"/>
+          </a:xfrm>
+          <a:prstGeom prst="rect">
+            <a:avLst/>
+          </a:prstGeom>
+          <a:solidFill>
+            <a:schemeClr val="bg1">
+              <a:lumMod val="85000"/>
+            </a:schemeClr>
+          </a:solidFill>
+          <a:ln>
+            <a:noFill/>
+          </a:ln>
+        </p:spPr>
+        <p:txBody>
+          <a:bodyPr wrap="square" rtlCol="0">
+            <a:spAutoFit/>
+          </a:bodyPr>
+          <a:lstStyle/>
+          <a:p>
+            <a:pPr algn="r"/>
+            <a:r>
+              <a:rPr lang="de-DE" sz="1400">
+                <a:latin typeface="Arial" panose="020B0604020202020204" pitchFamily="34" charset="0"/>
+                <a:cs typeface="Arial" panose="020B0604020202020204" pitchFamily="34" charset="0"/>
+              </a:rPr>
+              <a:t>3 months into the future</a:t>
+            </a:r>
+          </a:p>
+        </p:txBody>
+      </p:sp>
+    </p:spTree>
+    <p:extLst>
+      <p:ext uri="{BB962C8B-B14F-4D97-AF65-F5344CB8AC3E}">
+        <p14:creationId xmlns:p14="http://schemas.microsoft.com/office/powerpoint/2010/main" val="2555539366"/>
+      </p:ext>
+    </p:extLst>
+  </p:cSld>
+  <p:clrMapOvr>
+    <a:masterClrMapping/>
+  </p:clrMapOvr>
+</p:sld>
+</file>
+
+<file path=ppt/slides/slide11.xml><?xml version="1.0" encoding="utf-8"?>
+<p:sld xmlns:a="http://schemas.openxmlformats.org/drawingml/2006/main" xmlns:r="http://schemas.openxmlformats.org/officeDocument/2006/relationships" xmlns:p="http://schemas.openxmlformats.org/presentationml/2006/main">
+  <p:cSld>
+    <p:spTree>
+      <p:nvGrpSpPr>
+        <p:cNvPr id="1" name=""/>
+        <p:cNvGrpSpPr/>
+        <p:nvPr/>
+      </p:nvGrpSpPr>
+      <p:grpSpPr>
+        <a:xfrm>
+          <a:off x="0" y="0"/>
+          <a:ext cx="0" cy="0"/>
+          <a:chOff x="0" y="0"/>
+          <a:chExt cx="0" cy="0"/>
+        </a:xfrm>
+      </p:grpSpPr>
+      <p:pic>
+        <p:nvPicPr>
+          <p:cNvPr id="1028" name="Picture 4">
+            <a:extLst>
+              <a:ext uri="{FF2B5EF4-FFF2-40B4-BE49-F238E27FC236}">
+                <a16:creationId xmlns:a16="http://schemas.microsoft.com/office/drawing/2014/main" id="{F0CBFD18-436B-16E8-66AD-612BCB473E7B}"/>
+              </a:ext>
+            </a:extLst>
+          </p:cNvPr>
+          <p:cNvPicPr>
+            <a:picLocks noChangeAspect="1" noChangeArrowheads="1"/>
+          </p:cNvPicPr>
+          <p:nvPr/>
+        </p:nvPicPr>
+        <p:blipFill>
+          <a:blip r:embed="rId3">
+            <a:extLst>
+              <a:ext uri="{28A0092B-C50C-407E-A947-70E740481C1C}">
+                <a14:useLocalDpi xmlns:a14="http://schemas.microsoft.com/office/drawing/2010/main" val="0"/>
+              </a:ext>
+            </a:extLst>
+          </a:blip>
+          <a:srcRect/>
+          <a:stretch>
+            <a:fillRect/>
+          </a:stretch>
+        </p:blipFill>
+        <p:spPr bwMode="auto">
+          <a:xfrm>
+            <a:off x="2961217" y="939800"/>
+            <a:ext cx="5067300" cy="4978400"/>
+          </a:xfrm>
+          <a:prstGeom prst="rect">
+            <a:avLst/>
+          </a:prstGeom>
+          <a:noFill/>
+          <a:extLst>
+            <a:ext uri="{909E8E84-426E-40DD-AFC4-6F175D3DCCD1}">
+              <a14:hiddenFill xmlns:a14="http://schemas.microsoft.com/office/drawing/2010/main">
+                <a:solidFill>
+                  <a:srgbClr val="FFFFFF"/>
+                </a:solidFill>
+              </a14:hiddenFill>
+            </a:ext>
+          </a:extLst>
+        </p:spPr>
+      </p:pic>
+      <p:sp>
+        <p:nvSpPr>
+          <p:cNvPr id="2" name="Textfeld 1">
+            <a:extLst>
+              <a:ext uri="{FF2B5EF4-FFF2-40B4-BE49-F238E27FC236}">
+                <a16:creationId xmlns:a16="http://schemas.microsoft.com/office/drawing/2014/main" id="{C8CACCBA-630B-624E-8108-6AB3F85F1553}"/>
+              </a:ext>
+            </a:extLst>
+          </p:cNvPr>
+          <p:cNvSpPr txBox="1"/>
+          <p:nvPr/>
+        </p:nvSpPr>
+        <p:spPr>
+          <a:xfrm>
+            <a:off x="6470946" y="1250803"/>
+            <a:ext cx="1346886" cy="307777"/>
+          </a:xfrm>
+          <a:prstGeom prst="rect">
+            <a:avLst/>
+          </a:prstGeom>
+          <a:solidFill>
+            <a:schemeClr val="bg1">
+              <a:lumMod val="85000"/>
+            </a:schemeClr>
+          </a:solidFill>
+          <a:ln>
+            <a:noFill/>
+          </a:ln>
+        </p:spPr>
+        <p:txBody>
+          <a:bodyPr wrap="square" rtlCol="0">
+            <a:spAutoFit/>
+          </a:bodyPr>
+          <a:lstStyle/>
+          <a:p>
+            <a:pPr algn="r"/>
+            <a:r>
+              <a:rPr lang="de-DE" sz="1400">
+                <a:latin typeface="Arial" panose="020B0604020202020204" pitchFamily="34" charset="0"/>
+                <a:cs typeface="Arial" panose="020B0604020202020204" pitchFamily="34" charset="0"/>
+              </a:rPr>
+              <a:t>current phase</a:t>
+            </a:r>
+          </a:p>
+        </p:txBody>
+      </p:sp>
+      <p:sp>
+        <p:nvSpPr>
+          <p:cNvPr id="3" name="Textfeld 2">
+            <a:extLst>
+              <a:ext uri="{FF2B5EF4-FFF2-40B4-BE49-F238E27FC236}">
+                <a16:creationId xmlns:a16="http://schemas.microsoft.com/office/drawing/2014/main" id="{761261D5-8606-C19A-C88C-C1A6786E4EAC}"/>
+              </a:ext>
+            </a:extLst>
+          </p:cNvPr>
+          <p:cNvSpPr txBox="1"/>
+          <p:nvPr/>
+        </p:nvSpPr>
+        <p:spPr>
+          <a:xfrm>
+            <a:off x="5704932" y="3514808"/>
+            <a:ext cx="2112900" cy="307777"/>
+          </a:xfrm>
+          <a:prstGeom prst="rect">
+            <a:avLst/>
+          </a:prstGeom>
+          <a:solidFill>
+            <a:schemeClr val="bg1">
+              <a:lumMod val="85000"/>
+            </a:schemeClr>
+          </a:solidFill>
+          <a:ln>
+            <a:noFill/>
+          </a:ln>
+        </p:spPr>
+        <p:txBody>
+          <a:bodyPr wrap="square" rtlCol="0">
+            <a:spAutoFit/>
+          </a:bodyPr>
+          <a:lstStyle/>
+          <a:p>
+            <a:pPr algn="r"/>
+            <a:r>
+              <a:rPr lang="de-DE" sz="1400">
+                <a:latin typeface="Arial" panose="020B0604020202020204" pitchFamily="34" charset="0"/>
+                <a:cs typeface="Arial" panose="020B0604020202020204" pitchFamily="34" charset="0"/>
+              </a:rPr>
+              <a:t>6 months into the future</a:t>
+            </a:r>
+          </a:p>
+        </p:txBody>
+      </p:sp>
+    </p:spTree>
+    <p:extLst>
+      <p:ext uri="{BB962C8B-B14F-4D97-AF65-F5344CB8AC3E}">
+        <p14:creationId xmlns:p14="http://schemas.microsoft.com/office/powerpoint/2010/main" val="2079808273"/>
+      </p:ext>
+    </p:extLst>
+  </p:cSld>
+  <p:clrMapOvr>
+    <a:masterClrMapping/>
+  </p:clrMapOvr>
+</p:sld>
+</file>
+
 <file path=ppt/slides/slide2.xml><?xml version="1.0" encoding="utf-8"?>
 <p:sld xmlns:a="http://schemas.openxmlformats.org/drawingml/2006/main" xmlns:r="http://schemas.openxmlformats.org/officeDocument/2006/relationships" xmlns:p="http://schemas.openxmlformats.org/presentationml/2006/main">
   <p:cSld>
@@ -4615,10 +5317,10 @@
       </p:grpSpPr>
       <p:pic>
         <p:nvPicPr>
-          <p:cNvPr id="1026" name="Picture 2">
-            <a:extLst>
-              <a:ext uri="{FF2B5EF4-FFF2-40B4-BE49-F238E27FC236}">
-                <a16:creationId xmlns:a16="http://schemas.microsoft.com/office/drawing/2014/main" id="{7A188BDA-B97C-E86B-955F-7CF7D230A99F}"/>
+          <p:cNvPr id="1030" name="Picture 6">
+            <a:extLst>
+              <a:ext uri="{FF2B5EF4-FFF2-40B4-BE49-F238E27FC236}">
+                <a16:creationId xmlns:a16="http://schemas.microsoft.com/office/drawing/2014/main" id="{7EDA449D-A036-3496-F478-7F6CF6BE7307}"/>
               </a:ext>
             </a:extLst>
           </p:cNvPr>
@@ -4642,7 +5344,7 @@
         </p:blipFill>
         <p:spPr bwMode="auto">
           <a:xfrm>
-            <a:off x="871797" y="320761"/>
+            <a:off x="903761" y="345989"/>
             <a:ext cx="7493000" cy="6438900"/>
           </a:xfrm>
           <a:prstGeom prst="rect">
@@ -4812,10 +5514,10 @@
       </p:grpSpPr>
       <p:pic>
         <p:nvPicPr>
-          <p:cNvPr id="1028" name="Picture 4">
-            <a:extLst>
-              <a:ext uri="{FF2B5EF4-FFF2-40B4-BE49-F238E27FC236}">
-                <a16:creationId xmlns:a16="http://schemas.microsoft.com/office/drawing/2014/main" id="{403C4B18-0BBB-ACF7-0804-5DF4AE733F1C}"/>
+          <p:cNvPr id="3074" name="Picture 2">
+            <a:extLst>
+              <a:ext uri="{FF2B5EF4-FFF2-40B4-BE49-F238E27FC236}">
+                <a16:creationId xmlns:a16="http://schemas.microsoft.com/office/drawing/2014/main" id="{3791505B-48AD-9E26-9805-23E74E3666E4}"/>
               </a:ext>
             </a:extLst>
           </p:cNvPr>
@@ -4839,8 +5541,8 @@
         </p:blipFill>
         <p:spPr bwMode="auto">
           <a:xfrm>
-            <a:off x="82550" y="389525"/>
-            <a:ext cx="12026900" cy="6426200"/>
+            <a:off x="903761" y="345989"/>
+            <a:ext cx="7493000" cy="6438900"/>
           </a:xfrm>
           <a:prstGeom prst="rect">
             <a:avLst/>
@@ -4862,7 +5564,7 @@
           <p:cNvPr id="3" name="Rechteck 2">
             <a:extLst>
               <a:ext uri="{FF2B5EF4-FFF2-40B4-BE49-F238E27FC236}">
-                <a16:creationId xmlns:a16="http://schemas.microsoft.com/office/drawing/2014/main" id="{8A60A9A5-47B6-F11F-0488-373B184D160E}"/>
+                <a16:creationId xmlns:a16="http://schemas.microsoft.com/office/drawing/2014/main" id="{13B182CA-8220-7294-84E1-E79342174349}"/>
               </a:ext>
             </a:extLst>
           </p:cNvPr>
@@ -4871,8 +5573,8 @@
         </p:nvSpPr>
         <p:spPr>
           <a:xfrm>
-            <a:off x="669413" y="413473"/>
-            <a:ext cx="11125028" cy="316656"/>
+            <a:off x="7426411" y="345989"/>
+            <a:ext cx="1258135" cy="5486400"/>
           </a:xfrm>
           <a:prstGeom prst="rect">
             <a:avLst/>
@@ -4911,12 +5613,48 @@
           </a:p>
         </p:txBody>
       </p:sp>
+      <p:sp>
+        <p:nvSpPr>
+          <p:cNvPr id="4" name="Textfeld 3">
+            <a:extLst>
+              <a:ext uri="{FF2B5EF4-FFF2-40B4-BE49-F238E27FC236}">
+                <a16:creationId xmlns:a16="http://schemas.microsoft.com/office/drawing/2014/main" id="{40449692-859C-2835-F60E-A8B394F444F1}"/>
+              </a:ext>
+            </a:extLst>
+          </p:cNvPr>
+          <p:cNvSpPr txBox="1"/>
+          <p:nvPr/>
+        </p:nvSpPr>
+        <p:spPr>
+          <a:xfrm rot="16200000">
+            <a:off x="6049338" y="2827352"/>
+            <a:ext cx="3154256" cy="400110"/>
+          </a:xfrm>
+          <a:prstGeom prst="rect">
+            <a:avLst/>
+          </a:prstGeom>
+          <a:noFill/>
+        </p:spPr>
+        <p:txBody>
+          <a:bodyPr wrap="square" rtlCol="0">
+            <a:spAutoFit/>
+          </a:bodyPr>
+          <a:lstStyle/>
+          <a:p>
+            <a:pPr algn="ctr"/>
+            <a:r>
+              <a:rPr lang="de-DE" sz="2000"/>
+              <a:t>Correlation Coefficient</a:t>
+            </a:r>
+          </a:p>
+        </p:txBody>
+      </p:sp>
       <p:pic>
         <p:nvPicPr>
           <p:cNvPr id="2" name="Grafik 1">
             <a:extLst>
               <a:ext uri="{FF2B5EF4-FFF2-40B4-BE49-F238E27FC236}">
-                <a16:creationId xmlns:a16="http://schemas.microsoft.com/office/drawing/2014/main" id="{9F385B11-B76C-975F-ED35-74CBEC826BB2}"/>
+                <a16:creationId xmlns:a16="http://schemas.microsoft.com/office/drawing/2014/main" id="{3DD5B366-C4CF-7EE4-1361-A058FBAC2364}"/>
               </a:ext>
             </a:extLst>
           </p:cNvPr>
@@ -4933,68 +5671,8 @@
         </p:blipFill>
         <p:spPr>
           <a:xfrm>
-            <a:off x="712980" y="251079"/>
-            <a:ext cx="11093818" cy="310678"/>
-          </a:xfrm>
-          <a:prstGeom prst="rect">
-            <a:avLst/>
-          </a:prstGeom>
-        </p:spPr>
-      </p:pic>
-      <p:pic>
-        <p:nvPicPr>
-          <p:cNvPr id="6" name="Grafik 5">
-            <a:extLst>
-              <a:ext uri="{FF2B5EF4-FFF2-40B4-BE49-F238E27FC236}">
-                <a16:creationId xmlns:a16="http://schemas.microsoft.com/office/drawing/2014/main" id="{2FFC7A13-B98E-AB04-FB10-F2DD88448CE5}"/>
-              </a:ext>
-            </a:extLst>
-          </p:cNvPr>
-          <p:cNvPicPr>
-            <a:picLocks noChangeAspect="1"/>
-          </p:cNvPicPr>
-          <p:nvPr/>
-        </p:nvPicPr>
-        <p:blipFill>
-          <a:blip r:embed="rId5"/>
-          <a:stretch>
-            <a:fillRect/>
-          </a:stretch>
-        </p:blipFill>
-        <p:spPr>
-          <a:xfrm>
-            <a:off x="7436855" y="1145892"/>
-            <a:ext cx="482282" cy="227988"/>
-          </a:xfrm>
-          <a:prstGeom prst="rect">
-            <a:avLst/>
-          </a:prstGeom>
-        </p:spPr>
-      </p:pic>
-      <p:pic>
-        <p:nvPicPr>
-          <p:cNvPr id="7" name="Grafik 6">
-            <a:extLst>
-              <a:ext uri="{FF2B5EF4-FFF2-40B4-BE49-F238E27FC236}">
-                <a16:creationId xmlns:a16="http://schemas.microsoft.com/office/drawing/2014/main" id="{B453D44E-AAB2-9C2B-5E0E-4652021B3F58}"/>
-              </a:ext>
-            </a:extLst>
-          </p:cNvPr>
-          <p:cNvPicPr>
-            <a:picLocks noChangeAspect="1"/>
-          </p:cNvPicPr>
-          <p:nvPr/>
-        </p:nvPicPr>
-        <p:blipFill>
-          <a:blip r:embed="rId5"/>
-          <a:stretch>
-            <a:fillRect/>
-          </a:stretch>
-        </p:blipFill>
-        <p:spPr>
-          <a:xfrm>
-            <a:off x="7355830" y="4145664"/>
-            <a:ext cx="482282" cy="227988"/>
+            <a:off x="7728781" y="531339"/>
+            <a:ext cx="856182" cy="5125823"/>
           </a:xfrm>
           <a:prstGeom prst="rect">
             <a:avLst/>
@@ -5004,7 +5682,7 @@
     </p:spTree>
     <p:extLst>
       <p:ext uri="{BB962C8B-B14F-4D97-AF65-F5344CB8AC3E}">
-        <p14:creationId xmlns:p14="http://schemas.microsoft.com/office/powerpoint/2010/main" val="1045529663"/>
+        <p14:creationId xmlns:p14="http://schemas.microsoft.com/office/powerpoint/2010/main" val="116128757"/>
       </p:ext>
     </p:extLst>
   </p:cSld>
@@ -5031,6 +5709,53 @@
           <a:chExt cx="0" cy="0"/>
         </a:xfrm>
       </p:grpSpPr>
+      <p:pic>
+        <p:nvPicPr>
+          <p:cNvPr id="1028" name="Picture 4">
+            <a:extLst>
+              <a:ext uri="{FF2B5EF4-FFF2-40B4-BE49-F238E27FC236}">
+                <a16:creationId xmlns:a16="http://schemas.microsoft.com/office/drawing/2014/main" id="{403C4B18-0BBB-ACF7-0804-5DF4AE733F1C}"/>
+              </a:ext>
+            </a:extLst>
+          </p:cNvPr>
+          <p:cNvPicPr>
+            <a:picLocks noChangeAspect="1" noChangeArrowheads="1"/>
+          </p:cNvPicPr>
+          <p:nvPr/>
+        </p:nvPicPr>
+        <p:blipFill>
+          <a:blip r:embed="rId3">
+            <a:extLst>
+              <a:ext uri="{28A0092B-C50C-407E-A947-70E740481C1C}">
+                <a14:useLocalDpi xmlns:a14="http://schemas.microsoft.com/office/drawing/2010/main" val="0"/>
+              </a:ext>
+            </a:extLst>
+          </a:blip>
+          <a:srcRect/>
+          <a:stretch>
+            <a:fillRect/>
+          </a:stretch>
+        </p:blipFill>
+        <p:spPr bwMode="auto">
+          <a:xfrm>
+            <a:off x="82550" y="389525"/>
+            <a:ext cx="12026900" cy="6426200"/>
+          </a:xfrm>
+          <a:prstGeom prst="rect">
+            <a:avLst/>
+          </a:prstGeom>
+          <a:noFill/>
+          <a:extLst>
+            <a:ext uri="{909E8E84-426E-40DD-AFC4-6F175D3DCCD1}">
+              <a14:hiddenFill xmlns:a14="http://schemas.microsoft.com/office/drawing/2010/main">
+                <a:solidFill>
+                  <a:srgbClr val="FFFFFF"/>
+                </a:solidFill>
+              </a14:hiddenFill>
+            </a:ext>
+          </a:extLst>
+        </p:spPr>
+      </p:pic>
       <p:sp>
         <p:nvSpPr>
           <p:cNvPr id="3" name="Rechteck 2">
@@ -5100,7 +5825,7 @@
           <p:nvPr/>
         </p:nvPicPr>
         <p:blipFill>
-          <a:blip r:embed="rId3"/>
+          <a:blip r:embed="rId4"/>
           <a:stretch>
             <a:fillRect/>
           </a:stretch>
@@ -5117,10 +5842,10 @@
       </p:pic>
       <p:pic>
         <p:nvPicPr>
-          <p:cNvPr id="4" name="Grafik 3">
-            <a:extLst>
-              <a:ext uri="{FF2B5EF4-FFF2-40B4-BE49-F238E27FC236}">
-                <a16:creationId xmlns:a16="http://schemas.microsoft.com/office/drawing/2014/main" id="{BAD3BF93-35FC-5BAE-7673-3E28D46CD80D}"/>
+          <p:cNvPr id="6" name="Grafik 5">
+            <a:extLst>
+              <a:ext uri="{FF2B5EF4-FFF2-40B4-BE49-F238E27FC236}">
+                <a16:creationId xmlns:a16="http://schemas.microsoft.com/office/drawing/2014/main" id="{2FFC7A13-B98E-AB04-FB10-F2DD88448CE5}"/>
               </a:ext>
             </a:extLst>
           </p:cNvPr>
@@ -5130,15 +5855,45 @@
           <p:nvPr/>
         </p:nvPicPr>
         <p:blipFill>
-          <a:blip r:embed="rId4"/>
+          <a:blip r:embed="rId5"/>
           <a:stretch>
             <a:fillRect/>
           </a:stretch>
         </p:blipFill>
         <p:spPr>
           <a:xfrm>
-            <a:off x="397559" y="571801"/>
-            <a:ext cx="11396882" cy="2893508"/>
+            <a:off x="7436855" y="1145892"/>
+            <a:ext cx="482282" cy="227988"/>
+          </a:xfrm>
+          <a:prstGeom prst="rect">
+            <a:avLst/>
+          </a:prstGeom>
+        </p:spPr>
+      </p:pic>
+      <p:pic>
+        <p:nvPicPr>
+          <p:cNvPr id="7" name="Grafik 6">
+            <a:extLst>
+              <a:ext uri="{FF2B5EF4-FFF2-40B4-BE49-F238E27FC236}">
+                <a16:creationId xmlns:a16="http://schemas.microsoft.com/office/drawing/2014/main" id="{B453D44E-AAB2-9C2B-5E0E-4652021B3F58}"/>
+              </a:ext>
+            </a:extLst>
+          </p:cNvPr>
+          <p:cNvPicPr>
+            <a:picLocks noChangeAspect="1"/>
+          </p:cNvPicPr>
+          <p:nvPr/>
+        </p:nvPicPr>
+        <p:blipFill>
+          <a:blip r:embed="rId5"/>
+          <a:stretch>
+            <a:fillRect/>
+          </a:stretch>
+        </p:blipFill>
+        <p:spPr>
+          <a:xfrm>
+            <a:off x="7355830" y="4145664"/>
+            <a:ext cx="482282" cy="227988"/>
           </a:xfrm>
           <a:prstGeom prst="rect">
             <a:avLst/>
@@ -5148,7 +5903,7 @@
     </p:spTree>
     <p:extLst>
       <p:ext uri="{BB962C8B-B14F-4D97-AF65-F5344CB8AC3E}">
-        <p14:creationId xmlns:p14="http://schemas.microsoft.com/office/powerpoint/2010/main" val="3230322937"/>
+        <p14:creationId xmlns:p14="http://schemas.microsoft.com/office/powerpoint/2010/main" val="1045529663"/>
       </p:ext>
     </p:extLst>
   </p:cSld>
@@ -5175,59 +5930,12 @@
           <a:chExt cx="0" cy="0"/>
         </a:xfrm>
       </p:grpSpPr>
-      <p:pic>
-        <p:nvPicPr>
-          <p:cNvPr id="2" name="Picture 2">
-            <a:extLst>
-              <a:ext uri="{FF2B5EF4-FFF2-40B4-BE49-F238E27FC236}">
-                <a16:creationId xmlns:a16="http://schemas.microsoft.com/office/drawing/2014/main" id="{8BBC3618-A151-4772-556A-369529627BC3}"/>
-              </a:ext>
-            </a:extLst>
-          </p:cNvPr>
-          <p:cNvPicPr>
-            <a:picLocks noChangeAspect="1" noChangeArrowheads="1"/>
-          </p:cNvPicPr>
-          <p:nvPr/>
-        </p:nvPicPr>
-        <p:blipFill>
-          <a:blip r:embed="rId3">
-            <a:extLst>
-              <a:ext uri="{28A0092B-C50C-407E-A947-70E740481C1C}">
-                <a14:useLocalDpi xmlns:a14="http://schemas.microsoft.com/office/drawing/2010/main" val="0"/>
-              </a:ext>
-            </a:extLst>
-          </a:blip>
-          <a:srcRect/>
-          <a:stretch>
-            <a:fillRect/>
-          </a:stretch>
-        </p:blipFill>
-        <p:spPr bwMode="auto">
-          <a:xfrm>
-            <a:off x="316054" y="1923617"/>
-            <a:ext cx="11341100" cy="2590800"/>
-          </a:xfrm>
-          <a:prstGeom prst="rect">
-            <a:avLst/>
-          </a:prstGeom>
-          <a:noFill/>
-          <a:extLst>
-            <a:ext uri="{909E8E84-426E-40DD-AFC4-6F175D3DCCD1}">
-              <a14:hiddenFill xmlns:a14="http://schemas.microsoft.com/office/drawing/2010/main">
-                <a:solidFill>
-                  <a:srgbClr val="FFFFFF"/>
-                </a:solidFill>
-              </a14:hiddenFill>
-            </a:ext>
-          </a:extLst>
-        </p:spPr>
-      </p:pic>
-      <p:sp>
-        <p:nvSpPr>
-          <p:cNvPr id="4" name="Rechteck 3">
-            <a:extLst>
-              <a:ext uri="{FF2B5EF4-FFF2-40B4-BE49-F238E27FC236}">
-                <a16:creationId xmlns:a16="http://schemas.microsoft.com/office/drawing/2014/main" id="{9817D8CD-B2B1-4EBE-B8C5-63FCD2373FAB}"/>
+      <p:sp>
+        <p:nvSpPr>
+          <p:cNvPr id="3" name="Rechteck 2">
+            <a:extLst>
+              <a:ext uri="{FF2B5EF4-FFF2-40B4-BE49-F238E27FC236}">
+                <a16:creationId xmlns:a16="http://schemas.microsoft.com/office/drawing/2014/main" id="{8A60A9A5-47B6-F11F-0488-373B184D160E}"/>
               </a:ext>
             </a:extLst>
           </p:cNvPr>
@@ -5236,8 +5944,8 @@
         </p:nvSpPr>
         <p:spPr>
           <a:xfrm>
-            <a:off x="5636871" y="4269176"/>
-            <a:ext cx="1551007" cy="532436"/>
+            <a:off x="669413" y="413473"/>
+            <a:ext cx="11125028" cy="316656"/>
           </a:xfrm>
           <a:prstGeom prst="rect">
             <a:avLst/>
@@ -5276,170 +5984,70 @@
           </a:p>
         </p:txBody>
       </p:sp>
-      <p:sp>
-        <p:nvSpPr>
-          <p:cNvPr id="5" name="Rechteck 4">
-            <a:extLst>
-              <a:ext uri="{FF2B5EF4-FFF2-40B4-BE49-F238E27FC236}">
-                <a16:creationId xmlns:a16="http://schemas.microsoft.com/office/drawing/2014/main" id="{B7FED5E2-A39B-F2D3-9525-FA48411493F0}"/>
-              </a:ext>
-            </a:extLst>
-          </p:cNvPr>
-          <p:cNvSpPr/>
+      <p:pic>
+        <p:nvPicPr>
+          <p:cNvPr id="2" name="Grafik 1">
+            <a:extLst>
+              <a:ext uri="{FF2B5EF4-FFF2-40B4-BE49-F238E27FC236}">
+                <a16:creationId xmlns:a16="http://schemas.microsoft.com/office/drawing/2014/main" id="{9F385B11-B76C-975F-ED35-74CBEC826BB2}"/>
+              </a:ext>
+            </a:extLst>
+          </p:cNvPr>
+          <p:cNvPicPr>
+            <a:picLocks noChangeAspect="1"/>
+          </p:cNvPicPr>
           <p:nvPr/>
-        </p:nvSpPr>
-        <p:spPr>
-          <a:xfrm>
-            <a:off x="1" y="2397888"/>
-            <a:ext cx="534846" cy="947196"/>
+        </p:nvPicPr>
+        <p:blipFill>
+          <a:blip r:embed="rId3"/>
+          <a:stretch>
+            <a:fillRect/>
+          </a:stretch>
+        </p:blipFill>
+        <p:spPr>
+          <a:xfrm>
+            <a:off x="712980" y="251079"/>
+            <a:ext cx="11093818" cy="310678"/>
           </a:xfrm>
           <a:prstGeom prst="rect">
             <a:avLst/>
           </a:prstGeom>
-          <a:solidFill>
-            <a:schemeClr val="bg1"/>
-          </a:solidFill>
-          <a:ln>
-            <a:solidFill>
-              <a:schemeClr val="bg1"/>
-            </a:solidFill>
-          </a:ln>
-        </p:spPr>
-        <p:style>
-          <a:lnRef idx="2">
-            <a:schemeClr val="accent1">
-              <a:shade val="50000"/>
-            </a:schemeClr>
-          </a:lnRef>
-          <a:fillRef idx="1">
-            <a:schemeClr val="accent1"/>
-          </a:fillRef>
-          <a:effectRef idx="0">
-            <a:schemeClr val="accent1"/>
-          </a:effectRef>
-          <a:fontRef idx="minor">
-            <a:schemeClr val="lt1"/>
-          </a:fontRef>
-        </p:style>
-        <p:txBody>
-          <a:bodyPr rtlCol="0" anchor="ctr"/>
-          <a:lstStyle/>
-          <a:p>
-            <a:pPr algn="ctr"/>
-            <a:endParaRPr lang="de-DE"/>
-          </a:p>
-        </p:txBody>
-      </p:sp>
-      <p:sp>
-        <p:nvSpPr>
-          <p:cNvPr id="11" name="Textfeld 10">
-            <a:extLst>
-              <a:ext uri="{FF2B5EF4-FFF2-40B4-BE49-F238E27FC236}">
-                <a16:creationId xmlns:a16="http://schemas.microsoft.com/office/drawing/2014/main" id="{70EE1512-C048-8FEA-FDF5-127FCB9DBE48}"/>
-              </a:ext>
-            </a:extLst>
-          </p:cNvPr>
-          <p:cNvSpPr txBox="1"/>
+        </p:spPr>
+      </p:pic>
+      <p:pic>
+        <p:nvPicPr>
+          <p:cNvPr id="4" name="Grafik 3">
+            <a:extLst>
+              <a:ext uri="{FF2B5EF4-FFF2-40B4-BE49-F238E27FC236}">
+                <a16:creationId xmlns:a16="http://schemas.microsoft.com/office/drawing/2014/main" id="{BAD3BF93-35FC-5BAE-7673-3E28D46CD80D}"/>
+              </a:ext>
+            </a:extLst>
+          </p:cNvPr>
+          <p:cNvPicPr>
+            <a:picLocks noChangeAspect="1"/>
+          </p:cNvPicPr>
           <p:nvPr/>
-        </p:nvSpPr>
-        <p:spPr>
-          <a:xfrm rot="16200000">
-            <a:off x="-262128" y="2594936"/>
-            <a:ext cx="1130964" cy="369332"/>
+        </p:nvPicPr>
+        <p:blipFill>
+          <a:blip r:embed="rId4"/>
+          <a:stretch>
+            <a:fillRect/>
+          </a:stretch>
+        </p:blipFill>
+        <p:spPr>
+          <a:xfrm>
+            <a:off x="397559" y="571801"/>
+            <a:ext cx="11396882" cy="2893508"/>
           </a:xfrm>
           <a:prstGeom prst="rect">
             <a:avLst/>
           </a:prstGeom>
-          <a:noFill/>
-        </p:spPr>
-        <p:txBody>
-          <a:bodyPr wrap="square" rtlCol="0">
-            <a:spAutoFit/>
-          </a:bodyPr>
-          <a:lstStyle/>
-          <a:p>
-            <a:r>
-              <a:rPr lang="de-DE"/>
-              <a:t>Targets</a:t>
-            </a:r>
-          </a:p>
-        </p:txBody>
-      </p:sp>
-      <p:sp>
-        <p:nvSpPr>
-          <p:cNvPr id="12" name="Textfeld 11">
-            <a:extLst>
-              <a:ext uri="{FF2B5EF4-FFF2-40B4-BE49-F238E27FC236}">
-                <a16:creationId xmlns:a16="http://schemas.microsoft.com/office/drawing/2014/main" id="{10A65E60-8D34-9E58-05E5-F3BD887B2B84}"/>
-              </a:ext>
-            </a:extLst>
-          </p:cNvPr>
-          <p:cNvSpPr txBox="1"/>
-          <p:nvPr/>
-        </p:nvSpPr>
-        <p:spPr>
-          <a:xfrm>
-            <a:off x="6179798" y="4227288"/>
-            <a:ext cx="2161812" cy="369332"/>
-          </a:xfrm>
-          <a:prstGeom prst="rect">
-            <a:avLst/>
-          </a:prstGeom>
-          <a:noFill/>
-        </p:spPr>
-        <p:txBody>
-          <a:bodyPr wrap="square" rtlCol="0">
-            <a:spAutoFit/>
-          </a:bodyPr>
-          <a:lstStyle/>
-          <a:p>
-            <a:r>
-              <a:rPr lang="de-DE"/>
-              <a:t>Input Features</a:t>
-            </a:r>
-          </a:p>
-        </p:txBody>
-      </p:sp>
-      <p:sp>
-        <p:nvSpPr>
-          <p:cNvPr id="13" name="Textfeld 12">
-            <a:extLst>
-              <a:ext uri="{FF2B5EF4-FFF2-40B4-BE49-F238E27FC236}">
-                <a16:creationId xmlns:a16="http://schemas.microsoft.com/office/drawing/2014/main" id="{ADD40B8C-E0EC-1B7B-435B-53EC7EDFCDAD}"/>
-              </a:ext>
-            </a:extLst>
-          </p:cNvPr>
-          <p:cNvSpPr txBox="1"/>
-          <p:nvPr/>
-        </p:nvSpPr>
-        <p:spPr>
-          <a:xfrm rot="16200000">
-            <a:off x="10325561" y="2455843"/>
-            <a:ext cx="1280010" cy="584775"/>
-          </a:xfrm>
-          <a:prstGeom prst="rect">
-            <a:avLst/>
-          </a:prstGeom>
-          <a:noFill/>
-        </p:spPr>
-        <p:txBody>
-          <a:bodyPr wrap="square" rtlCol="0">
-            <a:spAutoFit/>
-          </a:bodyPr>
-          <a:lstStyle/>
-          <a:p>
-            <a:pPr algn="ctr"/>
-            <a:r>
-              <a:rPr lang="de-DE" sz="1600"/>
-              <a:t>Correlation Coefficient</a:t>
-            </a:r>
-          </a:p>
-        </p:txBody>
-      </p:sp>
+        </p:spPr>
+      </p:pic>
     </p:spTree>
     <p:extLst>
       <p:ext uri="{BB962C8B-B14F-4D97-AF65-F5344CB8AC3E}">
-        <p14:creationId xmlns:p14="http://schemas.microsoft.com/office/powerpoint/2010/main" val="3008082199"/>
+        <p14:creationId xmlns:p14="http://schemas.microsoft.com/office/powerpoint/2010/main" val="3230322937"/>
       </p:ext>
     </p:extLst>
   </p:cSld>
@@ -5468,10 +6076,10 @@
       </p:grpSpPr>
       <p:pic>
         <p:nvPicPr>
-          <p:cNvPr id="2052" name="Picture 4">
-            <a:extLst>
-              <a:ext uri="{FF2B5EF4-FFF2-40B4-BE49-F238E27FC236}">
-                <a16:creationId xmlns:a16="http://schemas.microsoft.com/office/drawing/2014/main" id="{1750A7BD-1EA7-FE04-1B0B-7E3D02683640}"/>
+          <p:cNvPr id="2" name="Picture 2">
+            <a:extLst>
+              <a:ext uri="{FF2B5EF4-FFF2-40B4-BE49-F238E27FC236}">
+                <a16:creationId xmlns:a16="http://schemas.microsoft.com/office/drawing/2014/main" id="{8BBC3618-A151-4772-556A-369529627BC3}"/>
               </a:ext>
             </a:extLst>
           </p:cNvPr>
@@ -5495,8 +6103,8 @@
         </p:blipFill>
         <p:spPr bwMode="auto">
           <a:xfrm>
-            <a:off x="252554" y="1967720"/>
-            <a:ext cx="11404600" cy="2628900"/>
+            <a:off x="316054" y="1923617"/>
+            <a:ext cx="11341100" cy="2590800"/>
           </a:xfrm>
           <a:prstGeom prst="rect">
             <a:avLst/>
@@ -5581,8 +6189,8 @@
         </p:nvSpPr>
         <p:spPr>
           <a:xfrm>
-            <a:off x="93974" y="2397888"/>
-            <a:ext cx="403802" cy="947196"/>
+            <a:off x="1" y="2397888"/>
+            <a:ext cx="534846" cy="947196"/>
           </a:xfrm>
           <a:prstGeom prst="rect">
             <a:avLst/>
@@ -5730,7 +6338,7 @@
     </p:spTree>
     <p:extLst>
       <p:ext uri="{BB962C8B-B14F-4D97-AF65-F5344CB8AC3E}">
-        <p14:creationId xmlns:p14="http://schemas.microsoft.com/office/powerpoint/2010/main" val="2040277198"/>
+        <p14:creationId xmlns:p14="http://schemas.microsoft.com/office/powerpoint/2010/main" val="3008082199"/>
       </p:ext>
     </p:extLst>
   </p:cSld>
@@ -5759,137 +6367,180 @@
       </p:grpSpPr>
       <p:pic>
         <p:nvPicPr>
-          <p:cNvPr id="2" name="Grafik 1">
-            <a:extLst>
-              <a:ext uri="{FF2B5EF4-FFF2-40B4-BE49-F238E27FC236}">
-                <a16:creationId xmlns:a16="http://schemas.microsoft.com/office/drawing/2014/main" id="{9768EA39-627B-C584-A24D-E6D1A5B4D95B}"/>
+          <p:cNvPr id="2052" name="Picture 4">
+            <a:extLst>
+              <a:ext uri="{FF2B5EF4-FFF2-40B4-BE49-F238E27FC236}">
+                <a16:creationId xmlns:a16="http://schemas.microsoft.com/office/drawing/2014/main" id="{1750A7BD-1EA7-FE04-1B0B-7E3D02683640}"/>
               </a:ext>
             </a:extLst>
           </p:cNvPr>
           <p:cNvPicPr>
-            <a:picLocks noChangeAspect="1"/>
+            <a:picLocks noChangeAspect="1" noChangeArrowheads="1"/>
           </p:cNvPicPr>
           <p:nvPr/>
         </p:nvPicPr>
         <p:blipFill>
-          <a:blip r:embed="rId3"/>
+          <a:blip r:embed="rId3">
+            <a:extLst>
+              <a:ext uri="{28A0092B-C50C-407E-A947-70E740481C1C}">
+                <a14:useLocalDpi xmlns:a14="http://schemas.microsoft.com/office/drawing/2010/main" val="0"/>
+              </a:ext>
+            </a:extLst>
+          </a:blip>
+          <a:srcRect/>
           <a:stretch>
             <a:fillRect/>
           </a:stretch>
         </p:blipFill>
-        <p:spPr>
-          <a:xfrm>
-            <a:off x="1920433" y="368782"/>
-            <a:ext cx="7772400" cy="1907249"/>
+        <p:spPr bwMode="auto">
+          <a:xfrm>
+            <a:off x="252554" y="1967720"/>
+            <a:ext cx="11404600" cy="2628900"/>
           </a:xfrm>
           <a:prstGeom prst="rect">
             <a:avLst/>
           </a:prstGeom>
+          <a:noFill/>
+          <a:extLst>
+            <a:ext uri="{909E8E84-426E-40DD-AFC4-6F175D3DCCD1}">
+              <a14:hiddenFill xmlns:a14="http://schemas.microsoft.com/office/drawing/2010/main">
+                <a:solidFill>
+                  <a:srgbClr val="FFFFFF"/>
+                </a:solidFill>
+              </a14:hiddenFill>
+            </a:ext>
+          </a:extLst>
         </p:spPr>
       </p:pic>
-      <p:pic>
-        <p:nvPicPr>
-          <p:cNvPr id="3" name="Grafik 2">
-            <a:extLst>
-              <a:ext uri="{FF2B5EF4-FFF2-40B4-BE49-F238E27FC236}">
-                <a16:creationId xmlns:a16="http://schemas.microsoft.com/office/drawing/2014/main" id="{ECE26964-11E3-91D4-9480-6EB9044F4DDB}"/>
-              </a:ext>
-            </a:extLst>
-          </p:cNvPr>
-          <p:cNvPicPr>
-            <a:picLocks noChangeAspect="1"/>
-          </p:cNvPicPr>
+      <p:sp>
+        <p:nvSpPr>
+          <p:cNvPr id="4" name="Rechteck 3">
+            <a:extLst>
+              <a:ext uri="{FF2B5EF4-FFF2-40B4-BE49-F238E27FC236}">
+                <a16:creationId xmlns:a16="http://schemas.microsoft.com/office/drawing/2014/main" id="{9817D8CD-B2B1-4EBE-B8C5-63FCD2373FAB}"/>
+              </a:ext>
+            </a:extLst>
+          </p:cNvPr>
+          <p:cNvSpPr/>
           <p:nvPr/>
-        </p:nvPicPr>
-        <p:blipFill>
-          <a:blip r:embed="rId4"/>
-          <a:stretch>
-            <a:fillRect/>
-          </a:stretch>
-        </p:blipFill>
-        <p:spPr>
-          <a:xfrm>
-            <a:off x="1920433" y="2375819"/>
-            <a:ext cx="7772400" cy="3749968"/>
-          </a:xfrm>
-          <a:prstGeom prst="rect">
-            <a:avLst/>
-          </a:prstGeom>
-        </p:spPr>
-      </p:pic>
-      <p:sp>
-        <p:nvSpPr>
-          <p:cNvPr id="6" name="Textfeld 5">
-            <a:extLst>
-              <a:ext uri="{FF2B5EF4-FFF2-40B4-BE49-F238E27FC236}">
-                <a16:creationId xmlns:a16="http://schemas.microsoft.com/office/drawing/2014/main" id="{BD99F089-52D4-5901-CBE0-D593D0D09E69}"/>
-              </a:ext>
-            </a:extLst>
-          </p:cNvPr>
-          <p:cNvSpPr txBox="1"/>
-          <p:nvPr/>
-        </p:nvSpPr>
-        <p:spPr>
-          <a:xfrm>
-            <a:off x="5336286" y="572768"/>
-            <a:ext cx="295234" cy="338554"/>
+        </p:nvSpPr>
+        <p:spPr>
+          <a:xfrm>
+            <a:off x="5636871" y="4269176"/>
+            <a:ext cx="1551007" cy="532436"/>
           </a:xfrm>
           <a:prstGeom prst="rect">
             <a:avLst/>
           </a:prstGeom>
           <a:solidFill>
-            <a:schemeClr val="bg1">
-              <a:lumMod val="75000"/>
-            </a:schemeClr>
+            <a:schemeClr val="bg1"/>
           </a:solidFill>
           <a:ln>
-            <a:noFill/>
+            <a:solidFill>
+              <a:schemeClr val="bg1"/>
+            </a:solidFill>
           </a:ln>
         </p:spPr>
-        <p:txBody>
-          <a:bodyPr wrap="square" rtlCol="0">
-            <a:spAutoFit/>
-          </a:bodyPr>
-          <a:lstStyle/>
-          <a:p>
-            <a:r>
-              <a:rPr lang="de-DE" sz="1600" b="1">
-                <a:latin typeface="Arial" panose="020B0604020202020204" pitchFamily="34" charset="0"/>
-                <a:cs typeface="Arial" panose="020B0604020202020204" pitchFamily="34" charset="0"/>
-              </a:rPr>
-              <a:t>A</a:t>
-            </a:r>
-          </a:p>
-        </p:txBody>
-      </p:sp>
-      <p:sp>
-        <p:nvSpPr>
-          <p:cNvPr id="7" name="Textfeld 6">
-            <a:extLst>
-              <a:ext uri="{FF2B5EF4-FFF2-40B4-BE49-F238E27FC236}">
-                <a16:creationId xmlns:a16="http://schemas.microsoft.com/office/drawing/2014/main" id="{0857B115-7DD7-115E-E2DE-85BCB71B157F}"/>
-              </a:ext>
-            </a:extLst>
-          </p:cNvPr>
-          <p:cNvSpPr txBox="1"/>
+        <p:style>
+          <a:lnRef idx="2">
+            <a:schemeClr val="accent1">
+              <a:shade val="50000"/>
+            </a:schemeClr>
+          </a:lnRef>
+          <a:fillRef idx="1">
+            <a:schemeClr val="accent1"/>
+          </a:fillRef>
+          <a:effectRef idx="0">
+            <a:schemeClr val="accent1"/>
+          </a:effectRef>
+          <a:fontRef idx="minor">
+            <a:schemeClr val="lt1"/>
+          </a:fontRef>
+        </p:style>
+        <p:txBody>
+          <a:bodyPr rtlCol="0" anchor="ctr"/>
+          <a:lstStyle/>
+          <a:p>
+            <a:pPr algn="ctr"/>
+            <a:endParaRPr lang="de-DE"/>
+          </a:p>
+        </p:txBody>
+      </p:sp>
+      <p:sp>
+        <p:nvSpPr>
+          <p:cNvPr id="5" name="Rechteck 4">
+            <a:extLst>
+              <a:ext uri="{FF2B5EF4-FFF2-40B4-BE49-F238E27FC236}">
+                <a16:creationId xmlns:a16="http://schemas.microsoft.com/office/drawing/2014/main" id="{B7FED5E2-A39B-F2D3-9525-FA48411493F0}"/>
+              </a:ext>
+            </a:extLst>
+          </p:cNvPr>
+          <p:cNvSpPr/>
           <p:nvPr/>
         </p:nvSpPr>
         <p:spPr>
           <a:xfrm>
-            <a:off x="5316622" y="2409579"/>
-            <a:ext cx="295234" cy="338554"/>
+            <a:off x="93974" y="2397888"/>
+            <a:ext cx="403802" cy="947196"/>
           </a:xfrm>
           <a:prstGeom prst="rect">
             <a:avLst/>
           </a:prstGeom>
           <a:solidFill>
-            <a:schemeClr val="bg1">
-              <a:lumMod val="75000"/>
-            </a:schemeClr>
+            <a:schemeClr val="bg1"/>
           </a:solidFill>
           <a:ln>
-            <a:noFill/>
+            <a:solidFill>
+              <a:schemeClr val="bg1"/>
+            </a:solidFill>
           </a:ln>
+        </p:spPr>
+        <p:style>
+          <a:lnRef idx="2">
+            <a:schemeClr val="accent1">
+              <a:shade val="50000"/>
+            </a:schemeClr>
+          </a:lnRef>
+          <a:fillRef idx="1">
+            <a:schemeClr val="accent1"/>
+          </a:fillRef>
+          <a:effectRef idx="0">
+            <a:schemeClr val="accent1"/>
+          </a:effectRef>
+          <a:fontRef idx="minor">
+            <a:schemeClr val="lt1"/>
+          </a:fontRef>
+        </p:style>
+        <p:txBody>
+          <a:bodyPr rtlCol="0" anchor="ctr"/>
+          <a:lstStyle/>
+          <a:p>
+            <a:pPr algn="ctr"/>
+            <a:endParaRPr lang="de-DE"/>
+          </a:p>
+        </p:txBody>
+      </p:sp>
+      <p:sp>
+        <p:nvSpPr>
+          <p:cNvPr id="11" name="Textfeld 10">
+            <a:extLst>
+              <a:ext uri="{FF2B5EF4-FFF2-40B4-BE49-F238E27FC236}">
+                <a16:creationId xmlns:a16="http://schemas.microsoft.com/office/drawing/2014/main" id="{70EE1512-C048-8FEA-FDF5-127FCB9DBE48}"/>
+              </a:ext>
+            </a:extLst>
+          </p:cNvPr>
+          <p:cNvSpPr txBox="1"/>
+          <p:nvPr/>
+        </p:nvSpPr>
+        <p:spPr>
+          <a:xfrm rot="16200000">
+            <a:off x="-262128" y="2594936"/>
+            <a:ext cx="1130964" cy="369332"/>
+          </a:xfrm>
+          <a:prstGeom prst="rect">
+            <a:avLst/>
+          </a:prstGeom>
+          <a:noFill/>
         </p:spPr>
         <p:txBody>
           <a:bodyPr wrap="square" rtlCol="0">
@@ -5898,21 +6549,18 @@
           <a:lstStyle/>
           <a:p>
             <a:r>
-              <a:rPr lang="de-DE" sz="1600" b="1">
-                <a:latin typeface="Arial" panose="020B0604020202020204" pitchFamily="34" charset="0"/>
-                <a:cs typeface="Arial" panose="020B0604020202020204" pitchFamily="34" charset="0"/>
-              </a:rPr>
-              <a:t>C</a:t>
-            </a:r>
-          </a:p>
-        </p:txBody>
-      </p:sp>
-      <p:sp>
-        <p:nvSpPr>
-          <p:cNvPr id="8" name="Textfeld 7">
-            <a:extLst>
-              <a:ext uri="{FF2B5EF4-FFF2-40B4-BE49-F238E27FC236}">
-                <a16:creationId xmlns:a16="http://schemas.microsoft.com/office/drawing/2014/main" id="{5ED38475-75D3-7859-4982-A8443EAD950A}"/>
+              <a:rPr lang="de-DE"/>
+              <a:t>Targets</a:t>
+            </a:r>
+          </a:p>
+        </p:txBody>
+      </p:sp>
+      <p:sp>
+        <p:nvSpPr>
+          <p:cNvPr id="12" name="Textfeld 11">
+            <a:extLst>
+              <a:ext uri="{FF2B5EF4-FFF2-40B4-BE49-F238E27FC236}">
+                <a16:creationId xmlns:a16="http://schemas.microsoft.com/office/drawing/2014/main" id="{10A65E60-8D34-9E58-05E5-F3BD887B2B84}"/>
               </a:ext>
             </a:extLst>
           </p:cNvPr>
@@ -5921,20 +6569,13 @@
         </p:nvSpPr>
         <p:spPr>
           <a:xfrm>
-            <a:off x="5316622" y="4266054"/>
-            <a:ext cx="295234" cy="338554"/>
+            <a:off x="6179798" y="4227288"/>
+            <a:ext cx="2161812" cy="369332"/>
           </a:xfrm>
           <a:prstGeom prst="rect">
             <a:avLst/>
           </a:prstGeom>
-          <a:solidFill>
-            <a:schemeClr val="bg1">
-              <a:lumMod val="75000"/>
-            </a:schemeClr>
-          </a:solidFill>
-          <a:ln>
-            <a:noFill/>
-          </a:ln>
+          <a:noFill/>
         </p:spPr>
         <p:txBody>
           <a:bodyPr wrap="square" rtlCol="0">
@@ -5943,21 +6584,18 @@
           <a:lstStyle/>
           <a:p>
             <a:r>
-              <a:rPr lang="de-DE" sz="1600" b="1">
-                <a:latin typeface="Arial" panose="020B0604020202020204" pitchFamily="34" charset="0"/>
-                <a:cs typeface="Arial" panose="020B0604020202020204" pitchFamily="34" charset="0"/>
-              </a:rPr>
-              <a:t>E</a:t>
-            </a:r>
-          </a:p>
-        </p:txBody>
-      </p:sp>
-      <p:sp>
-        <p:nvSpPr>
-          <p:cNvPr id="9" name="Textfeld 8">
-            <a:extLst>
-              <a:ext uri="{FF2B5EF4-FFF2-40B4-BE49-F238E27FC236}">
-                <a16:creationId xmlns:a16="http://schemas.microsoft.com/office/drawing/2014/main" id="{4348FDF3-1A08-65CC-E590-F25704D00823}"/>
+              <a:rPr lang="de-DE"/>
+              <a:t>Input Features</a:t>
+            </a:r>
+          </a:p>
+        </p:txBody>
+      </p:sp>
+      <p:sp>
+        <p:nvSpPr>
+          <p:cNvPr id="13" name="Textfeld 12">
+            <a:extLst>
+              <a:ext uri="{FF2B5EF4-FFF2-40B4-BE49-F238E27FC236}">
+                <a16:creationId xmlns:a16="http://schemas.microsoft.com/office/drawing/2014/main" id="{ADD40B8C-E0EC-1B7B-435B-53EC7EDFCDAD}"/>
               </a:ext>
             </a:extLst>
           </p:cNvPr>
@@ -5965,21 +6603,14 @@
           <p:nvPr/>
         </p:nvSpPr>
         <p:spPr>
-          <a:xfrm>
-            <a:off x="9352763" y="567869"/>
-            <a:ext cx="295234" cy="338554"/>
+          <a:xfrm rot="16200000">
+            <a:off x="10325561" y="2455843"/>
+            <a:ext cx="1280010" cy="584775"/>
           </a:xfrm>
           <a:prstGeom prst="rect">
             <a:avLst/>
           </a:prstGeom>
-          <a:solidFill>
-            <a:schemeClr val="bg1">
-              <a:lumMod val="75000"/>
-            </a:schemeClr>
-          </a:solidFill>
-          <a:ln>
-            <a:noFill/>
-          </a:ln>
+          <a:noFill/>
         </p:spPr>
         <p:txBody>
           <a:bodyPr wrap="square" rtlCol="0">
@@ -5987,102 +6618,10 @@
           </a:bodyPr>
           <a:lstStyle/>
           <a:p>
-            <a:r>
-              <a:rPr lang="de-DE" sz="1600" b="1">
-                <a:latin typeface="Arial" panose="020B0604020202020204" pitchFamily="34" charset="0"/>
-                <a:cs typeface="Arial" panose="020B0604020202020204" pitchFamily="34" charset="0"/>
-              </a:rPr>
-              <a:t>B</a:t>
-            </a:r>
-          </a:p>
-        </p:txBody>
-      </p:sp>
-      <p:sp>
-        <p:nvSpPr>
-          <p:cNvPr id="10" name="Textfeld 9">
-            <a:extLst>
-              <a:ext uri="{FF2B5EF4-FFF2-40B4-BE49-F238E27FC236}">
-                <a16:creationId xmlns:a16="http://schemas.microsoft.com/office/drawing/2014/main" id="{648FB14A-DF52-0A00-58EA-69ADBEFEDC0B}"/>
-              </a:ext>
-            </a:extLst>
-          </p:cNvPr>
-          <p:cNvSpPr txBox="1"/>
-          <p:nvPr/>
-        </p:nvSpPr>
-        <p:spPr>
-          <a:xfrm>
-            <a:off x="9342931" y="2404680"/>
-            <a:ext cx="295234" cy="338554"/>
-          </a:xfrm>
-          <a:prstGeom prst="rect">
-            <a:avLst/>
-          </a:prstGeom>
-          <a:solidFill>
-            <a:schemeClr val="bg1">
-              <a:lumMod val="75000"/>
-            </a:schemeClr>
-          </a:solidFill>
-          <a:ln>
-            <a:noFill/>
-          </a:ln>
-        </p:spPr>
-        <p:txBody>
-          <a:bodyPr wrap="square" rtlCol="0">
-            <a:spAutoFit/>
-          </a:bodyPr>
-          <a:lstStyle/>
-          <a:p>
-            <a:r>
-              <a:rPr lang="de-DE" sz="1600" b="1">
-                <a:latin typeface="Arial" panose="020B0604020202020204" pitchFamily="34" charset="0"/>
-                <a:cs typeface="Arial" panose="020B0604020202020204" pitchFamily="34" charset="0"/>
-              </a:rPr>
-              <a:t>D</a:t>
-            </a:r>
-          </a:p>
-        </p:txBody>
-      </p:sp>
-      <p:sp>
-        <p:nvSpPr>
-          <p:cNvPr id="14" name="Textfeld 13">
-            <a:extLst>
-              <a:ext uri="{FF2B5EF4-FFF2-40B4-BE49-F238E27FC236}">
-                <a16:creationId xmlns:a16="http://schemas.microsoft.com/office/drawing/2014/main" id="{55881114-08E5-ECB3-E7FD-47D157F3DBA4}"/>
-              </a:ext>
-            </a:extLst>
-          </p:cNvPr>
-          <p:cNvSpPr txBox="1"/>
-          <p:nvPr/>
-        </p:nvSpPr>
-        <p:spPr>
-          <a:xfrm>
-            <a:off x="9342931" y="4270987"/>
-            <a:ext cx="295234" cy="338554"/>
-          </a:xfrm>
-          <a:prstGeom prst="rect">
-            <a:avLst/>
-          </a:prstGeom>
-          <a:solidFill>
-            <a:schemeClr val="bg1">
-              <a:lumMod val="75000"/>
-            </a:schemeClr>
-          </a:solidFill>
-          <a:ln>
-            <a:noFill/>
-          </a:ln>
-        </p:spPr>
-        <p:txBody>
-          <a:bodyPr wrap="square" rtlCol="0">
-            <a:spAutoFit/>
-          </a:bodyPr>
-          <a:lstStyle/>
-          <a:p>
-            <a:r>
-              <a:rPr lang="de-DE" sz="1600" b="1">
-                <a:latin typeface="Arial" panose="020B0604020202020204" pitchFamily="34" charset="0"/>
-                <a:cs typeface="Arial" panose="020B0604020202020204" pitchFamily="34" charset="0"/>
-              </a:rPr>
-              <a:t>F</a:t>
+            <a:pPr algn="ctr"/>
+            <a:r>
+              <a:rPr lang="de-DE" sz="1600"/>
+              <a:t>Correlation Coefficient</a:t>
             </a:r>
           </a:p>
         </p:txBody>
@@ -6090,7 +6629,7 @@
     </p:spTree>
     <p:extLst>
       <p:ext uri="{BB962C8B-B14F-4D97-AF65-F5344CB8AC3E}">
-        <p14:creationId xmlns:p14="http://schemas.microsoft.com/office/powerpoint/2010/main" val="2201591049"/>
+        <p14:creationId xmlns:p14="http://schemas.microsoft.com/office/powerpoint/2010/main" val="2040277198"/>
       </p:ext>
     </p:extLst>
   </p:cSld>
@@ -6326,15 +6865,15 @@
         </p:nvSpPr>
         <p:spPr>
           <a:xfrm>
-            <a:off x="8291279" y="565003"/>
-            <a:ext cx="1346886" cy="307777"/>
+            <a:off x="9352763" y="567869"/>
+            <a:ext cx="295234" cy="338554"/>
           </a:xfrm>
           <a:prstGeom prst="rect">
             <a:avLst/>
           </a:prstGeom>
           <a:solidFill>
             <a:schemeClr val="bg1">
-              <a:lumMod val="85000"/>
+              <a:lumMod val="75000"/>
             </a:schemeClr>
           </a:solidFill>
           <a:ln>
@@ -6347,23 +6886,22 @@
           </a:bodyPr>
           <a:lstStyle/>
           <a:p>
-            <a:pPr algn="r"/>
-            <a:r>
-              <a:rPr lang="de-DE" sz="1400">
+            <a:r>
+              <a:rPr lang="de-DE" sz="1600" b="1">
                 <a:latin typeface="Arial" panose="020B0604020202020204" pitchFamily="34" charset="0"/>
                 <a:cs typeface="Arial" panose="020B0604020202020204" pitchFamily="34" charset="0"/>
               </a:rPr>
-              <a:t>current phase</a:t>
-            </a:r>
-          </a:p>
-        </p:txBody>
-      </p:sp>
-      <p:sp>
-        <p:nvSpPr>
-          <p:cNvPr id="4" name="Textfeld 3">
-            <a:extLst>
-              <a:ext uri="{FF2B5EF4-FFF2-40B4-BE49-F238E27FC236}">
-                <a16:creationId xmlns:a16="http://schemas.microsoft.com/office/drawing/2014/main" id="{AD11839F-9FBD-2811-225A-66B10D8C04E8}"/>
+              <a:t>B</a:t>
+            </a:r>
+          </a:p>
+        </p:txBody>
+      </p:sp>
+      <p:sp>
+        <p:nvSpPr>
+          <p:cNvPr id="10" name="Textfeld 9">
+            <a:extLst>
+              <a:ext uri="{FF2B5EF4-FFF2-40B4-BE49-F238E27FC236}">
+                <a16:creationId xmlns:a16="http://schemas.microsoft.com/office/drawing/2014/main" id="{648FB14A-DF52-0A00-58EA-69ADBEFEDC0B}"/>
               </a:ext>
             </a:extLst>
           </p:cNvPr>
@@ -6372,15 +6910,15 @@
         </p:nvSpPr>
         <p:spPr>
           <a:xfrm>
-            <a:off x="7512909" y="4259875"/>
-            <a:ext cx="2112900" cy="307777"/>
+            <a:off x="9342931" y="2404680"/>
+            <a:ext cx="295234" cy="338554"/>
           </a:xfrm>
           <a:prstGeom prst="rect">
             <a:avLst/>
           </a:prstGeom>
           <a:solidFill>
             <a:schemeClr val="bg1">
-              <a:lumMod val="85000"/>
+              <a:lumMod val="75000"/>
             </a:schemeClr>
           </a:solidFill>
           <a:ln>
@@ -6393,23 +6931,22 @@
           </a:bodyPr>
           <a:lstStyle/>
           <a:p>
-            <a:pPr algn="r"/>
-            <a:r>
-              <a:rPr lang="de-DE" sz="1400">
+            <a:r>
+              <a:rPr lang="de-DE" sz="1600" b="1">
                 <a:latin typeface="Arial" panose="020B0604020202020204" pitchFamily="34" charset="0"/>
                 <a:cs typeface="Arial" panose="020B0604020202020204" pitchFamily="34" charset="0"/>
               </a:rPr>
-              <a:t>6 months into the future</a:t>
-            </a:r>
-          </a:p>
-        </p:txBody>
-      </p:sp>
-      <p:sp>
-        <p:nvSpPr>
-          <p:cNvPr id="5" name="Textfeld 4">
-            <a:extLst>
-              <a:ext uri="{FF2B5EF4-FFF2-40B4-BE49-F238E27FC236}">
-                <a16:creationId xmlns:a16="http://schemas.microsoft.com/office/drawing/2014/main" id="{D3ED66BC-1506-D292-1F7D-6653E36C647D}"/>
+              <a:t>D</a:t>
+            </a:r>
+          </a:p>
+        </p:txBody>
+      </p:sp>
+      <p:sp>
+        <p:nvSpPr>
+          <p:cNvPr id="14" name="Textfeld 13">
+            <a:extLst>
+              <a:ext uri="{FF2B5EF4-FFF2-40B4-BE49-F238E27FC236}">
+                <a16:creationId xmlns:a16="http://schemas.microsoft.com/office/drawing/2014/main" id="{55881114-08E5-ECB3-E7FD-47D157F3DBA4}"/>
               </a:ext>
             </a:extLst>
           </p:cNvPr>
@@ -6418,15 +6955,15 @@
         </p:nvSpPr>
         <p:spPr>
           <a:xfrm>
-            <a:off x="7512908" y="2409579"/>
-            <a:ext cx="2125257" cy="307777"/>
+            <a:off x="9342931" y="4270987"/>
+            <a:ext cx="295234" cy="338554"/>
           </a:xfrm>
           <a:prstGeom prst="rect">
             <a:avLst/>
           </a:prstGeom>
           <a:solidFill>
             <a:schemeClr val="bg1">
-              <a:lumMod val="85000"/>
+              <a:lumMod val="75000"/>
             </a:schemeClr>
           </a:solidFill>
           <a:ln>
@@ -6439,13 +6976,12 @@
           </a:bodyPr>
           <a:lstStyle/>
           <a:p>
-            <a:pPr algn="r"/>
-            <a:r>
-              <a:rPr lang="de-DE" sz="1400">
+            <a:r>
+              <a:rPr lang="de-DE" sz="1600" b="1">
                 <a:latin typeface="Arial" panose="020B0604020202020204" pitchFamily="34" charset="0"/>
                 <a:cs typeface="Arial" panose="020B0604020202020204" pitchFamily="34" charset="0"/>
               </a:rPr>
-              <a:t>3 months into the future</a:t>
+              <a:t>F</a:t>
             </a:r>
           </a:p>
         </p:txBody>
@@ -6453,7 +6989,7 @@
     </p:spTree>
     <p:extLst>
       <p:ext uri="{BB962C8B-B14F-4D97-AF65-F5344CB8AC3E}">
-        <p14:creationId xmlns:p14="http://schemas.microsoft.com/office/powerpoint/2010/main" val="2555539366"/>
+        <p14:creationId xmlns:p14="http://schemas.microsoft.com/office/powerpoint/2010/main" val="2201591049"/>
       </p:ext>
     </p:extLst>
   </p:cSld>
@@ -6482,57 +7018,70 @@
       </p:grpSpPr>
       <p:pic>
         <p:nvPicPr>
-          <p:cNvPr id="1028" name="Picture 4">
-            <a:extLst>
-              <a:ext uri="{FF2B5EF4-FFF2-40B4-BE49-F238E27FC236}">
-                <a16:creationId xmlns:a16="http://schemas.microsoft.com/office/drawing/2014/main" id="{F0CBFD18-436B-16E8-66AD-612BCB473E7B}"/>
+          <p:cNvPr id="2" name="Grafik 1">
+            <a:extLst>
+              <a:ext uri="{FF2B5EF4-FFF2-40B4-BE49-F238E27FC236}">
+                <a16:creationId xmlns:a16="http://schemas.microsoft.com/office/drawing/2014/main" id="{9768EA39-627B-C584-A24D-E6D1A5B4D95B}"/>
               </a:ext>
             </a:extLst>
           </p:cNvPr>
           <p:cNvPicPr>
-            <a:picLocks noChangeAspect="1" noChangeArrowheads="1"/>
+            <a:picLocks noChangeAspect="1"/>
           </p:cNvPicPr>
           <p:nvPr/>
         </p:nvPicPr>
         <p:blipFill>
-          <a:blip r:embed="rId3">
-            <a:extLst>
-              <a:ext uri="{28A0092B-C50C-407E-A947-70E740481C1C}">
-                <a14:useLocalDpi xmlns:a14="http://schemas.microsoft.com/office/drawing/2010/main" val="0"/>
-              </a:ext>
-            </a:extLst>
-          </a:blip>
-          <a:srcRect/>
+          <a:blip r:embed="rId3"/>
           <a:stretch>
             <a:fillRect/>
           </a:stretch>
         </p:blipFill>
-        <p:spPr bwMode="auto">
-          <a:xfrm>
-            <a:off x="2961217" y="939800"/>
-            <a:ext cx="5067300" cy="4978400"/>
+        <p:spPr>
+          <a:xfrm>
+            <a:off x="1920433" y="368782"/>
+            <a:ext cx="7772400" cy="1907249"/>
           </a:xfrm>
           <a:prstGeom prst="rect">
             <a:avLst/>
           </a:prstGeom>
-          <a:noFill/>
-          <a:extLst>
-            <a:ext uri="{909E8E84-426E-40DD-AFC4-6F175D3DCCD1}">
-              <a14:hiddenFill xmlns:a14="http://schemas.microsoft.com/office/drawing/2010/main">
-                <a:solidFill>
-                  <a:srgbClr val="FFFFFF"/>
-                </a:solidFill>
-              </a14:hiddenFill>
-            </a:ext>
-          </a:extLst>
         </p:spPr>
       </p:pic>
-      <p:sp>
-        <p:nvSpPr>
-          <p:cNvPr id="2" name="Textfeld 1">
-            <a:extLst>
-              <a:ext uri="{FF2B5EF4-FFF2-40B4-BE49-F238E27FC236}">
-                <a16:creationId xmlns:a16="http://schemas.microsoft.com/office/drawing/2014/main" id="{C8CACCBA-630B-624E-8108-6AB3F85F1553}"/>
+      <p:pic>
+        <p:nvPicPr>
+          <p:cNvPr id="3" name="Grafik 2">
+            <a:extLst>
+              <a:ext uri="{FF2B5EF4-FFF2-40B4-BE49-F238E27FC236}">
+                <a16:creationId xmlns:a16="http://schemas.microsoft.com/office/drawing/2014/main" id="{ECE26964-11E3-91D4-9480-6EB9044F4DDB}"/>
+              </a:ext>
+            </a:extLst>
+          </p:cNvPr>
+          <p:cNvPicPr>
+            <a:picLocks noChangeAspect="1"/>
+          </p:cNvPicPr>
+          <p:nvPr/>
+        </p:nvPicPr>
+        <p:blipFill>
+          <a:blip r:embed="rId4"/>
+          <a:stretch>
+            <a:fillRect/>
+          </a:stretch>
+        </p:blipFill>
+        <p:spPr>
+          <a:xfrm>
+            <a:off x="1920433" y="2375819"/>
+            <a:ext cx="7772400" cy="3749968"/>
+          </a:xfrm>
+          <a:prstGeom prst="rect">
+            <a:avLst/>
+          </a:prstGeom>
+        </p:spPr>
+      </p:pic>
+      <p:sp>
+        <p:nvSpPr>
+          <p:cNvPr id="6" name="Textfeld 5">
+            <a:extLst>
+              <a:ext uri="{FF2B5EF4-FFF2-40B4-BE49-F238E27FC236}">
+                <a16:creationId xmlns:a16="http://schemas.microsoft.com/office/drawing/2014/main" id="{BD99F089-52D4-5901-CBE0-D593D0D09E69}"/>
               </a:ext>
             </a:extLst>
           </p:cNvPr>
@@ -6541,7 +7090,277 @@
         </p:nvSpPr>
         <p:spPr>
           <a:xfrm>
-            <a:off x="6470946" y="1250803"/>
+            <a:off x="5336286" y="572768"/>
+            <a:ext cx="295234" cy="338554"/>
+          </a:xfrm>
+          <a:prstGeom prst="rect">
+            <a:avLst/>
+          </a:prstGeom>
+          <a:solidFill>
+            <a:schemeClr val="bg1">
+              <a:lumMod val="75000"/>
+            </a:schemeClr>
+          </a:solidFill>
+          <a:ln>
+            <a:noFill/>
+          </a:ln>
+        </p:spPr>
+        <p:txBody>
+          <a:bodyPr wrap="square" rtlCol="0">
+            <a:spAutoFit/>
+          </a:bodyPr>
+          <a:lstStyle/>
+          <a:p>
+            <a:r>
+              <a:rPr lang="de-DE" sz="1600" b="1">
+                <a:latin typeface="Arial" panose="020B0604020202020204" pitchFamily="34" charset="0"/>
+                <a:cs typeface="Arial" panose="020B0604020202020204" pitchFamily="34" charset="0"/>
+              </a:rPr>
+              <a:t>A</a:t>
+            </a:r>
+          </a:p>
+        </p:txBody>
+      </p:sp>
+      <p:sp>
+        <p:nvSpPr>
+          <p:cNvPr id="7" name="Textfeld 6">
+            <a:extLst>
+              <a:ext uri="{FF2B5EF4-FFF2-40B4-BE49-F238E27FC236}">
+                <a16:creationId xmlns:a16="http://schemas.microsoft.com/office/drawing/2014/main" id="{0857B115-7DD7-115E-E2DE-85BCB71B157F}"/>
+              </a:ext>
+            </a:extLst>
+          </p:cNvPr>
+          <p:cNvSpPr txBox="1"/>
+          <p:nvPr/>
+        </p:nvSpPr>
+        <p:spPr>
+          <a:xfrm>
+            <a:off x="5316622" y="2409579"/>
+            <a:ext cx="295234" cy="338554"/>
+          </a:xfrm>
+          <a:prstGeom prst="rect">
+            <a:avLst/>
+          </a:prstGeom>
+          <a:solidFill>
+            <a:schemeClr val="bg1">
+              <a:lumMod val="75000"/>
+            </a:schemeClr>
+          </a:solidFill>
+          <a:ln>
+            <a:noFill/>
+          </a:ln>
+        </p:spPr>
+        <p:txBody>
+          <a:bodyPr wrap="square" rtlCol="0">
+            <a:spAutoFit/>
+          </a:bodyPr>
+          <a:lstStyle/>
+          <a:p>
+            <a:r>
+              <a:rPr lang="de-DE" sz="1600" b="1">
+                <a:latin typeface="Arial" panose="020B0604020202020204" pitchFamily="34" charset="0"/>
+                <a:cs typeface="Arial" panose="020B0604020202020204" pitchFamily="34" charset="0"/>
+              </a:rPr>
+              <a:t>C</a:t>
+            </a:r>
+          </a:p>
+        </p:txBody>
+      </p:sp>
+      <p:sp>
+        <p:nvSpPr>
+          <p:cNvPr id="8" name="Textfeld 7">
+            <a:extLst>
+              <a:ext uri="{FF2B5EF4-FFF2-40B4-BE49-F238E27FC236}">
+                <a16:creationId xmlns:a16="http://schemas.microsoft.com/office/drawing/2014/main" id="{5ED38475-75D3-7859-4982-A8443EAD950A}"/>
+              </a:ext>
+            </a:extLst>
+          </p:cNvPr>
+          <p:cNvSpPr txBox="1"/>
+          <p:nvPr/>
+        </p:nvSpPr>
+        <p:spPr>
+          <a:xfrm>
+            <a:off x="5316622" y="4266054"/>
+            <a:ext cx="295234" cy="338554"/>
+          </a:xfrm>
+          <a:prstGeom prst="rect">
+            <a:avLst/>
+          </a:prstGeom>
+          <a:solidFill>
+            <a:schemeClr val="bg1">
+              <a:lumMod val="75000"/>
+            </a:schemeClr>
+          </a:solidFill>
+          <a:ln>
+            <a:noFill/>
+          </a:ln>
+        </p:spPr>
+        <p:txBody>
+          <a:bodyPr wrap="square" rtlCol="0">
+            <a:spAutoFit/>
+          </a:bodyPr>
+          <a:lstStyle/>
+          <a:p>
+            <a:r>
+              <a:rPr lang="de-DE" sz="1600" b="1">
+                <a:latin typeface="Arial" panose="020B0604020202020204" pitchFamily="34" charset="0"/>
+                <a:cs typeface="Arial" panose="020B0604020202020204" pitchFamily="34" charset="0"/>
+              </a:rPr>
+              <a:t>E</a:t>
+            </a:r>
+          </a:p>
+        </p:txBody>
+      </p:sp>
+      <p:sp>
+        <p:nvSpPr>
+          <p:cNvPr id="9" name="Textfeld 8">
+            <a:extLst>
+              <a:ext uri="{FF2B5EF4-FFF2-40B4-BE49-F238E27FC236}">
+                <a16:creationId xmlns:a16="http://schemas.microsoft.com/office/drawing/2014/main" id="{4348FDF3-1A08-65CC-E590-F25704D00823}"/>
+              </a:ext>
+            </a:extLst>
+          </p:cNvPr>
+          <p:cNvSpPr txBox="1"/>
+          <p:nvPr/>
+        </p:nvSpPr>
+        <p:spPr>
+          <a:xfrm>
+            <a:off x="9352763" y="567869"/>
+            <a:ext cx="295234" cy="338554"/>
+          </a:xfrm>
+          <a:prstGeom prst="rect">
+            <a:avLst/>
+          </a:prstGeom>
+          <a:solidFill>
+            <a:schemeClr val="bg1">
+              <a:lumMod val="75000"/>
+            </a:schemeClr>
+          </a:solidFill>
+          <a:ln>
+            <a:noFill/>
+          </a:ln>
+        </p:spPr>
+        <p:txBody>
+          <a:bodyPr wrap="square" rtlCol="0">
+            <a:spAutoFit/>
+          </a:bodyPr>
+          <a:lstStyle/>
+          <a:p>
+            <a:r>
+              <a:rPr lang="de-DE" sz="1600" b="1">
+                <a:latin typeface="Arial" panose="020B0604020202020204" pitchFamily="34" charset="0"/>
+                <a:cs typeface="Arial" panose="020B0604020202020204" pitchFamily="34" charset="0"/>
+              </a:rPr>
+              <a:t>B</a:t>
+            </a:r>
+          </a:p>
+        </p:txBody>
+      </p:sp>
+      <p:sp>
+        <p:nvSpPr>
+          <p:cNvPr id="10" name="Textfeld 9">
+            <a:extLst>
+              <a:ext uri="{FF2B5EF4-FFF2-40B4-BE49-F238E27FC236}">
+                <a16:creationId xmlns:a16="http://schemas.microsoft.com/office/drawing/2014/main" id="{648FB14A-DF52-0A00-58EA-69ADBEFEDC0B}"/>
+              </a:ext>
+            </a:extLst>
+          </p:cNvPr>
+          <p:cNvSpPr txBox="1"/>
+          <p:nvPr/>
+        </p:nvSpPr>
+        <p:spPr>
+          <a:xfrm>
+            <a:off x="9342931" y="2404680"/>
+            <a:ext cx="295234" cy="338554"/>
+          </a:xfrm>
+          <a:prstGeom prst="rect">
+            <a:avLst/>
+          </a:prstGeom>
+          <a:solidFill>
+            <a:schemeClr val="bg1">
+              <a:lumMod val="75000"/>
+            </a:schemeClr>
+          </a:solidFill>
+          <a:ln>
+            <a:noFill/>
+          </a:ln>
+        </p:spPr>
+        <p:txBody>
+          <a:bodyPr wrap="square" rtlCol="0">
+            <a:spAutoFit/>
+          </a:bodyPr>
+          <a:lstStyle/>
+          <a:p>
+            <a:r>
+              <a:rPr lang="de-DE" sz="1600" b="1">
+                <a:latin typeface="Arial" panose="020B0604020202020204" pitchFamily="34" charset="0"/>
+                <a:cs typeface="Arial" panose="020B0604020202020204" pitchFamily="34" charset="0"/>
+              </a:rPr>
+              <a:t>D</a:t>
+            </a:r>
+          </a:p>
+        </p:txBody>
+      </p:sp>
+      <p:sp>
+        <p:nvSpPr>
+          <p:cNvPr id="14" name="Textfeld 13">
+            <a:extLst>
+              <a:ext uri="{FF2B5EF4-FFF2-40B4-BE49-F238E27FC236}">
+                <a16:creationId xmlns:a16="http://schemas.microsoft.com/office/drawing/2014/main" id="{55881114-08E5-ECB3-E7FD-47D157F3DBA4}"/>
+              </a:ext>
+            </a:extLst>
+          </p:cNvPr>
+          <p:cNvSpPr txBox="1"/>
+          <p:nvPr/>
+        </p:nvSpPr>
+        <p:spPr>
+          <a:xfrm>
+            <a:off x="9342931" y="4270987"/>
+            <a:ext cx="295234" cy="338554"/>
+          </a:xfrm>
+          <a:prstGeom prst="rect">
+            <a:avLst/>
+          </a:prstGeom>
+          <a:solidFill>
+            <a:schemeClr val="bg1">
+              <a:lumMod val="75000"/>
+            </a:schemeClr>
+          </a:solidFill>
+          <a:ln>
+            <a:noFill/>
+          </a:ln>
+        </p:spPr>
+        <p:txBody>
+          <a:bodyPr wrap="square" rtlCol="0">
+            <a:spAutoFit/>
+          </a:bodyPr>
+          <a:lstStyle/>
+          <a:p>
+            <a:r>
+              <a:rPr lang="de-DE" sz="1600" b="1">
+                <a:latin typeface="Arial" panose="020B0604020202020204" pitchFamily="34" charset="0"/>
+                <a:cs typeface="Arial" panose="020B0604020202020204" pitchFamily="34" charset="0"/>
+              </a:rPr>
+              <a:t>F</a:t>
+            </a:r>
+          </a:p>
+        </p:txBody>
+      </p:sp>
+      <p:sp>
+        <p:nvSpPr>
+          <p:cNvPr id="4" name="Textfeld 3">
+            <a:extLst>
+              <a:ext uri="{FF2B5EF4-FFF2-40B4-BE49-F238E27FC236}">
+                <a16:creationId xmlns:a16="http://schemas.microsoft.com/office/drawing/2014/main" id="{7BABB555-13DC-A8D2-AAAD-5B373E565114}"/>
+              </a:ext>
+            </a:extLst>
+          </p:cNvPr>
+          <p:cNvSpPr txBox="1"/>
+          <p:nvPr/>
+        </p:nvSpPr>
+        <p:spPr>
+          <a:xfrm>
+            <a:off x="2281474" y="578324"/>
             <a:ext cx="1346886" cy="307777"/>
           </a:xfrm>
           <a:prstGeom prst="rect">
@@ -6575,10 +7394,10 @@
       </p:sp>
       <p:sp>
         <p:nvSpPr>
-          <p:cNvPr id="3" name="Textfeld 2">
-            <a:extLst>
-              <a:ext uri="{FF2B5EF4-FFF2-40B4-BE49-F238E27FC236}">
-                <a16:creationId xmlns:a16="http://schemas.microsoft.com/office/drawing/2014/main" id="{761261D5-8606-C19A-C88C-C1A6786E4EAC}"/>
+          <p:cNvPr id="11" name="Textfeld 10">
+            <a:extLst>
+              <a:ext uri="{FF2B5EF4-FFF2-40B4-BE49-F238E27FC236}">
+                <a16:creationId xmlns:a16="http://schemas.microsoft.com/office/drawing/2014/main" id="{D584AB8B-F3C4-F936-656A-E30EDAC6609B}"/>
               </a:ext>
             </a:extLst>
           </p:cNvPr>
@@ -6587,8 +7406,8 @@
         </p:nvSpPr>
         <p:spPr>
           <a:xfrm>
-            <a:off x="5704932" y="3514808"/>
-            <a:ext cx="2112900" cy="307777"/>
+            <a:off x="2278261" y="2422864"/>
+            <a:ext cx="1716141" cy="307777"/>
           </a:xfrm>
           <a:prstGeom prst="rect">
             <a:avLst/>
@@ -6614,7 +7433,191 @@
                 <a:latin typeface="Arial" panose="020B0604020202020204" pitchFamily="34" charset="0"/>
                 <a:cs typeface="Arial" panose="020B0604020202020204" pitchFamily="34" charset="0"/>
               </a:rPr>
-              <a:t>6 months into the future</a:t>
+              <a:t>lead time 3 months</a:t>
+            </a:r>
+          </a:p>
+        </p:txBody>
+      </p:sp>
+      <p:sp>
+        <p:nvSpPr>
+          <p:cNvPr id="12" name="Textfeld 11">
+            <a:extLst>
+              <a:ext uri="{FF2B5EF4-FFF2-40B4-BE49-F238E27FC236}">
+                <a16:creationId xmlns:a16="http://schemas.microsoft.com/office/drawing/2014/main" id="{74DBD418-B92A-6436-C469-272324162816}"/>
+              </a:ext>
+            </a:extLst>
+          </p:cNvPr>
+          <p:cNvSpPr txBox="1"/>
+          <p:nvPr/>
+        </p:nvSpPr>
+        <p:spPr>
+          <a:xfrm>
+            <a:off x="2278260" y="4281224"/>
+            <a:ext cx="1716141" cy="307777"/>
+          </a:xfrm>
+          <a:prstGeom prst="rect">
+            <a:avLst/>
+          </a:prstGeom>
+          <a:solidFill>
+            <a:schemeClr val="bg1">
+              <a:lumMod val="85000"/>
+            </a:schemeClr>
+          </a:solidFill>
+          <a:ln>
+            <a:noFill/>
+          </a:ln>
+        </p:spPr>
+        <p:txBody>
+          <a:bodyPr wrap="square" rtlCol="0">
+            <a:spAutoFit/>
+          </a:bodyPr>
+          <a:lstStyle/>
+          <a:p>
+            <a:pPr algn="r"/>
+            <a:r>
+              <a:rPr lang="de-DE" sz="1400">
+                <a:latin typeface="Arial" panose="020B0604020202020204" pitchFamily="34" charset="0"/>
+                <a:cs typeface="Arial" panose="020B0604020202020204" pitchFamily="34" charset="0"/>
+              </a:rPr>
+              <a:t>lead time 6 months</a:t>
+            </a:r>
+          </a:p>
+        </p:txBody>
+      </p:sp>
+      <p:sp>
+        <p:nvSpPr>
+          <p:cNvPr id="13" name="Textfeld 12">
+            <a:extLst>
+              <a:ext uri="{FF2B5EF4-FFF2-40B4-BE49-F238E27FC236}">
+                <a16:creationId xmlns:a16="http://schemas.microsoft.com/office/drawing/2014/main" id="{934B77CD-FB80-4A47-6BA5-743B89D43C8D}"/>
+              </a:ext>
+            </a:extLst>
+          </p:cNvPr>
+          <p:cNvSpPr txBox="1"/>
+          <p:nvPr/>
+        </p:nvSpPr>
+        <p:spPr>
+          <a:xfrm>
+            <a:off x="6301786" y="578324"/>
+            <a:ext cx="1346886" cy="307777"/>
+          </a:xfrm>
+          <a:prstGeom prst="rect">
+            <a:avLst/>
+          </a:prstGeom>
+          <a:solidFill>
+            <a:schemeClr val="bg1">
+              <a:lumMod val="85000"/>
+            </a:schemeClr>
+          </a:solidFill>
+          <a:ln>
+            <a:noFill/>
+          </a:ln>
+        </p:spPr>
+        <p:txBody>
+          <a:bodyPr wrap="square" rtlCol="0">
+            <a:spAutoFit/>
+          </a:bodyPr>
+          <a:lstStyle/>
+          <a:p>
+            <a:pPr algn="r"/>
+            <a:r>
+              <a:rPr lang="de-DE" sz="1400">
+                <a:latin typeface="Arial" panose="020B0604020202020204" pitchFamily="34" charset="0"/>
+                <a:cs typeface="Arial" panose="020B0604020202020204" pitchFamily="34" charset="0"/>
+              </a:rPr>
+              <a:t>current phase</a:t>
+            </a:r>
+          </a:p>
+        </p:txBody>
+      </p:sp>
+      <p:sp>
+        <p:nvSpPr>
+          <p:cNvPr id="15" name="Textfeld 14">
+            <a:extLst>
+              <a:ext uri="{FF2B5EF4-FFF2-40B4-BE49-F238E27FC236}">
+                <a16:creationId xmlns:a16="http://schemas.microsoft.com/office/drawing/2014/main" id="{E8B0ABDA-7341-340F-D3B3-3298DDB666F8}"/>
+              </a:ext>
+            </a:extLst>
+          </p:cNvPr>
+          <p:cNvSpPr txBox="1"/>
+          <p:nvPr/>
+        </p:nvSpPr>
+        <p:spPr>
+          <a:xfrm>
+            <a:off x="6289429" y="2422864"/>
+            <a:ext cx="1716141" cy="307777"/>
+          </a:xfrm>
+          <a:prstGeom prst="rect">
+            <a:avLst/>
+          </a:prstGeom>
+          <a:solidFill>
+            <a:schemeClr val="bg1">
+              <a:lumMod val="85000"/>
+            </a:schemeClr>
+          </a:solidFill>
+          <a:ln>
+            <a:noFill/>
+          </a:ln>
+        </p:spPr>
+        <p:txBody>
+          <a:bodyPr wrap="square" rtlCol="0">
+            <a:spAutoFit/>
+          </a:bodyPr>
+          <a:lstStyle/>
+          <a:p>
+            <a:pPr algn="r"/>
+            <a:r>
+              <a:rPr lang="de-DE" sz="1400">
+                <a:latin typeface="Arial" panose="020B0604020202020204" pitchFamily="34" charset="0"/>
+                <a:cs typeface="Arial" panose="020B0604020202020204" pitchFamily="34" charset="0"/>
+              </a:rPr>
+              <a:t>lead time 3 months</a:t>
+            </a:r>
+          </a:p>
+        </p:txBody>
+      </p:sp>
+      <p:sp>
+        <p:nvSpPr>
+          <p:cNvPr id="16" name="Textfeld 15">
+            <a:extLst>
+              <a:ext uri="{FF2B5EF4-FFF2-40B4-BE49-F238E27FC236}">
+                <a16:creationId xmlns:a16="http://schemas.microsoft.com/office/drawing/2014/main" id="{3FACF2E9-9CC6-55E8-89DC-8B946404D0DA}"/>
+              </a:ext>
+            </a:extLst>
+          </p:cNvPr>
+          <p:cNvSpPr txBox="1"/>
+          <p:nvPr/>
+        </p:nvSpPr>
+        <p:spPr>
+          <a:xfrm>
+            <a:off x="6289428" y="4281224"/>
+            <a:ext cx="1716141" cy="307777"/>
+          </a:xfrm>
+          <a:prstGeom prst="rect">
+            <a:avLst/>
+          </a:prstGeom>
+          <a:solidFill>
+            <a:schemeClr val="bg1">
+              <a:lumMod val="85000"/>
+            </a:schemeClr>
+          </a:solidFill>
+          <a:ln>
+            <a:noFill/>
+          </a:ln>
+        </p:spPr>
+        <p:txBody>
+          <a:bodyPr wrap="square" rtlCol="0">
+            <a:spAutoFit/>
+          </a:bodyPr>
+          <a:lstStyle/>
+          <a:p>
+            <a:pPr algn="r"/>
+            <a:r>
+              <a:rPr lang="de-DE" sz="1400">
+                <a:latin typeface="Arial" panose="020B0604020202020204" pitchFamily="34" charset="0"/>
+                <a:cs typeface="Arial" panose="020B0604020202020204" pitchFamily="34" charset="0"/>
+              </a:rPr>
+              <a:t>lead time 6 months</a:t>
             </a:r>
           </a:p>
         </p:txBody>
@@ -6622,7 +7625,7 @@
     </p:spTree>
     <p:extLst>
       <p:ext uri="{BB962C8B-B14F-4D97-AF65-F5344CB8AC3E}">
-        <p14:creationId xmlns:p14="http://schemas.microsoft.com/office/powerpoint/2010/main" val="2079808273"/>
+        <p14:creationId xmlns:p14="http://schemas.microsoft.com/office/powerpoint/2010/main" val="3608400562"/>
       </p:ext>
     </p:extLst>
   </p:cSld>

</xml_diff>

<commit_message>
Update figures for revised EDS manuscript
</commit_message>
<xml_diff>
--- a/figures/combined_figures.pptx
+++ b/figures/combined_figures.pptx
@@ -206,7 +206,7 @@
           </a:lstStyle>
           <a:p>
             <a:fld id="{77F0B5B9-2F05-8040-835B-A9EE0944125F}" type="datetimeFigureOut">
-              <a:t>27.03.23</a:t>
+              <a:t>29.03.23</a:t>
             </a:fld>
             <a:endParaRPr lang="de-DE"/>
           </a:p>
@@ -1542,7 +1542,7 @@
           <a:lstStyle/>
           <a:p>
             <a:fld id="{A813844F-FEE2-E341-B97B-DB0CD4D59B2D}" type="datetimeFigureOut">
-              <a:t>27.03.23</a:t>
+              <a:t>29.03.23</a:t>
             </a:fld>
             <a:endParaRPr lang="de-DE"/>
           </a:p>
@@ -1738,7 +1738,7 @@
           <a:lstStyle/>
           <a:p>
             <a:fld id="{A813844F-FEE2-E341-B97B-DB0CD4D59B2D}" type="datetimeFigureOut">
-              <a:t>27.03.23</a:t>
+              <a:t>29.03.23</a:t>
             </a:fld>
             <a:endParaRPr lang="de-DE"/>
           </a:p>
@@ -1944,7 +1944,7 @@
           <a:lstStyle/>
           <a:p>
             <a:fld id="{A813844F-FEE2-E341-B97B-DB0CD4D59B2D}" type="datetimeFigureOut">
-              <a:t>27.03.23</a:t>
+              <a:t>29.03.23</a:t>
             </a:fld>
             <a:endParaRPr lang="de-DE"/>
           </a:p>
@@ -2140,7 +2140,7 @@
           <a:lstStyle/>
           <a:p>
             <a:fld id="{A813844F-FEE2-E341-B97B-DB0CD4D59B2D}" type="datetimeFigureOut">
-              <a:t>27.03.23</a:t>
+              <a:t>29.03.23</a:t>
             </a:fld>
             <a:endParaRPr lang="de-DE"/>
           </a:p>
@@ -2413,7 +2413,7 @@
           <a:lstStyle/>
           <a:p>
             <a:fld id="{A813844F-FEE2-E341-B97B-DB0CD4D59B2D}" type="datetimeFigureOut">
-              <a:t>27.03.23</a:t>
+              <a:t>29.03.23</a:t>
             </a:fld>
             <a:endParaRPr lang="de-DE"/>
           </a:p>
@@ -2676,7 +2676,7 @@
           <a:lstStyle/>
           <a:p>
             <a:fld id="{A813844F-FEE2-E341-B97B-DB0CD4D59B2D}" type="datetimeFigureOut">
-              <a:t>27.03.23</a:t>
+              <a:t>29.03.23</a:t>
             </a:fld>
             <a:endParaRPr lang="de-DE"/>
           </a:p>
@@ -3086,7 +3086,7 @@
           <a:lstStyle/>
           <a:p>
             <a:fld id="{A813844F-FEE2-E341-B97B-DB0CD4D59B2D}" type="datetimeFigureOut">
-              <a:t>27.03.23</a:t>
+              <a:t>29.03.23</a:t>
             </a:fld>
             <a:endParaRPr lang="de-DE"/>
           </a:p>
@@ -3225,7 +3225,7 @@
           <a:lstStyle/>
           <a:p>
             <a:fld id="{A813844F-FEE2-E341-B97B-DB0CD4D59B2D}" type="datetimeFigureOut">
-              <a:t>27.03.23</a:t>
+              <a:t>29.03.23</a:t>
             </a:fld>
             <a:endParaRPr lang="de-DE"/>
           </a:p>
@@ -3336,7 +3336,7 @@
           <a:lstStyle/>
           <a:p>
             <a:fld id="{A813844F-FEE2-E341-B97B-DB0CD4D59B2D}" type="datetimeFigureOut">
-              <a:t>27.03.23</a:t>
+              <a:t>29.03.23</a:t>
             </a:fld>
             <a:endParaRPr lang="de-DE"/>
           </a:p>
@@ -3645,7 +3645,7 @@
           <a:lstStyle/>
           <a:p>
             <a:fld id="{A813844F-FEE2-E341-B97B-DB0CD4D59B2D}" type="datetimeFigureOut">
-              <a:t>27.03.23</a:t>
+              <a:t>29.03.23</a:t>
             </a:fld>
             <a:endParaRPr lang="de-DE"/>
           </a:p>
@@ -3931,7 +3931,7 @@
           <a:lstStyle/>
           <a:p>
             <a:fld id="{A813844F-FEE2-E341-B97B-DB0CD4D59B2D}" type="datetimeFigureOut">
-              <a:t>27.03.23</a:t>
+              <a:t>29.03.23</a:t>
             </a:fld>
             <a:endParaRPr lang="de-DE"/>
           </a:p>
@@ -4170,7 +4170,7 @@
           </a:lstStyle>
           <a:p>
             <a:fld id="{A813844F-FEE2-E341-B97B-DB0CD4D59B2D}" type="datetimeFigureOut">
-              <a:t>27.03.23</a:t>
+              <a:t>29.03.23</a:t>
             </a:fld>
             <a:endParaRPr lang="de-DE"/>
           </a:p>
@@ -7090,7 +7090,7 @@
         </p:nvSpPr>
         <p:spPr>
           <a:xfrm>
-            <a:off x="5336286" y="572768"/>
+            <a:off x="5336286" y="565680"/>
             <a:ext cx="295234" cy="338554"/>
           </a:xfrm>
           <a:prstGeom prst="rect">
@@ -7225,7 +7225,7 @@
         </p:nvSpPr>
         <p:spPr>
           <a:xfrm>
-            <a:off x="9352763" y="567869"/>
+            <a:off x="9345675" y="567869"/>
             <a:ext cx="295234" cy="338554"/>
           </a:xfrm>
           <a:prstGeom prst="rect">
@@ -7270,7 +7270,7 @@
         </p:nvSpPr>
         <p:spPr>
           <a:xfrm>
-            <a:off x="9342931" y="2404680"/>
+            <a:off x="9328755" y="2404680"/>
             <a:ext cx="295234" cy="338554"/>
           </a:xfrm>
           <a:prstGeom prst="rect">
@@ -7315,7 +7315,7 @@
         </p:nvSpPr>
         <p:spPr>
           <a:xfrm>
-            <a:off x="9342931" y="4270987"/>
+            <a:off x="9328755" y="4263899"/>
             <a:ext cx="295234" cy="338554"/>
           </a:xfrm>
           <a:prstGeom prst="rect">
@@ -7360,7 +7360,7 @@
         </p:nvSpPr>
         <p:spPr>
           <a:xfrm>
-            <a:off x="2281474" y="578324"/>
+            <a:off x="2281474" y="575021"/>
             <a:ext cx="1346886" cy="307777"/>
           </a:xfrm>
           <a:prstGeom prst="rect">
@@ -7498,7 +7498,7 @@
         </p:nvSpPr>
         <p:spPr>
           <a:xfrm>
-            <a:off x="6301786" y="578324"/>
+            <a:off x="6301786" y="575021"/>
             <a:ext cx="1346886" cy="307777"/>
           </a:xfrm>
           <a:prstGeom prst="rect">

</xml_diff>

<commit_message>
Update figures for revised EDS manuscript (#29)
</commit_message>
<xml_diff>
--- a/figures/combined_figures.pptx
+++ b/figures/combined_figures.pptx
@@ -206,7 +206,7 @@
           </a:lstStyle>
           <a:p>
             <a:fld id="{77F0B5B9-2F05-8040-835B-A9EE0944125F}" type="datetimeFigureOut">
-              <a:t>27.03.23</a:t>
+              <a:t>29.03.23</a:t>
             </a:fld>
             <a:endParaRPr lang="de-DE"/>
           </a:p>
@@ -1542,7 +1542,7 @@
           <a:lstStyle/>
           <a:p>
             <a:fld id="{A813844F-FEE2-E341-B97B-DB0CD4D59B2D}" type="datetimeFigureOut">
-              <a:t>27.03.23</a:t>
+              <a:t>29.03.23</a:t>
             </a:fld>
             <a:endParaRPr lang="de-DE"/>
           </a:p>
@@ -1738,7 +1738,7 @@
           <a:lstStyle/>
           <a:p>
             <a:fld id="{A813844F-FEE2-E341-B97B-DB0CD4D59B2D}" type="datetimeFigureOut">
-              <a:t>27.03.23</a:t>
+              <a:t>29.03.23</a:t>
             </a:fld>
             <a:endParaRPr lang="de-DE"/>
           </a:p>
@@ -1944,7 +1944,7 @@
           <a:lstStyle/>
           <a:p>
             <a:fld id="{A813844F-FEE2-E341-B97B-DB0CD4D59B2D}" type="datetimeFigureOut">
-              <a:t>27.03.23</a:t>
+              <a:t>29.03.23</a:t>
             </a:fld>
             <a:endParaRPr lang="de-DE"/>
           </a:p>
@@ -2140,7 +2140,7 @@
           <a:lstStyle/>
           <a:p>
             <a:fld id="{A813844F-FEE2-E341-B97B-DB0CD4D59B2D}" type="datetimeFigureOut">
-              <a:t>27.03.23</a:t>
+              <a:t>29.03.23</a:t>
             </a:fld>
             <a:endParaRPr lang="de-DE"/>
           </a:p>
@@ -2413,7 +2413,7 @@
           <a:lstStyle/>
           <a:p>
             <a:fld id="{A813844F-FEE2-E341-B97B-DB0CD4D59B2D}" type="datetimeFigureOut">
-              <a:t>27.03.23</a:t>
+              <a:t>29.03.23</a:t>
             </a:fld>
             <a:endParaRPr lang="de-DE"/>
           </a:p>
@@ -2676,7 +2676,7 @@
           <a:lstStyle/>
           <a:p>
             <a:fld id="{A813844F-FEE2-E341-B97B-DB0CD4D59B2D}" type="datetimeFigureOut">
-              <a:t>27.03.23</a:t>
+              <a:t>29.03.23</a:t>
             </a:fld>
             <a:endParaRPr lang="de-DE"/>
           </a:p>
@@ -3086,7 +3086,7 @@
           <a:lstStyle/>
           <a:p>
             <a:fld id="{A813844F-FEE2-E341-B97B-DB0CD4D59B2D}" type="datetimeFigureOut">
-              <a:t>27.03.23</a:t>
+              <a:t>29.03.23</a:t>
             </a:fld>
             <a:endParaRPr lang="de-DE"/>
           </a:p>
@@ -3225,7 +3225,7 @@
           <a:lstStyle/>
           <a:p>
             <a:fld id="{A813844F-FEE2-E341-B97B-DB0CD4D59B2D}" type="datetimeFigureOut">
-              <a:t>27.03.23</a:t>
+              <a:t>29.03.23</a:t>
             </a:fld>
             <a:endParaRPr lang="de-DE"/>
           </a:p>
@@ -3336,7 +3336,7 @@
           <a:lstStyle/>
           <a:p>
             <a:fld id="{A813844F-FEE2-E341-B97B-DB0CD4D59B2D}" type="datetimeFigureOut">
-              <a:t>27.03.23</a:t>
+              <a:t>29.03.23</a:t>
             </a:fld>
             <a:endParaRPr lang="de-DE"/>
           </a:p>
@@ -3645,7 +3645,7 @@
           <a:lstStyle/>
           <a:p>
             <a:fld id="{A813844F-FEE2-E341-B97B-DB0CD4D59B2D}" type="datetimeFigureOut">
-              <a:t>27.03.23</a:t>
+              <a:t>29.03.23</a:t>
             </a:fld>
             <a:endParaRPr lang="de-DE"/>
           </a:p>
@@ -3931,7 +3931,7 @@
           <a:lstStyle/>
           <a:p>
             <a:fld id="{A813844F-FEE2-E341-B97B-DB0CD4D59B2D}" type="datetimeFigureOut">
-              <a:t>27.03.23</a:t>
+              <a:t>29.03.23</a:t>
             </a:fld>
             <a:endParaRPr lang="de-DE"/>
           </a:p>
@@ -4170,7 +4170,7 @@
           </a:lstStyle>
           <a:p>
             <a:fld id="{A813844F-FEE2-E341-B97B-DB0CD4D59B2D}" type="datetimeFigureOut">
-              <a:t>27.03.23</a:t>
+              <a:t>29.03.23</a:t>
             </a:fld>
             <a:endParaRPr lang="de-DE"/>
           </a:p>
@@ -7090,7 +7090,7 @@
         </p:nvSpPr>
         <p:spPr>
           <a:xfrm>
-            <a:off x="5336286" y="572768"/>
+            <a:off x="5336286" y="565680"/>
             <a:ext cx="295234" cy="338554"/>
           </a:xfrm>
           <a:prstGeom prst="rect">
@@ -7225,7 +7225,7 @@
         </p:nvSpPr>
         <p:spPr>
           <a:xfrm>
-            <a:off x="9352763" y="567869"/>
+            <a:off x="9345675" y="567869"/>
             <a:ext cx="295234" cy="338554"/>
           </a:xfrm>
           <a:prstGeom prst="rect">
@@ -7270,7 +7270,7 @@
         </p:nvSpPr>
         <p:spPr>
           <a:xfrm>
-            <a:off x="9342931" y="2404680"/>
+            <a:off x="9328755" y="2404680"/>
             <a:ext cx="295234" cy="338554"/>
           </a:xfrm>
           <a:prstGeom prst="rect">
@@ -7315,7 +7315,7 @@
         </p:nvSpPr>
         <p:spPr>
           <a:xfrm>
-            <a:off x="9342931" y="4270987"/>
+            <a:off x="9328755" y="4263899"/>
             <a:ext cx="295234" cy="338554"/>
           </a:xfrm>
           <a:prstGeom prst="rect">
@@ -7360,7 +7360,7 @@
         </p:nvSpPr>
         <p:spPr>
           <a:xfrm>
-            <a:off x="2281474" y="578324"/>
+            <a:off x="2281474" y="575021"/>
             <a:ext cx="1346886" cy="307777"/>
           </a:xfrm>
           <a:prstGeom prst="rect">
@@ -7498,7 +7498,7 @@
         </p:nvSpPr>
         <p:spPr>
           <a:xfrm>
-            <a:off x="6301786" y="578324"/>
+            <a:off x="6301786" y="575021"/>
             <a:ext cx="1346886" cy="307777"/>
           </a:xfrm>
           <a:prstGeom prst="rect">

</xml_diff>